<commit_message>
Dropped SGL section and added annual update links
Signed-off-by: Weber (US), Matthew L <matthew.l.weber3@boeing.com>
</commit_message>
<xml_diff>
--- a/presentations/ELISA-FSW-March2025.pptx
+++ b/presentations/ELISA-FSW-March2025.pptx
@@ -5,7 +5,7 @@
     <p:sldMasterId id="2147483654" r:id="rId1"/>
   </p:sldMasterIdLst>
   <p:notesMasterIdLst>
-    <p:notesMasterId r:id="rId14"/>
+    <p:notesMasterId r:id="rId11"/>
   </p:notesMasterIdLst>
   <p:sldIdLst>
     <p:sldId id="256" r:id="rId2"/>
@@ -15,11 +15,8 @@
     <p:sldId id="265" r:id="rId6"/>
     <p:sldId id="268" r:id="rId7"/>
     <p:sldId id="267" r:id="rId8"/>
-    <p:sldId id="263" r:id="rId9"/>
-    <p:sldId id="264" r:id="rId10"/>
-    <p:sldId id="269" r:id="rId11"/>
-    <p:sldId id="270" r:id="rId12"/>
-    <p:sldId id="257" r:id="rId13"/>
+    <p:sldId id="270" r:id="rId9"/>
+    <p:sldId id="257" r:id="rId10"/>
   </p:sldIdLst>
   <p:sldSz cx="9144000" cy="5143500" type="screen16x9"/>
   <p:notesSz cx="6858000" cy="9144000"/>
@@ -275,84 +272,6 @@
 <p188:authorLst xmlns:a="http://schemas.openxmlformats.org/drawingml/2006/main" xmlns:r="http://schemas.openxmlformats.org/officeDocument/2006/relationships" xmlns:p188="http://schemas.microsoft.com/office/powerpoint/2018/8/main">
   <p188:author id="{E6F68F93-0A9A-A0C2-D300-BA13CF341FDE}" name="Weber (US), Matthew L" initials="MW" userId="S::matthew.l.weber3@boeing.com::861fdf2c-730d-4625-a5f8-eafe6f3c0385" providerId="AD"/>
 </p188:authorLst>
-</file>
-
-<file path=ppt/comments/modernComment_108_949FEF5D.xml><?xml version="1.0" encoding="utf-8"?>
-<p188:cmLst xmlns:a="http://schemas.openxmlformats.org/drawingml/2006/main" xmlns:r="http://schemas.openxmlformats.org/officeDocument/2006/relationships" xmlns:p188="http://schemas.microsoft.com/office/powerpoint/2018/8/main">
-  <p188:cm id="{E2C54743-47E8-4B31-B97B-70BCA4C6C896}" authorId="{E6F68F93-0A9A-A0C2-D300-BA13CF341FDE}" created="2025-02-18T15:29:51.094">
-    <ac:txMkLst xmlns:ac="http://schemas.microsoft.com/office/drawing/2013/main/command">
-      <pc:docMk xmlns:pc="http://schemas.microsoft.com/office/powerpoint/2013/main/command"/>
-      <pc:sldMk xmlns:pc="http://schemas.microsoft.com/office/powerpoint/2013/main/command" cId="2493509469" sldId="264"/>
-      <ac:spMk id="55" creationId="{854A30CD-78B0-AE68-28CC-A9E3713166DA}"/>
-      <ac:txMk cp="0" len="13">
-        <ac:context len="271" hash="3214909657"/>
-      </ac:txMk>
-    </ac:txMkLst>
-    <p188:pos x="1665956" y="336083"/>
-    <p188:txBody>
-      <a:bodyPr/>
-      <a:lstStyle/>
-      <a:p>
-        <a:r>
-          <a:rPr lang="en-US"/>
-          <a:t>@michael was there anything you wanted to pull in from your workshop SGL talk?</a:t>
-        </a:r>
-      </a:p>
-    </p188:txBody>
-  </p188:cm>
-</p188:cmLst>
-</file>
-
-<file path=ppt/comments/modernComment_109_B801D4FD.xml><?xml version="1.0" encoding="utf-8"?>
-<p188:cmLst xmlns:a="http://schemas.openxmlformats.org/drawingml/2006/main" xmlns:r="http://schemas.openxmlformats.org/officeDocument/2006/relationships" xmlns:p188="http://schemas.microsoft.com/office/powerpoint/2018/8/main">
-  <p188:cm id="{33640190-CF7D-467D-8700-4859276C3051}" authorId="{E6F68F93-0A9A-A0C2-D300-BA13CF341FDE}" created="2025-02-18T15:35:45.460">
-    <ac:txMkLst xmlns:ac="http://schemas.microsoft.com/office/drawing/2013/main/command">
-      <pc:docMk xmlns:pc="http://schemas.microsoft.com/office/powerpoint/2013/main/command"/>
-      <pc:sldMk xmlns:pc="http://schemas.microsoft.com/office/powerpoint/2013/main/command" cId="3087127805" sldId="265"/>
-      <ac:spMk id="54" creationId="{9F212F18-AF74-6013-0462-59F213ECF4F3}"/>
-      <ac:txMk cp="13" len="8">
-        <ac:context len="22" hash="458287042"/>
-      </ac:txMk>
-    </ac:txMkLst>
-    <p188:pos x="4267674" y="262898"/>
-    <p188:txBody>
-      <a:bodyPr/>
-      <a:lstStyle/>
-      <a:p>
-        <a:r>
-          <a:rPr lang="en-US"/>
-          <a:t>@michael  I sketched this out from Ramon’s post that the qrcode points at</a:t>
-        </a:r>
-      </a:p>
-    </p188:txBody>
-  </p188:cm>
-</p188:cmLst>
-</file>
-
-<file path=ppt/comments/modernComment_10D_1ECB4CAD.xml><?xml version="1.0" encoding="utf-8"?>
-<p188:cmLst xmlns:a="http://schemas.openxmlformats.org/drawingml/2006/main" xmlns:r="http://schemas.openxmlformats.org/officeDocument/2006/relationships" xmlns:p188="http://schemas.microsoft.com/office/powerpoint/2018/8/main">
-  <p188:cm id="{6CD11BA5-AC30-423D-8B39-741D7FBC40F4}" authorId="{E6F68F93-0A9A-A0C2-D300-BA13CF341FDE}" created="2025-02-18T15:29:51.094">
-    <ac:txMkLst xmlns:ac="http://schemas.microsoft.com/office/drawing/2013/main/command">
-      <pc:docMk xmlns:pc="http://schemas.microsoft.com/office/powerpoint/2013/main/command"/>
-      <pc:sldMk xmlns:pc="http://schemas.microsoft.com/office/powerpoint/2013/main/command" cId="516639917" sldId="269"/>
-      <ac:spMk id="55" creationId="{67ABC5C7-BDFC-03EF-9DD0-5AF6C9EED5FE}"/>
-      <ac:txMk cp="12">
-        <ac:context len="13" hash="2343918729"/>
-      </ac:txMk>
-    </ac:txMkLst>
-    <p188:pos x="1665956" y="336083"/>
-    <p188:txBody>
-      <a:bodyPr/>
-      <a:lstStyle/>
-      <a:p>
-        <a:r>
-          <a:rPr lang="en-US"/>
-          <a:t>@michael was there anything you wanted to pull in from your workshop SGL talk?</a:t>
-        </a:r>
-      </a:p>
-    </p188:txBody>
-  </p188:cm>
-</p188:cmLst>
 </file>
 
 <file path=ppt/notesMasters/notesMaster1.xml><?xml version="1.0" encoding="utf-8"?>
@@ -900,364 +819,6 @@
 </p:notes>
 </file>
 
-<file path=ppt/notesSlides/notesSlide10.xml><?xml version="1.0" encoding="utf-8"?>
-<p:notes xmlns:a="http://schemas.openxmlformats.org/drawingml/2006/main" xmlns:r="http://schemas.openxmlformats.org/officeDocument/2006/relationships" xmlns:p="http://schemas.openxmlformats.org/presentationml/2006/main" showMasterSp="0" showMasterPhAnim="0">
-  <p:cSld>
-    <p:spTree>
-      <p:nvGrpSpPr>
-        <p:cNvPr id="1" name="Shape 50">
-          <a:extLst>
-            <a:ext uri="{FF2B5EF4-FFF2-40B4-BE49-F238E27FC236}">
-              <a16:creationId xmlns:a16="http://schemas.microsoft.com/office/drawing/2014/main" id="{8736BE24-2875-04B4-AB28-B9CA6FEA4460}"/>
-            </a:ext>
-          </a:extLst>
-        </p:cNvPr>
-        <p:cNvGrpSpPr/>
-        <p:nvPr/>
-      </p:nvGrpSpPr>
-      <p:grpSpPr>
-        <a:xfrm>
-          <a:off x="0" y="0"/>
-          <a:ext cx="0" cy="0"/>
-          <a:chOff x="0" y="0"/>
-          <a:chExt cx="0" cy="0"/>
-        </a:xfrm>
-      </p:grpSpPr>
-      <p:sp>
-        <p:nvSpPr>
-          <p:cNvPr id="51" name="Google Shape;51;g5f61e1cf29_0_31:notes">
-            <a:extLst>
-              <a:ext uri="{FF2B5EF4-FFF2-40B4-BE49-F238E27FC236}">
-                <a16:creationId xmlns:a16="http://schemas.microsoft.com/office/drawing/2014/main" id="{24DB870F-22EA-8AEF-D54C-4ED839F83161}"/>
-              </a:ext>
-            </a:extLst>
-          </p:cNvPr>
-          <p:cNvSpPr>
-            <a:spLocks noGrp="1" noRot="1" noChangeAspect="1"/>
-          </p:cNvSpPr>
-          <p:nvPr>
-            <p:ph type="sldImg" idx="2"/>
-          </p:nvPr>
-        </p:nvSpPr>
-        <p:spPr>
-          <a:xfrm>
-            <a:off x="381000" y="685800"/>
-            <a:ext cx="6096000" cy="3429000"/>
-          </a:xfrm>
-          <a:custGeom>
-            <a:avLst/>
-            <a:gdLst/>
-            <a:ahLst/>
-            <a:cxnLst/>
-            <a:rect l="l" t="t" r="r" b="b"/>
-            <a:pathLst>
-              <a:path w="120000" h="120000" extrusionOk="0">
-                <a:moveTo>
-                  <a:pt x="0" y="0"/>
-                </a:moveTo>
-                <a:lnTo>
-                  <a:pt x="120000" y="0"/>
-                </a:lnTo>
-                <a:lnTo>
-                  <a:pt x="120000" y="120000"/>
-                </a:lnTo>
-                <a:lnTo>
-                  <a:pt x="0" y="120000"/>
-                </a:lnTo>
-                <a:close/>
-              </a:path>
-            </a:pathLst>
-          </a:custGeom>
-        </p:spPr>
-      </p:sp>
-      <p:sp>
-        <p:nvSpPr>
-          <p:cNvPr id="52" name="Google Shape;52;g5f61e1cf29_0_31:notes">
-            <a:extLst>
-              <a:ext uri="{FF2B5EF4-FFF2-40B4-BE49-F238E27FC236}">
-                <a16:creationId xmlns:a16="http://schemas.microsoft.com/office/drawing/2014/main" id="{F96CC7D6-2A9B-DD1B-80BB-2AF8956D55A6}"/>
-              </a:ext>
-            </a:extLst>
-          </p:cNvPr>
-          <p:cNvSpPr txBox="1">
-            <a:spLocks noGrp="1"/>
-          </p:cNvSpPr>
-          <p:nvPr>
-            <p:ph type="body" idx="1"/>
-          </p:nvPr>
-        </p:nvSpPr>
-        <p:spPr>
-          <a:xfrm>
-            <a:off x="685800" y="4343400"/>
-            <a:ext cx="5486400" cy="4114800"/>
-          </a:xfrm>
-          <a:prstGeom prst="rect">
-            <a:avLst/>
-          </a:prstGeom>
-        </p:spPr>
-        <p:txBody>
-          <a:bodyPr spcFirstLastPara="1" wrap="square" lIns="91425" tIns="91425" rIns="91425" bIns="91425" anchor="t" anchorCtr="0">
-            <a:noAutofit/>
-          </a:bodyPr>
-          <a:lstStyle/>
-          <a:p>
-            <a:pPr marL="0" lvl="0" indent="0" algn="l" rtl="0">
-              <a:spcBef>
-                <a:spcPts val="0"/>
-              </a:spcBef>
-              <a:spcAft>
-                <a:spcPts val="0"/>
-              </a:spcAft>
-              <a:buNone/>
-            </a:pPr>
-            <a:endParaRPr/>
-          </a:p>
-        </p:txBody>
-      </p:sp>
-    </p:spTree>
-    <p:extLst>
-      <p:ext uri="{BB962C8B-B14F-4D97-AF65-F5344CB8AC3E}">
-        <p14:creationId xmlns:p14="http://schemas.microsoft.com/office/powerpoint/2010/main" val="3377696832"/>
-      </p:ext>
-    </p:extLst>
-  </p:cSld>
-  <p:clrMapOvr>
-    <a:masterClrMapping/>
-  </p:clrMapOvr>
-</p:notes>
-</file>
-
-<file path=ppt/notesSlides/notesSlide11.xml><?xml version="1.0" encoding="utf-8"?>
-<p:notes xmlns:a="http://schemas.openxmlformats.org/drawingml/2006/main" xmlns:r="http://schemas.openxmlformats.org/officeDocument/2006/relationships" xmlns:p="http://schemas.openxmlformats.org/presentationml/2006/main" showMasterSp="0" showMasterPhAnim="0">
-  <p:cSld>
-    <p:spTree>
-      <p:nvGrpSpPr>
-        <p:cNvPr id="1" name="Shape 50">
-          <a:extLst>
-            <a:ext uri="{FF2B5EF4-FFF2-40B4-BE49-F238E27FC236}">
-              <a16:creationId xmlns:a16="http://schemas.microsoft.com/office/drawing/2014/main" id="{2615A70C-6CCC-D886-F040-167263D81302}"/>
-            </a:ext>
-          </a:extLst>
-        </p:cNvPr>
-        <p:cNvGrpSpPr/>
-        <p:nvPr/>
-      </p:nvGrpSpPr>
-      <p:grpSpPr>
-        <a:xfrm>
-          <a:off x="0" y="0"/>
-          <a:ext cx="0" cy="0"/>
-          <a:chOff x="0" y="0"/>
-          <a:chExt cx="0" cy="0"/>
-        </a:xfrm>
-      </p:grpSpPr>
-      <p:sp>
-        <p:nvSpPr>
-          <p:cNvPr id="51" name="Google Shape;51;g5f61e1cf29_0_31:notes">
-            <a:extLst>
-              <a:ext uri="{FF2B5EF4-FFF2-40B4-BE49-F238E27FC236}">
-                <a16:creationId xmlns:a16="http://schemas.microsoft.com/office/drawing/2014/main" id="{93EBD38F-037B-E068-6E90-C300630C5D6E}"/>
-              </a:ext>
-            </a:extLst>
-          </p:cNvPr>
-          <p:cNvSpPr>
-            <a:spLocks noGrp="1" noRot="1" noChangeAspect="1"/>
-          </p:cNvSpPr>
-          <p:nvPr>
-            <p:ph type="sldImg" idx="2"/>
-          </p:nvPr>
-        </p:nvSpPr>
-        <p:spPr>
-          <a:xfrm>
-            <a:off x="381000" y="685800"/>
-            <a:ext cx="6096000" cy="3429000"/>
-          </a:xfrm>
-          <a:custGeom>
-            <a:avLst/>
-            <a:gdLst/>
-            <a:ahLst/>
-            <a:cxnLst/>
-            <a:rect l="l" t="t" r="r" b="b"/>
-            <a:pathLst>
-              <a:path w="120000" h="120000" extrusionOk="0">
-                <a:moveTo>
-                  <a:pt x="0" y="0"/>
-                </a:moveTo>
-                <a:lnTo>
-                  <a:pt x="120000" y="0"/>
-                </a:lnTo>
-                <a:lnTo>
-                  <a:pt x="120000" y="120000"/>
-                </a:lnTo>
-                <a:lnTo>
-                  <a:pt x="0" y="120000"/>
-                </a:lnTo>
-                <a:close/>
-              </a:path>
-            </a:pathLst>
-          </a:custGeom>
-        </p:spPr>
-      </p:sp>
-      <p:sp>
-        <p:nvSpPr>
-          <p:cNvPr id="52" name="Google Shape;52;g5f61e1cf29_0_31:notes">
-            <a:extLst>
-              <a:ext uri="{FF2B5EF4-FFF2-40B4-BE49-F238E27FC236}">
-                <a16:creationId xmlns:a16="http://schemas.microsoft.com/office/drawing/2014/main" id="{7B3921A8-0E69-C8A8-E161-97333F9F135E}"/>
-              </a:ext>
-            </a:extLst>
-          </p:cNvPr>
-          <p:cNvSpPr txBox="1">
-            <a:spLocks noGrp="1"/>
-          </p:cNvSpPr>
-          <p:nvPr>
-            <p:ph type="body" idx="1"/>
-          </p:nvPr>
-        </p:nvSpPr>
-        <p:spPr>
-          <a:xfrm>
-            <a:off x="685800" y="4343400"/>
-            <a:ext cx="5486400" cy="4114800"/>
-          </a:xfrm>
-          <a:prstGeom prst="rect">
-            <a:avLst/>
-          </a:prstGeom>
-        </p:spPr>
-        <p:txBody>
-          <a:bodyPr spcFirstLastPara="1" wrap="square" lIns="91425" tIns="91425" rIns="91425" bIns="91425" anchor="t" anchorCtr="0">
-            <a:noAutofit/>
-          </a:bodyPr>
-          <a:lstStyle/>
-          <a:p>
-            <a:pPr marL="0" lvl="0" indent="0" algn="l" rtl="0">
-              <a:spcBef>
-                <a:spcPts val="0"/>
-              </a:spcBef>
-              <a:spcAft>
-                <a:spcPts val="0"/>
-              </a:spcAft>
-              <a:buNone/>
-            </a:pPr>
-            <a:endParaRPr/>
-          </a:p>
-        </p:txBody>
-      </p:sp>
-    </p:spTree>
-    <p:extLst>
-      <p:ext uri="{BB962C8B-B14F-4D97-AF65-F5344CB8AC3E}">
-        <p14:creationId xmlns:p14="http://schemas.microsoft.com/office/powerpoint/2010/main" val="2249695328"/>
-      </p:ext>
-    </p:extLst>
-  </p:cSld>
-  <p:clrMapOvr>
-    <a:masterClrMapping/>
-  </p:clrMapOvr>
-</p:notes>
-</file>
-
-<file path=ppt/notesSlides/notesSlide12.xml><?xml version="1.0" encoding="utf-8"?>
-<p:notes xmlns:a="http://schemas.openxmlformats.org/drawingml/2006/main" xmlns:r="http://schemas.openxmlformats.org/officeDocument/2006/relationships" xmlns:p="http://schemas.openxmlformats.org/presentationml/2006/main" showMasterSp="0" showMasterPhAnim="0">
-  <p:cSld>
-    <p:spTree>
-      <p:nvGrpSpPr>
-        <p:cNvPr id="1" name="Shape 45"/>
-        <p:cNvGrpSpPr/>
-        <p:nvPr/>
-      </p:nvGrpSpPr>
-      <p:grpSpPr>
-        <a:xfrm>
-          <a:off x="0" y="0"/>
-          <a:ext cx="0" cy="0"/>
-          <a:chOff x="0" y="0"/>
-          <a:chExt cx="0" cy="0"/>
-        </a:xfrm>
-      </p:grpSpPr>
-      <p:sp>
-        <p:nvSpPr>
-          <p:cNvPr id="46" name="Google Shape;46;g5f61e1cf29_0_36:notes"/>
-          <p:cNvSpPr>
-            <a:spLocks noGrp="1" noRot="1" noChangeAspect="1"/>
-          </p:cNvSpPr>
-          <p:nvPr>
-            <p:ph type="sldImg" idx="2"/>
-          </p:nvPr>
-        </p:nvSpPr>
-        <p:spPr>
-          <a:xfrm>
-            <a:off x="381000" y="685800"/>
-            <a:ext cx="6096000" cy="3429000"/>
-          </a:xfrm>
-          <a:custGeom>
-            <a:avLst/>
-            <a:gdLst/>
-            <a:ahLst/>
-            <a:cxnLst/>
-            <a:rect l="l" t="t" r="r" b="b"/>
-            <a:pathLst>
-              <a:path w="120000" h="120000" extrusionOk="0">
-                <a:moveTo>
-                  <a:pt x="0" y="0"/>
-                </a:moveTo>
-                <a:lnTo>
-                  <a:pt x="120000" y="0"/>
-                </a:lnTo>
-                <a:lnTo>
-                  <a:pt x="120000" y="120000"/>
-                </a:lnTo>
-                <a:lnTo>
-                  <a:pt x="0" y="120000"/>
-                </a:lnTo>
-                <a:close/>
-              </a:path>
-            </a:pathLst>
-          </a:custGeom>
-        </p:spPr>
-      </p:sp>
-      <p:sp>
-        <p:nvSpPr>
-          <p:cNvPr id="47" name="Google Shape;47;g5f61e1cf29_0_36:notes"/>
-          <p:cNvSpPr txBox="1">
-            <a:spLocks noGrp="1"/>
-          </p:cNvSpPr>
-          <p:nvPr>
-            <p:ph type="body" idx="1"/>
-          </p:nvPr>
-        </p:nvSpPr>
-        <p:spPr>
-          <a:xfrm>
-            <a:off x="685800" y="4343400"/>
-            <a:ext cx="5486400" cy="4114800"/>
-          </a:xfrm>
-          <a:prstGeom prst="rect">
-            <a:avLst/>
-          </a:prstGeom>
-        </p:spPr>
-        <p:txBody>
-          <a:bodyPr spcFirstLastPara="1" wrap="square" lIns="91425" tIns="91425" rIns="91425" bIns="91425" anchor="t" anchorCtr="0">
-            <a:noAutofit/>
-          </a:bodyPr>
-          <a:lstStyle/>
-          <a:p>
-            <a:pPr marL="0" lvl="0" indent="0" algn="l" rtl="0">
-              <a:spcBef>
-                <a:spcPts val="0"/>
-              </a:spcBef>
-              <a:spcAft>
-                <a:spcPts val="0"/>
-              </a:spcAft>
-              <a:buNone/>
-            </a:pPr>
-            <a:endParaRPr/>
-          </a:p>
-        </p:txBody>
-      </p:sp>
-    </p:spTree>
-  </p:cSld>
-  <p:clrMapOvr>
-    <a:masterClrMapping/>
-  </p:clrMapOvr>
-</p:notes>
-</file>
-
 <file path=ppt/notesSlides/notesSlide2.xml><?xml version="1.0" encoding="utf-8"?>
 <p:notes xmlns:a="http://schemas.openxmlformats.org/drawingml/2006/main" xmlns:r="http://schemas.openxmlformats.org/officeDocument/2006/relationships" xmlns:p="http://schemas.openxmlformats.org/presentationml/2006/main" showMasterSp="0" showMasterPhAnim="0">
   <p:cSld>
@@ -1959,7 +1520,7 @@
         <p:cNvPr id="1" name="Shape 50">
           <a:extLst>
             <a:ext uri="{FF2B5EF4-FFF2-40B4-BE49-F238E27FC236}">
-              <a16:creationId xmlns:a16="http://schemas.microsoft.com/office/drawing/2014/main" id="{34B18976-3820-8B66-01B1-352FAB1CAC9A}"/>
+              <a16:creationId xmlns:a16="http://schemas.microsoft.com/office/drawing/2014/main" id="{2615A70C-6CCC-D886-F040-167263D81302}"/>
             </a:ext>
           </a:extLst>
         </p:cNvPr>
@@ -1979,7 +1540,7 @@
           <p:cNvPr id="51" name="Google Shape;51;g5f61e1cf29_0_31:notes">
             <a:extLst>
               <a:ext uri="{FF2B5EF4-FFF2-40B4-BE49-F238E27FC236}">
-                <a16:creationId xmlns:a16="http://schemas.microsoft.com/office/drawing/2014/main" id="{2FF14374-0AAB-174D-E179-BAAC7950A7A4}"/>
+                <a16:creationId xmlns:a16="http://schemas.microsoft.com/office/drawing/2014/main" id="{93EBD38F-037B-E068-6E90-C300630C5D6E}"/>
               </a:ext>
             </a:extLst>
           </p:cNvPr>
@@ -2026,7 +1587,7 @@
           <p:cNvPr id="52" name="Google Shape;52;g5f61e1cf29_0_31:notes">
             <a:extLst>
               <a:ext uri="{FF2B5EF4-FFF2-40B4-BE49-F238E27FC236}">
-                <a16:creationId xmlns:a16="http://schemas.microsoft.com/office/drawing/2014/main" id="{2A38DAC6-7E02-2631-FCC1-08836AA68B8F}"/>
+                <a16:creationId xmlns:a16="http://schemas.microsoft.com/office/drawing/2014/main" id="{7B3921A8-0E69-C8A8-E161-97333F9F135E}"/>
               </a:ext>
             </a:extLst>
           </p:cNvPr>
@@ -2068,7 +1629,7 @@
     </p:spTree>
     <p:extLst>
       <p:ext uri="{BB962C8B-B14F-4D97-AF65-F5344CB8AC3E}">
-        <p14:creationId xmlns:p14="http://schemas.microsoft.com/office/powerpoint/2010/main" val="2709583875"/>
+        <p14:creationId xmlns:p14="http://schemas.microsoft.com/office/powerpoint/2010/main" val="2249695328"/>
       </p:ext>
     </p:extLst>
   </p:cSld>
@@ -2083,13 +1644,7 @@
   <p:cSld>
     <p:spTree>
       <p:nvGrpSpPr>
-        <p:cNvPr id="1" name="Shape 50">
-          <a:extLst>
-            <a:ext uri="{FF2B5EF4-FFF2-40B4-BE49-F238E27FC236}">
-              <a16:creationId xmlns:a16="http://schemas.microsoft.com/office/drawing/2014/main" id="{6528D7F1-82DF-1826-71E1-CE272858C2A2}"/>
-            </a:ext>
-          </a:extLst>
-        </p:cNvPr>
+        <p:cNvPr id="1" name="Shape 45"/>
         <p:cNvGrpSpPr/>
         <p:nvPr/>
       </p:nvGrpSpPr>
@@ -2103,13 +1658,7 @@
       </p:grpSpPr>
       <p:sp>
         <p:nvSpPr>
-          <p:cNvPr id="51" name="Google Shape;51;g5f61e1cf29_0_31:notes">
-            <a:extLst>
-              <a:ext uri="{FF2B5EF4-FFF2-40B4-BE49-F238E27FC236}">
-                <a16:creationId xmlns:a16="http://schemas.microsoft.com/office/drawing/2014/main" id="{9F929619-8F96-BB06-A3CA-51751E0F717D}"/>
-              </a:ext>
-            </a:extLst>
-          </p:cNvPr>
+          <p:cNvPr id="46" name="Google Shape;46;g5f61e1cf29_0_36:notes"/>
           <p:cNvSpPr>
             <a:spLocks noGrp="1" noRot="1" noChangeAspect="1"/>
           </p:cNvSpPr>
@@ -2150,13 +1699,7 @@
       </p:sp>
       <p:sp>
         <p:nvSpPr>
-          <p:cNvPr id="52" name="Google Shape;52;g5f61e1cf29_0_31:notes">
-            <a:extLst>
-              <a:ext uri="{FF2B5EF4-FFF2-40B4-BE49-F238E27FC236}">
-                <a16:creationId xmlns:a16="http://schemas.microsoft.com/office/drawing/2014/main" id="{C9DDFA6A-4588-44AB-5D55-E81676463C39}"/>
-              </a:ext>
-            </a:extLst>
-          </p:cNvPr>
+          <p:cNvPr id="47" name="Google Shape;47;g5f61e1cf29_0_36:notes"/>
           <p:cNvSpPr txBox="1">
             <a:spLocks noGrp="1"/>
           </p:cNvSpPr>
@@ -2193,11 +1736,6 @@
         </p:txBody>
       </p:sp>
     </p:spTree>
-    <p:extLst>
-      <p:ext uri="{BB962C8B-B14F-4D97-AF65-F5344CB8AC3E}">
-        <p14:creationId xmlns:p14="http://schemas.microsoft.com/office/powerpoint/2010/main" val="1832919209"/>
-      </p:ext>
-    </p:extLst>
   </p:cSld>
   <p:clrMapOvr>
     <a:masterClrMapping/>
@@ -5737,730 +5275,6 @@
 </p:sld>
 </file>
 
-<file path=ppt/slides/slide10.xml><?xml version="1.0" encoding="utf-8"?>
-<p:sld xmlns:a="http://schemas.openxmlformats.org/drawingml/2006/main" xmlns:r="http://schemas.openxmlformats.org/officeDocument/2006/relationships" xmlns:p="http://schemas.openxmlformats.org/presentationml/2006/main">
-  <p:cSld>
-    <p:spTree>
-      <p:nvGrpSpPr>
-        <p:cNvPr id="1" name="Shape 53">
-          <a:extLst>
-            <a:ext uri="{FF2B5EF4-FFF2-40B4-BE49-F238E27FC236}">
-              <a16:creationId xmlns:a16="http://schemas.microsoft.com/office/drawing/2014/main" id="{67DF9E18-C61F-AF9B-442E-C6C6DE92FD86}"/>
-            </a:ext>
-          </a:extLst>
-        </p:cNvPr>
-        <p:cNvGrpSpPr/>
-        <p:nvPr/>
-      </p:nvGrpSpPr>
-      <p:grpSpPr>
-        <a:xfrm>
-          <a:off x="0" y="0"/>
-          <a:ext cx="0" cy="0"/>
-          <a:chOff x="0" y="0"/>
-          <a:chExt cx="0" cy="0"/>
-        </a:xfrm>
-      </p:grpSpPr>
-      <p:sp>
-        <p:nvSpPr>
-          <p:cNvPr id="54" name="Google Shape;54;p10">
-            <a:extLst>
-              <a:ext uri="{FF2B5EF4-FFF2-40B4-BE49-F238E27FC236}">
-                <a16:creationId xmlns:a16="http://schemas.microsoft.com/office/drawing/2014/main" id="{04E30258-E60A-19C1-6952-BFB3354C98D2}"/>
-              </a:ext>
-            </a:extLst>
-          </p:cNvPr>
-          <p:cNvSpPr txBox="1">
-            <a:spLocks noGrp="1"/>
-          </p:cNvSpPr>
-          <p:nvPr>
-            <p:ph type="title"/>
-          </p:nvPr>
-        </p:nvSpPr>
-        <p:spPr>
-          <a:xfrm>
-            <a:off x="311700" y="445025"/>
-            <a:ext cx="8520600" cy="572700"/>
-          </a:xfrm>
-          <a:prstGeom prst="rect">
-            <a:avLst/>
-          </a:prstGeom>
-        </p:spPr>
-        <p:txBody>
-          <a:bodyPr spcFirstLastPara="1" wrap="square" lIns="91425" tIns="91425" rIns="91425" bIns="91425" anchor="t" anchorCtr="0">
-            <a:noAutofit/>
-          </a:bodyPr>
-          <a:lstStyle/>
-          <a:p>
-            <a:pPr marL="0" lvl="0" indent="0" algn="l" rtl="0">
-              <a:spcBef>
-                <a:spcPts val="0"/>
-              </a:spcBef>
-              <a:spcAft>
-                <a:spcPts val="0"/>
-              </a:spcAft>
-              <a:buNone/>
-            </a:pPr>
-            <a:r>
-              <a:rPr lang="en-US" dirty="0"/>
-              <a:t>Space Grade Linux</a:t>
-            </a:r>
-            <a:endParaRPr dirty="0"/>
-          </a:p>
-        </p:txBody>
-      </p:sp>
-      <p:sp>
-        <p:nvSpPr>
-          <p:cNvPr id="55" name="Google Shape;55;p10">
-            <a:extLst>
-              <a:ext uri="{FF2B5EF4-FFF2-40B4-BE49-F238E27FC236}">
-                <a16:creationId xmlns:a16="http://schemas.microsoft.com/office/drawing/2014/main" id="{67ABC5C7-BDFC-03EF-9DD0-5AF6C9EED5FE}"/>
-              </a:ext>
-            </a:extLst>
-          </p:cNvPr>
-          <p:cNvSpPr txBox="1">
-            <a:spLocks noGrp="1"/>
-          </p:cNvSpPr>
-          <p:nvPr>
-            <p:ph type="body" idx="1"/>
-          </p:nvPr>
-        </p:nvSpPr>
-        <p:spPr>
-          <a:xfrm>
-            <a:off x="311700" y="1152475"/>
-            <a:ext cx="8520600" cy="3050100"/>
-          </a:xfrm>
-          <a:prstGeom prst="rect">
-            <a:avLst/>
-          </a:prstGeom>
-        </p:spPr>
-        <p:txBody>
-          <a:bodyPr spcFirstLastPara="1" wrap="square" lIns="91425" tIns="91425" rIns="91425" bIns="91425" anchor="t" anchorCtr="0">
-            <a:noAutofit/>
-          </a:bodyPr>
-          <a:lstStyle/>
-          <a:p>
-            <a:pPr marL="0" lvl="0" indent="0" algn="l" rtl="0">
-              <a:spcBef>
-                <a:spcPts val="0"/>
-              </a:spcBef>
-              <a:spcAft>
-                <a:spcPts val="800"/>
-              </a:spcAft>
-              <a:buNone/>
-            </a:pPr>
-            <a:r>
-              <a:rPr lang="en-US" b="1" dirty="0"/>
-              <a:t>What else?  </a:t>
-            </a:r>
-            <a:endParaRPr i="1" dirty="0"/>
-          </a:p>
-        </p:txBody>
-      </p:sp>
-    </p:spTree>
-    <p:extLst>
-      <p:ext uri="{BB962C8B-B14F-4D97-AF65-F5344CB8AC3E}">
-        <p14:creationId xmlns:p14="http://schemas.microsoft.com/office/powerpoint/2010/main" val="516639917"/>
-      </p:ext>
-    </p:extLst>
-  </p:cSld>
-  <p:clrMapOvr>
-    <a:masterClrMapping/>
-  </p:clrMapOvr>
-  <p:extLst>
-    <p:ext uri="{6950BFC3-D8DA-4A85-94F7-54DA5524770B}">
-      <p188:commentRel xmlns:p188="http://schemas.microsoft.com/office/powerpoint/2018/8/main" r:id="rId3"/>
-    </p:ext>
-  </p:extLst>
-</p:sld>
-</file>
-
-<file path=ppt/slides/slide11.xml><?xml version="1.0" encoding="utf-8"?>
-<p:sld xmlns:a="http://schemas.openxmlformats.org/drawingml/2006/main" xmlns:r="http://schemas.openxmlformats.org/officeDocument/2006/relationships" xmlns:p="http://schemas.openxmlformats.org/presentationml/2006/main">
-  <p:cSld>
-    <p:spTree>
-      <p:nvGrpSpPr>
-        <p:cNvPr id="1" name="Shape 53">
-          <a:extLst>
-            <a:ext uri="{FF2B5EF4-FFF2-40B4-BE49-F238E27FC236}">
-              <a16:creationId xmlns:a16="http://schemas.microsoft.com/office/drawing/2014/main" id="{3FB7E49A-803A-8546-5762-9B036DFC1B36}"/>
-            </a:ext>
-          </a:extLst>
-        </p:cNvPr>
-        <p:cNvGrpSpPr/>
-        <p:nvPr/>
-      </p:nvGrpSpPr>
-      <p:grpSpPr>
-        <a:xfrm>
-          <a:off x="0" y="0"/>
-          <a:ext cx="0" cy="0"/>
-          <a:chOff x="0" y="0"/>
-          <a:chExt cx="0" cy="0"/>
-        </a:xfrm>
-      </p:grpSpPr>
-      <p:sp>
-        <p:nvSpPr>
-          <p:cNvPr id="54" name="Google Shape;54;p10">
-            <a:extLst>
-              <a:ext uri="{FF2B5EF4-FFF2-40B4-BE49-F238E27FC236}">
-                <a16:creationId xmlns:a16="http://schemas.microsoft.com/office/drawing/2014/main" id="{D1577212-D3E4-5FFD-B67E-1FAA9998D8E8}"/>
-              </a:ext>
-            </a:extLst>
-          </p:cNvPr>
-          <p:cNvSpPr txBox="1">
-            <a:spLocks noGrp="1"/>
-          </p:cNvSpPr>
-          <p:nvPr>
-            <p:ph type="title"/>
-          </p:nvPr>
-        </p:nvSpPr>
-        <p:spPr>
-          <a:xfrm>
-            <a:off x="311700" y="445025"/>
-            <a:ext cx="8520600" cy="572700"/>
-          </a:xfrm>
-          <a:prstGeom prst="rect">
-            <a:avLst/>
-          </a:prstGeom>
-        </p:spPr>
-        <p:txBody>
-          <a:bodyPr spcFirstLastPara="1" wrap="square" lIns="91425" tIns="91425" rIns="91425" bIns="91425" anchor="t" anchorCtr="0">
-            <a:noAutofit/>
-          </a:bodyPr>
-          <a:lstStyle/>
-          <a:p>
-            <a:pPr marL="0" lvl="0" indent="0" algn="l" rtl="0">
-              <a:spcBef>
-                <a:spcPts val="0"/>
-              </a:spcBef>
-              <a:spcAft>
-                <a:spcPts val="0"/>
-              </a:spcAft>
-              <a:buNone/>
-            </a:pPr>
-            <a:r>
-              <a:rPr lang="en-US" dirty="0"/>
-              <a:t>Resources</a:t>
-            </a:r>
-            <a:endParaRPr dirty="0"/>
-          </a:p>
-        </p:txBody>
-      </p:sp>
-      <p:sp>
-        <p:nvSpPr>
-          <p:cNvPr id="2" name="Google Shape;165;p24">
-            <a:extLst>
-              <a:ext uri="{FF2B5EF4-FFF2-40B4-BE49-F238E27FC236}">
-                <a16:creationId xmlns:a16="http://schemas.microsoft.com/office/drawing/2014/main" id="{692B0195-5BAA-928A-6C58-036B9B3736DA}"/>
-              </a:ext>
-            </a:extLst>
-          </p:cNvPr>
-          <p:cNvSpPr txBox="1">
-            <a:spLocks/>
-          </p:cNvSpPr>
-          <p:nvPr/>
-        </p:nvSpPr>
-        <p:spPr>
-          <a:xfrm>
-            <a:off x="311699" y="1041300"/>
-            <a:ext cx="5678903" cy="3060900"/>
-          </a:xfrm>
-          <a:prstGeom prst="rect">
-            <a:avLst/>
-          </a:prstGeom>
-          <a:noFill/>
-          <a:ln>
-            <a:noFill/>
-          </a:ln>
-        </p:spPr>
-        <p:txBody>
-          <a:bodyPr spcFirstLastPara="1" wrap="square" lIns="91425" tIns="91425" rIns="91425" bIns="91425" anchor="t" anchorCtr="0">
-            <a:noAutofit/>
-          </a:bodyPr>
-          <a:lstStyle>
-            <a:defPPr marR="0" lvl="0" algn="l" rtl="0">
-              <a:lnSpc>
-                <a:spcPct val="100000"/>
-              </a:lnSpc>
-              <a:spcBef>
-                <a:spcPts val="0"/>
-              </a:spcBef>
-              <a:spcAft>
-                <a:spcPts val="0"/>
-              </a:spcAft>
-            </a:defPPr>
-            <a:lvl1pPr marL="457200" marR="0" lvl="0" indent="-342900" algn="l" rtl="0">
-              <a:lnSpc>
-                <a:spcPct val="114000"/>
-              </a:lnSpc>
-              <a:spcBef>
-                <a:spcPts val="0"/>
-              </a:spcBef>
-              <a:spcAft>
-                <a:spcPts val="0"/>
-              </a:spcAft>
-              <a:buClr>
-                <a:srgbClr val="434343"/>
-              </a:buClr>
-              <a:buSzPts val="1800"/>
-              <a:buFont typeface="Arial"/>
-              <a:buChar char="●"/>
-              <a:defRPr sz="1800" b="0" i="0" u="none" strike="noStrike" cap="none">
-                <a:solidFill>
-                  <a:srgbClr val="434343"/>
-                </a:solidFill>
-                <a:latin typeface="Arial"/>
-                <a:ea typeface="Arial"/>
-                <a:cs typeface="Arial"/>
-                <a:sym typeface="Arial"/>
-              </a:defRPr>
-            </a:lvl1pPr>
-            <a:lvl2pPr marL="914400" marR="0" lvl="1" indent="-317500" algn="l" rtl="0">
-              <a:lnSpc>
-                <a:spcPct val="114000"/>
-              </a:lnSpc>
-              <a:spcBef>
-                <a:spcPts val="800"/>
-              </a:spcBef>
-              <a:spcAft>
-                <a:spcPts val="0"/>
-              </a:spcAft>
-              <a:buClr>
-                <a:srgbClr val="434343"/>
-              </a:buClr>
-              <a:buSzPts val="1400"/>
-              <a:buFont typeface="Arial"/>
-              <a:buChar char="○"/>
-              <a:defRPr sz="1400" b="0" i="0" u="none" strike="noStrike" cap="none">
-                <a:solidFill>
-                  <a:srgbClr val="434343"/>
-                </a:solidFill>
-                <a:latin typeface="Arial"/>
-                <a:ea typeface="Arial"/>
-                <a:cs typeface="Arial"/>
-                <a:sym typeface="Arial"/>
-              </a:defRPr>
-            </a:lvl2pPr>
-            <a:lvl3pPr marL="1371600" marR="0" lvl="2" indent="-317500" algn="l" rtl="0">
-              <a:lnSpc>
-                <a:spcPct val="114000"/>
-              </a:lnSpc>
-              <a:spcBef>
-                <a:spcPts val="800"/>
-              </a:spcBef>
-              <a:spcAft>
-                <a:spcPts val="0"/>
-              </a:spcAft>
-              <a:buClr>
-                <a:srgbClr val="434343"/>
-              </a:buClr>
-              <a:buSzPts val="1400"/>
-              <a:buFont typeface="Arial"/>
-              <a:buChar char="■"/>
-              <a:defRPr sz="1400" b="0" i="0" u="none" strike="noStrike" cap="none">
-                <a:solidFill>
-                  <a:srgbClr val="434343"/>
-                </a:solidFill>
-                <a:latin typeface="Arial"/>
-                <a:ea typeface="Arial"/>
-                <a:cs typeface="Arial"/>
-                <a:sym typeface="Arial"/>
-              </a:defRPr>
-            </a:lvl3pPr>
-            <a:lvl4pPr marL="1828800" marR="0" lvl="3" indent="-317500" algn="l" rtl="0">
-              <a:lnSpc>
-                <a:spcPct val="114000"/>
-              </a:lnSpc>
-              <a:spcBef>
-                <a:spcPts val="800"/>
-              </a:spcBef>
-              <a:spcAft>
-                <a:spcPts val="0"/>
-              </a:spcAft>
-              <a:buClr>
-                <a:srgbClr val="434343"/>
-              </a:buClr>
-              <a:buSzPts val="1400"/>
-              <a:buFont typeface="Arial"/>
-              <a:buChar char="●"/>
-              <a:defRPr sz="1400" b="0" i="0" u="none" strike="noStrike" cap="none">
-                <a:solidFill>
-                  <a:srgbClr val="434343"/>
-                </a:solidFill>
-                <a:latin typeface="Arial"/>
-                <a:ea typeface="Arial"/>
-                <a:cs typeface="Arial"/>
-                <a:sym typeface="Arial"/>
-              </a:defRPr>
-            </a:lvl4pPr>
-            <a:lvl5pPr marL="2286000" marR="0" lvl="4" indent="-317500" algn="l" rtl="0">
-              <a:lnSpc>
-                <a:spcPct val="114000"/>
-              </a:lnSpc>
-              <a:spcBef>
-                <a:spcPts val="800"/>
-              </a:spcBef>
-              <a:spcAft>
-                <a:spcPts val="0"/>
-              </a:spcAft>
-              <a:buClr>
-                <a:srgbClr val="434343"/>
-              </a:buClr>
-              <a:buSzPts val="1400"/>
-              <a:buFont typeface="Arial"/>
-              <a:buChar char="○"/>
-              <a:defRPr sz="1400" b="0" i="0" u="none" strike="noStrike" cap="none">
-                <a:solidFill>
-                  <a:srgbClr val="434343"/>
-                </a:solidFill>
-                <a:latin typeface="Arial"/>
-                <a:ea typeface="Arial"/>
-                <a:cs typeface="Arial"/>
-                <a:sym typeface="Arial"/>
-              </a:defRPr>
-            </a:lvl5pPr>
-            <a:lvl6pPr marL="2743200" marR="0" lvl="5" indent="-317500" algn="l" rtl="0">
-              <a:lnSpc>
-                <a:spcPct val="114000"/>
-              </a:lnSpc>
-              <a:spcBef>
-                <a:spcPts val="800"/>
-              </a:spcBef>
-              <a:spcAft>
-                <a:spcPts val="0"/>
-              </a:spcAft>
-              <a:buClr>
-                <a:srgbClr val="434343"/>
-              </a:buClr>
-              <a:buSzPts val="1400"/>
-              <a:buFont typeface="Arial"/>
-              <a:buChar char="■"/>
-              <a:defRPr sz="1400" b="0" i="0" u="none" strike="noStrike" cap="none">
-                <a:solidFill>
-                  <a:srgbClr val="434343"/>
-                </a:solidFill>
-                <a:latin typeface="Arial"/>
-                <a:ea typeface="Arial"/>
-                <a:cs typeface="Arial"/>
-                <a:sym typeface="Arial"/>
-              </a:defRPr>
-            </a:lvl6pPr>
-            <a:lvl7pPr marL="3200400" marR="0" lvl="6" indent="-317500" algn="l" rtl="0">
-              <a:lnSpc>
-                <a:spcPct val="114000"/>
-              </a:lnSpc>
-              <a:spcBef>
-                <a:spcPts val="800"/>
-              </a:spcBef>
-              <a:spcAft>
-                <a:spcPts val="0"/>
-              </a:spcAft>
-              <a:buClr>
-                <a:srgbClr val="434343"/>
-              </a:buClr>
-              <a:buSzPts val="1400"/>
-              <a:buFont typeface="Arial"/>
-              <a:buChar char="●"/>
-              <a:defRPr sz="1400" b="0" i="0" u="none" strike="noStrike" cap="none">
-                <a:solidFill>
-                  <a:srgbClr val="434343"/>
-                </a:solidFill>
-                <a:latin typeface="Arial"/>
-                <a:ea typeface="Arial"/>
-                <a:cs typeface="Arial"/>
-                <a:sym typeface="Arial"/>
-              </a:defRPr>
-            </a:lvl7pPr>
-            <a:lvl8pPr marL="3657600" marR="0" lvl="7" indent="-317500" algn="l" rtl="0">
-              <a:lnSpc>
-                <a:spcPct val="114000"/>
-              </a:lnSpc>
-              <a:spcBef>
-                <a:spcPts val="800"/>
-              </a:spcBef>
-              <a:spcAft>
-                <a:spcPts val="0"/>
-              </a:spcAft>
-              <a:buClr>
-                <a:srgbClr val="434343"/>
-              </a:buClr>
-              <a:buSzPts val="1400"/>
-              <a:buFont typeface="Arial"/>
-              <a:buChar char="○"/>
-              <a:defRPr sz="1400" b="0" i="0" u="none" strike="noStrike" cap="none">
-                <a:solidFill>
-                  <a:srgbClr val="434343"/>
-                </a:solidFill>
-                <a:latin typeface="Arial"/>
-                <a:ea typeface="Arial"/>
-                <a:cs typeface="Arial"/>
-                <a:sym typeface="Arial"/>
-              </a:defRPr>
-            </a:lvl8pPr>
-            <a:lvl9pPr marL="4114800" marR="0" lvl="8" indent="-317500" algn="l" rtl="0">
-              <a:lnSpc>
-                <a:spcPct val="114000"/>
-              </a:lnSpc>
-              <a:spcBef>
-                <a:spcPts val="800"/>
-              </a:spcBef>
-              <a:spcAft>
-                <a:spcPts val="800"/>
-              </a:spcAft>
-              <a:buClr>
-                <a:srgbClr val="434343"/>
-              </a:buClr>
-              <a:buSzPts val="1400"/>
-              <a:buFont typeface="Arial"/>
-              <a:buChar char="■"/>
-              <a:defRPr sz="1400" b="0" i="0" u="none" strike="noStrike" cap="none">
-                <a:solidFill>
-                  <a:srgbClr val="434343"/>
-                </a:solidFill>
-                <a:latin typeface="Arial"/>
-                <a:ea typeface="Arial"/>
-                <a:cs typeface="Arial"/>
-                <a:sym typeface="Arial"/>
-              </a:defRPr>
-            </a:lvl9pPr>
-          </a:lstStyle>
-          <a:p>
-            <a:pPr indent="-317500">
-              <a:buSzPts val="1400"/>
-            </a:pPr>
-            <a:r>
-              <a:rPr lang="en-US" u="sng" dirty="0">
-                <a:solidFill>
-                  <a:schemeClr val="hlink"/>
-                </a:solidFill>
-                <a:hlinkClick r:id="rId3"/>
-              </a:rPr>
-              <a:t>Community Repository</a:t>
-            </a:r>
-            <a:r>
-              <a:rPr lang="en-US" dirty="0"/>
-              <a:t>: Meeting Minutes, and Schedule</a:t>
-            </a:r>
-          </a:p>
-          <a:p>
-            <a:pPr indent="-317500">
-              <a:buSzPts val="1400"/>
-            </a:pPr>
-            <a:r>
-              <a:rPr lang="en-US" u="sng" dirty="0">
-                <a:solidFill>
-                  <a:schemeClr val="hlink"/>
-                </a:solidFill>
-                <a:hlinkClick r:id="rId3"/>
-              </a:rPr>
-              <a:t>meta-</a:t>
-            </a:r>
-            <a:r>
-              <a:rPr lang="en-US" u="sng" dirty="0" err="1">
-                <a:solidFill>
-                  <a:schemeClr val="hlink"/>
-                </a:solidFill>
-                <a:hlinkClick r:id="rId3"/>
-              </a:rPr>
-              <a:t>sgl</a:t>
-            </a:r>
-            <a:r>
-              <a:rPr lang="en-US" dirty="0"/>
-              <a:t>: Linux Distro repository</a:t>
-            </a:r>
-          </a:p>
-          <a:p>
-            <a:pPr indent="-317500">
-              <a:buSzPts val="1400"/>
-            </a:pPr>
-            <a:r>
-              <a:rPr lang="en-US" u="sng" dirty="0">
-                <a:solidFill>
-                  <a:schemeClr val="hlink"/>
-                </a:solidFill>
-                <a:hlinkClick r:id="rId4"/>
-              </a:rPr>
-              <a:t>Website</a:t>
-            </a:r>
-            <a:r>
-              <a:rPr lang="en-US" dirty="0"/>
-              <a:t>: Landing Page with all the info on the SIG including the mailing list</a:t>
-            </a:r>
-          </a:p>
-          <a:p>
-            <a:pPr indent="-317500">
-              <a:buSzPts val="1400"/>
-            </a:pPr>
-            <a:r>
-              <a:rPr lang="en-US" u="sng" dirty="0">
-                <a:solidFill>
-                  <a:schemeClr val="hlink"/>
-                </a:solidFill>
-                <a:hlinkClick r:id="rId5"/>
-              </a:rPr>
-              <a:t>SGL Workshop Videos</a:t>
-            </a:r>
-            <a:r>
-              <a:rPr lang="en-US" dirty="0"/>
-              <a:t>: YouTube Playlist with all the videos from the first Workshop at Goddard Space Flight Center</a:t>
-            </a:r>
-          </a:p>
-          <a:p>
-            <a:pPr indent="-317500">
-              <a:buSzPts val="1400"/>
-            </a:pPr>
-            <a:r>
-              <a:rPr lang="en-US" dirty="0">
-                <a:hlinkClick r:id="rId6"/>
-              </a:rPr>
-              <a:t>Aerospace WG website </a:t>
-            </a:r>
-            <a:r>
-              <a:rPr lang="en-US" dirty="0"/>
-              <a:t>(mailing list / meetings)</a:t>
-            </a:r>
-          </a:p>
-        </p:txBody>
-      </p:sp>
-      <p:pic>
-        <p:nvPicPr>
-          <p:cNvPr id="7" name="Picture 6">
-            <a:extLst>
-              <a:ext uri="{FF2B5EF4-FFF2-40B4-BE49-F238E27FC236}">
-                <a16:creationId xmlns:a16="http://schemas.microsoft.com/office/drawing/2014/main" id="{B0D45002-4D3D-1F59-4063-848533EC6519}"/>
-              </a:ext>
-            </a:extLst>
-          </p:cNvPr>
-          <p:cNvPicPr>
-            <a:picLocks noChangeAspect="1"/>
-          </p:cNvPicPr>
-          <p:nvPr/>
-        </p:nvPicPr>
-        <p:blipFill>
-          <a:blip r:embed="rId7"/>
-          <a:stretch>
-            <a:fillRect/>
-          </a:stretch>
-        </p:blipFill>
-        <p:spPr>
-          <a:xfrm>
-            <a:off x="7024642" y="445025"/>
-            <a:ext cx="1339821" cy="1339821"/>
-          </a:xfrm>
-          <a:prstGeom prst="rect">
-            <a:avLst/>
-          </a:prstGeom>
-        </p:spPr>
-      </p:pic>
-      <p:pic>
-        <p:nvPicPr>
-          <p:cNvPr id="9" name="Picture 8">
-            <a:extLst>
-              <a:ext uri="{FF2B5EF4-FFF2-40B4-BE49-F238E27FC236}">
-                <a16:creationId xmlns:a16="http://schemas.microsoft.com/office/drawing/2014/main" id="{66278772-5B3C-DB3F-C195-BC33DAEBE297}"/>
-              </a:ext>
-            </a:extLst>
-          </p:cNvPr>
-          <p:cNvPicPr>
-            <a:picLocks noChangeAspect="1"/>
-          </p:cNvPicPr>
-          <p:nvPr/>
-        </p:nvPicPr>
-        <p:blipFill>
-          <a:blip r:embed="rId8"/>
-          <a:stretch>
-            <a:fillRect/>
-          </a:stretch>
-        </p:blipFill>
-        <p:spPr>
-          <a:xfrm>
-            <a:off x="6735707" y="2357546"/>
-            <a:ext cx="2096593" cy="2571749"/>
-          </a:xfrm>
-          <a:prstGeom prst="rect">
-            <a:avLst/>
-          </a:prstGeom>
-        </p:spPr>
-      </p:pic>
-    </p:spTree>
-    <p:extLst>
-      <p:ext uri="{BB962C8B-B14F-4D97-AF65-F5344CB8AC3E}">
-        <p14:creationId xmlns:p14="http://schemas.microsoft.com/office/powerpoint/2010/main" val="1215439811"/>
-      </p:ext>
-    </p:extLst>
-  </p:cSld>
-  <p:clrMapOvr>
-    <a:masterClrMapping/>
-  </p:clrMapOvr>
-</p:sld>
-</file>
-
-<file path=ppt/slides/slide12.xml><?xml version="1.0" encoding="utf-8"?>
-<p:sld xmlns:a="http://schemas.openxmlformats.org/drawingml/2006/main" xmlns:r="http://schemas.openxmlformats.org/officeDocument/2006/relationships" xmlns:p="http://schemas.openxmlformats.org/presentationml/2006/main">
-  <p:cSld>
-    <p:spTree>
-      <p:nvGrpSpPr>
-        <p:cNvPr id="1" name="Shape 48"/>
-        <p:cNvGrpSpPr/>
-        <p:nvPr/>
-      </p:nvGrpSpPr>
-      <p:grpSpPr>
-        <a:xfrm>
-          <a:off x="0" y="0"/>
-          <a:ext cx="0" cy="0"/>
-          <a:chOff x="0" y="0"/>
-          <a:chExt cx="0" cy="0"/>
-        </a:xfrm>
-      </p:grpSpPr>
-      <p:sp>
-        <p:nvSpPr>
-          <p:cNvPr id="49" name="Google Shape;49;p9"/>
-          <p:cNvSpPr txBox="1">
-            <a:spLocks noGrp="1"/>
-          </p:cNvSpPr>
-          <p:nvPr>
-            <p:ph type="ctrTitle"/>
-          </p:nvPr>
-        </p:nvSpPr>
-        <p:spPr>
-          <a:xfrm>
-            <a:off x="319500" y="1783775"/>
-            <a:ext cx="8505000" cy="1827600"/>
-          </a:xfrm>
-          <a:prstGeom prst="rect">
-            <a:avLst/>
-          </a:prstGeom>
-        </p:spPr>
-        <p:txBody>
-          <a:bodyPr spcFirstLastPara="1" wrap="square" lIns="91425" tIns="91425" rIns="91425" bIns="91425" anchor="ctr" anchorCtr="0">
-            <a:noAutofit/>
-          </a:bodyPr>
-          <a:lstStyle/>
-          <a:p>
-            <a:pPr marL="0" lvl="0" indent="0" algn="ctr" rtl="0">
-              <a:spcBef>
-                <a:spcPts val="0"/>
-              </a:spcBef>
-              <a:spcAft>
-                <a:spcPts val="0"/>
-              </a:spcAft>
-              <a:buNone/>
-            </a:pPr>
-            <a:r>
-              <a:rPr lang="en-US" dirty="0"/>
-              <a:t>Thank you for attending!</a:t>
-            </a:r>
-            <a:endParaRPr dirty="0"/>
-          </a:p>
-        </p:txBody>
-      </p:sp>
-    </p:spTree>
-  </p:cSld>
-  <p:clrMapOvr>
-    <a:masterClrMapping/>
-  </p:clrMapOvr>
-</p:sld>
-</file>
-
 <file path=ppt/slides/slide2.xml><?xml version="1.0" encoding="utf-8"?>
 <p:sld xmlns:a="http://schemas.openxmlformats.org/drawingml/2006/main" xmlns:r="http://schemas.openxmlformats.org/officeDocument/2006/relationships" xmlns:p="http://schemas.openxmlformats.org/presentationml/2006/main">
   <p:cSld>
@@ -9024,29 +7838,21 @@
             </a:pPr>
             <a:r>
               <a:rPr lang="en-US" dirty="0"/>
-              <a:t>See our annual briefing for more details on 2024 and plans for 2025 </a:t>
+              <a:t>See our annual briefing for more 2024 details and plans for 2025 </a:t>
             </a:r>
-          </a:p>
-          <a:p>
-            <a:pPr marL="0" lvl="0" indent="0" algn="l" rtl="0">
-              <a:spcBef>
-                <a:spcPts val="0"/>
-              </a:spcBef>
-              <a:spcAft>
-                <a:spcPts val="800"/>
-              </a:spcAft>
-              <a:buNone/>
-            </a:pPr>
+            <a:br>
+              <a:rPr lang="en-US" dirty="0"/>
+            </a:br>
             <a:endParaRPr i="1" dirty="0"/>
           </a:p>
         </p:txBody>
       </p:sp>
       <p:pic>
         <p:nvPicPr>
-          <p:cNvPr id="2" name="Picture 1">
+          <p:cNvPr id="4" name="Picture 3">
             <a:extLst>
               <a:ext uri="{FF2B5EF4-FFF2-40B4-BE49-F238E27FC236}">
-                <a16:creationId xmlns:a16="http://schemas.microsoft.com/office/drawing/2014/main" id="{D9297D94-A2F8-FF5D-3704-FD43407FFE4A}"/>
+                <a16:creationId xmlns:a16="http://schemas.microsoft.com/office/drawing/2014/main" id="{351EB104-F3F1-6301-DC50-966144D37200}"/>
               </a:ext>
             </a:extLst>
           </p:cNvPr>
@@ -9063,14 +7869,68 @@
         </p:blipFill>
         <p:spPr>
           <a:xfrm>
-            <a:off x="7444490" y="3136925"/>
-            <a:ext cx="854100" cy="854100"/>
+            <a:off x="7085847" y="2987551"/>
+            <a:ext cx="898716" cy="898716"/>
           </a:xfrm>
           <a:prstGeom prst="rect">
             <a:avLst/>
           </a:prstGeom>
         </p:spPr>
       </p:pic>
+      <p:sp>
+        <p:nvSpPr>
+          <p:cNvPr id="6" name="TextBox 5">
+            <a:extLst>
+              <a:ext uri="{FF2B5EF4-FFF2-40B4-BE49-F238E27FC236}">
+                <a16:creationId xmlns:a16="http://schemas.microsoft.com/office/drawing/2014/main" id="{97CAFC62-3F6D-007E-BE8F-C1CE95BE53CD}"/>
+              </a:ext>
+            </a:extLst>
+          </p:cNvPr>
+          <p:cNvSpPr txBox="1"/>
+          <p:nvPr/>
+        </p:nvSpPr>
+        <p:spPr>
+          <a:xfrm>
+            <a:off x="7085848" y="3860220"/>
+            <a:ext cx="1171254" cy="369332"/>
+          </a:xfrm>
+          <a:prstGeom prst="rect">
+            <a:avLst/>
+          </a:prstGeom>
+          <a:noFill/>
+        </p:spPr>
+        <p:txBody>
+          <a:bodyPr wrap="square">
+            <a:spAutoFit/>
+          </a:bodyPr>
+          <a:lstStyle/>
+          <a:p>
+            <a:pPr marL="0" indent="0">
+              <a:spcAft>
+                <a:spcPts val="800"/>
+              </a:spcAft>
+              <a:buNone/>
+            </a:pPr>
+            <a:r>
+              <a:rPr lang="en-US" sz="900" dirty="0">
+                <a:hlinkClick r:id="rId4"/>
+              </a:rPr>
+              <a:t>(Slides)</a:t>
+            </a:r>
+            <a:r>
+              <a:rPr lang="en-US" sz="900" dirty="0"/>
+              <a:t>    </a:t>
+            </a:r>
+            <a:r>
+              <a:rPr lang="en-US" sz="900" dirty="0">
+                <a:hlinkClick r:id="rId5"/>
+              </a:rPr>
+              <a:t>(Recordings)</a:t>
+            </a:r>
+            <a:endParaRPr lang="en-US" sz="900" dirty="0"/>
+          </a:p>
+        </p:txBody>
+      </p:sp>
     </p:spTree>
   </p:cSld>
   <p:clrMapOvr>
@@ -9165,15 +8025,15 @@
           <p:nvPr/>
         </p:nvPicPr>
         <p:blipFill>
-          <a:blip r:embed="rId4"/>
+          <a:blip r:embed="rId3"/>
           <a:stretch>
             <a:fillRect/>
           </a:stretch>
         </p:blipFill>
         <p:spPr>
           <a:xfrm>
-            <a:off x="8092395" y="4246786"/>
-            <a:ext cx="821021" cy="821021"/>
+            <a:off x="8092395" y="4089944"/>
+            <a:ext cx="977863" cy="977863"/>
           </a:xfrm>
           <a:prstGeom prst="rect">
             <a:avLst/>
@@ -9195,7 +8055,7 @@
           <p:nvPr/>
         </p:nvPicPr>
         <p:blipFill>
-          <a:blip r:embed="rId5"/>
+          <a:blip r:embed="rId4"/>
           <a:stretch>
             <a:fillRect/>
           </a:stretch>
@@ -9245,7 +8105,7 @@
                 </a:solidFill>
                 <a:effectLst/>
                 <a:latin typeface="Red Hat Text"/>
-                <a:hlinkClick r:id="rId6"/>
+                <a:hlinkClick r:id="rId5"/>
               </a:rPr>
               <a:t>Link</a:t>
             </a:r>
@@ -9425,11 +8285,6 @@
   <p:clrMapOvr>
     <a:masterClrMapping/>
   </p:clrMapOvr>
-  <p:extLst>
-    <p:ext uri="{6950BFC3-D8DA-4A85-94F7-54DA5524770B}">
-      <p188:commentRel xmlns:p188="http://schemas.microsoft.com/office/powerpoint/2018/8/main" r:id="rId3"/>
-    </p:ext>
-  </p:extLst>
 </p:sld>
 </file>
 
@@ -9506,10 +8361,10 @@
       </p:sp>
       <p:pic>
         <p:nvPicPr>
-          <p:cNvPr id="3" name="Picture 2">
+          <p:cNvPr id="6" name="Picture 5">
             <a:extLst>
               <a:ext uri="{FF2B5EF4-FFF2-40B4-BE49-F238E27FC236}">
-                <a16:creationId xmlns:a16="http://schemas.microsoft.com/office/drawing/2014/main" id="{5E8FD90A-4097-AD32-F6D8-8BE962AE1D16}"/>
+                <a16:creationId xmlns:a16="http://schemas.microsoft.com/office/drawing/2014/main" id="{0DDFBF13-EB25-2253-A936-FB04E5EDBE64}"/>
               </a:ext>
             </a:extLst>
           </p:cNvPr>
@@ -9526,36 +8381,6 @@
         </p:blipFill>
         <p:spPr>
           <a:xfrm>
-            <a:off x="8092395" y="4246786"/>
-            <a:ext cx="821021" cy="821021"/>
-          </a:xfrm>
-          <a:prstGeom prst="rect">
-            <a:avLst/>
-          </a:prstGeom>
-        </p:spPr>
-      </p:pic>
-      <p:pic>
-        <p:nvPicPr>
-          <p:cNvPr id="6" name="Picture 5">
-            <a:extLst>
-              <a:ext uri="{FF2B5EF4-FFF2-40B4-BE49-F238E27FC236}">
-                <a16:creationId xmlns:a16="http://schemas.microsoft.com/office/drawing/2014/main" id="{0DDFBF13-EB25-2253-A936-FB04E5EDBE64}"/>
-              </a:ext>
-            </a:extLst>
-          </p:cNvPr>
-          <p:cNvPicPr>
-            <a:picLocks noChangeAspect="1"/>
-          </p:cNvPicPr>
-          <p:nvPr/>
-        </p:nvPicPr>
-        <p:blipFill>
-          <a:blip r:embed="rId4"/>
-          <a:stretch>
-            <a:fillRect/>
-          </a:stretch>
-        </p:blipFill>
-        <p:spPr>
-          <a:xfrm>
             <a:off x="6678453" y="189050"/>
             <a:ext cx="2215538" cy="963424"/>
           </a:xfrm>
@@ -9599,7 +8424,7 @@
                 </a:solidFill>
                 <a:effectLst/>
                 <a:latin typeface="Red Hat Text"/>
-                <a:hlinkClick r:id="rId5"/>
+                <a:hlinkClick r:id="rId4"/>
               </a:rPr>
               <a:t>Link</a:t>
             </a:r>
@@ -9651,7 +8476,7 @@
           <p:nvPr/>
         </p:nvPicPr>
         <p:blipFill>
-          <a:blip r:embed="rId6"/>
+          <a:blip r:embed="rId5"/>
           <a:stretch>
             <a:fillRect/>
           </a:stretch>
@@ -9681,6 +8506,36 @@
           <p:nvPr/>
         </p:nvPicPr>
         <p:blipFill>
+          <a:blip r:embed="rId6"/>
+          <a:stretch>
+            <a:fillRect/>
+          </a:stretch>
+        </p:blipFill>
+        <p:spPr>
+          <a:xfrm>
+            <a:off x="4169226" y="1358705"/>
+            <a:ext cx="4000347" cy="2835689"/>
+          </a:xfrm>
+          <a:prstGeom prst="rect">
+            <a:avLst/>
+          </a:prstGeom>
+        </p:spPr>
+      </p:pic>
+      <p:pic>
+        <p:nvPicPr>
+          <p:cNvPr id="2" name="Picture 1">
+            <a:extLst>
+              <a:ext uri="{FF2B5EF4-FFF2-40B4-BE49-F238E27FC236}">
+                <a16:creationId xmlns:a16="http://schemas.microsoft.com/office/drawing/2014/main" id="{ED297DD5-F7B3-4CCA-34A3-4BFA9086AE15}"/>
+              </a:ext>
+            </a:extLst>
+          </p:cNvPr>
+          <p:cNvPicPr>
+            <a:picLocks noChangeAspect="1"/>
+          </p:cNvPicPr>
+          <p:nvPr/>
+        </p:nvPicPr>
+        <p:blipFill>
           <a:blip r:embed="rId7"/>
           <a:stretch>
             <a:fillRect/>
@@ -9688,8 +8543,8 @@
         </p:blipFill>
         <p:spPr>
           <a:xfrm>
-            <a:off x="4169226" y="1358705"/>
-            <a:ext cx="4000347" cy="2835689"/>
+            <a:off x="8092395" y="4089944"/>
+            <a:ext cx="977863" cy="977863"/>
           </a:xfrm>
           <a:prstGeom prst="rect">
             <a:avLst/>
@@ -9801,7 +8656,7 @@
         <p:cNvPr id="1" name="Shape 53">
           <a:extLst>
             <a:ext uri="{FF2B5EF4-FFF2-40B4-BE49-F238E27FC236}">
-              <a16:creationId xmlns:a16="http://schemas.microsoft.com/office/drawing/2014/main" id="{3F6737AD-7F0B-6403-E10A-00479970E907}"/>
+              <a16:creationId xmlns:a16="http://schemas.microsoft.com/office/drawing/2014/main" id="{3FB7E49A-803A-8546-5762-9B036DFC1B36}"/>
             </a:ext>
           </a:extLst>
         </p:cNvPr>
@@ -9821,7 +8676,7 @@
           <p:cNvPr id="54" name="Google Shape;54;p10">
             <a:extLst>
               <a:ext uri="{FF2B5EF4-FFF2-40B4-BE49-F238E27FC236}">
-                <a16:creationId xmlns:a16="http://schemas.microsoft.com/office/drawing/2014/main" id="{5D200EAD-CA8C-0594-6A8D-768A8F08CE92}"/>
+                <a16:creationId xmlns:a16="http://schemas.microsoft.com/office/drawing/2014/main" id="{D1577212-D3E4-5FFD-B67E-1FAA9998D8E8}"/>
               </a:ext>
             </a:extLst>
           </p:cNvPr>
@@ -9858,7 +8713,7 @@
             </a:pPr>
             <a:r>
               <a:rPr lang="en-US" dirty="0"/>
-              <a:t>Space Grade Linux - Special Interest Group</a:t>
+              <a:t>Resources</a:t>
             </a:r>
             <a:endParaRPr dirty="0"/>
           </a:p>
@@ -9866,176 +8721,444 @@
       </p:sp>
       <p:sp>
         <p:nvSpPr>
-          <p:cNvPr id="55" name="Google Shape;55;p10">
+          <p:cNvPr id="2" name="Google Shape;165;p24">
             <a:extLst>
               <a:ext uri="{FF2B5EF4-FFF2-40B4-BE49-F238E27FC236}">
-                <a16:creationId xmlns:a16="http://schemas.microsoft.com/office/drawing/2014/main" id="{09FE027F-908C-1257-6C5A-1127C179DED5}"/>
+                <a16:creationId xmlns:a16="http://schemas.microsoft.com/office/drawing/2014/main" id="{692B0195-5BAA-928A-6C58-036B9B3736DA}"/>
               </a:ext>
             </a:extLst>
           </p:cNvPr>
           <p:cNvSpPr txBox="1">
-            <a:spLocks noGrp="1"/>
+            <a:spLocks/>
           </p:cNvSpPr>
-          <p:nvPr>
-            <p:ph type="body" idx="1"/>
-          </p:nvPr>
+          <p:nvPr/>
         </p:nvSpPr>
         <p:spPr>
           <a:xfrm>
-            <a:off x="311700" y="1152475"/>
-            <a:ext cx="8520600" cy="3050100"/>
+            <a:off x="311699" y="1041300"/>
+            <a:ext cx="5678903" cy="3060900"/>
           </a:xfrm>
           <a:prstGeom prst="rect">
             <a:avLst/>
           </a:prstGeom>
+          <a:noFill/>
+          <a:ln>
+            <a:noFill/>
+          </a:ln>
         </p:spPr>
         <p:txBody>
           <a:bodyPr spcFirstLastPara="1" wrap="square" lIns="91425" tIns="91425" rIns="91425" bIns="91425" anchor="t" anchorCtr="0">
             <a:noAutofit/>
           </a:bodyPr>
-          <a:lstStyle/>
+          <a:lstStyle>
+            <a:defPPr marR="0" lvl="0" algn="l" rtl="0">
+              <a:lnSpc>
+                <a:spcPct val="100000"/>
+              </a:lnSpc>
+              <a:spcBef>
+                <a:spcPts val="0"/>
+              </a:spcBef>
+              <a:spcAft>
+                <a:spcPts val="0"/>
+              </a:spcAft>
+            </a:defPPr>
+            <a:lvl1pPr marL="457200" marR="0" lvl="0" indent="-342900" algn="l" rtl="0">
+              <a:lnSpc>
+                <a:spcPct val="114000"/>
+              </a:lnSpc>
+              <a:spcBef>
+                <a:spcPts val="0"/>
+              </a:spcBef>
+              <a:spcAft>
+                <a:spcPts val="0"/>
+              </a:spcAft>
+              <a:buClr>
+                <a:srgbClr val="434343"/>
+              </a:buClr>
+              <a:buSzPts val="1800"/>
+              <a:buFont typeface="Arial"/>
+              <a:buChar char="●"/>
+              <a:defRPr sz="1800" b="0" i="0" u="none" strike="noStrike" cap="none">
+                <a:solidFill>
+                  <a:srgbClr val="434343"/>
+                </a:solidFill>
+                <a:latin typeface="Arial"/>
+                <a:ea typeface="Arial"/>
+                <a:cs typeface="Arial"/>
+                <a:sym typeface="Arial"/>
+              </a:defRPr>
+            </a:lvl1pPr>
+            <a:lvl2pPr marL="914400" marR="0" lvl="1" indent="-317500" algn="l" rtl="0">
+              <a:lnSpc>
+                <a:spcPct val="114000"/>
+              </a:lnSpc>
+              <a:spcBef>
+                <a:spcPts val="800"/>
+              </a:spcBef>
+              <a:spcAft>
+                <a:spcPts val="0"/>
+              </a:spcAft>
+              <a:buClr>
+                <a:srgbClr val="434343"/>
+              </a:buClr>
+              <a:buSzPts val="1400"/>
+              <a:buFont typeface="Arial"/>
+              <a:buChar char="○"/>
+              <a:defRPr sz="1400" b="0" i="0" u="none" strike="noStrike" cap="none">
+                <a:solidFill>
+                  <a:srgbClr val="434343"/>
+                </a:solidFill>
+                <a:latin typeface="Arial"/>
+                <a:ea typeface="Arial"/>
+                <a:cs typeface="Arial"/>
+                <a:sym typeface="Arial"/>
+              </a:defRPr>
+            </a:lvl2pPr>
+            <a:lvl3pPr marL="1371600" marR="0" lvl="2" indent="-317500" algn="l" rtl="0">
+              <a:lnSpc>
+                <a:spcPct val="114000"/>
+              </a:lnSpc>
+              <a:spcBef>
+                <a:spcPts val="800"/>
+              </a:spcBef>
+              <a:spcAft>
+                <a:spcPts val="0"/>
+              </a:spcAft>
+              <a:buClr>
+                <a:srgbClr val="434343"/>
+              </a:buClr>
+              <a:buSzPts val="1400"/>
+              <a:buFont typeface="Arial"/>
+              <a:buChar char="■"/>
+              <a:defRPr sz="1400" b="0" i="0" u="none" strike="noStrike" cap="none">
+                <a:solidFill>
+                  <a:srgbClr val="434343"/>
+                </a:solidFill>
+                <a:latin typeface="Arial"/>
+                <a:ea typeface="Arial"/>
+                <a:cs typeface="Arial"/>
+                <a:sym typeface="Arial"/>
+              </a:defRPr>
+            </a:lvl3pPr>
+            <a:lvl4pPr marL="1828800" marR="0" lvl="3" indent="-317500" algn="l" rtl="0">
+              <a:lnSpc>
+                <a:spcPct val="114000"/>
+              </a:lnSpc>
+              <a:spcBef>
+                <a:spcPts val="800"/>
+              </a:spcBef>
+              <a:spcAft>
+                <a:spcPts val="0"/>
+              </a:spcAft>
+              <a:buClr>
+                <a:srgbClr val="434343"/>
+              </a:buClr>
+              <a:buSzPts val="1400"/>
+              <a:buFont typeface="Arial"/>
+              <a:buChar char="●"/>
+              <a:defRPr sz="1400" b="0" i="0" u="none" strike="noStrike" cap="none">
+                <a:solidFill>
+                  <a:srgbClr val="434343"/>
+                </a:solidFill>
+                <a:latin typeface="Arial"/>
+                <a:ea typeface="Arial"/>
+                <a:cs typeface="Arial"/>
+                <a:sym typeface="Arial"/>
+              </a:defRPr>
+            </a:lvl4pPr>
+            <a:lvl5pPr marL="2286000" marR="0" lvl="4" indent="-317500" algn="l" rtl="0">
+              <a:lnSpc>
+                <a:spcPct val="114000"/>
+              </a:lnSpc>
+              <a:spcBef>
+                <a:spcPts val="800"/>
+              </a:spcBef>
+              <a:spcAft>
+                <a:spcPts val="0"/>
+              </a:spcAft>
+              <a:buClr>
+                <a:srgbClr val="434343"/>
+              </a:buClr>
+              <a:buSzPts val="1400"/>
+              <a:buFont typeface="Arial"/>
+              <a:buChar char="○"/>
+              <a:defRPr sz="1400" b="0" i="0" u="none" strike="noStrike" cap="none">
+                <a:solidFill>
+                  <a:srgbClr val="434343"/>
+                </a:solidFill>
+                <a:latin typeface="Arial"/>
+                <a:ea typeface="Arial"/>
+                <a:cs typeface="Arial"/>
+                <a:sym typeface="Arial"/>
+              </a:defRPr>
+            </a:lvl5pPr>
+            <a:lvl6pPr marL="2743200" marR="0" lvl="5" indent="-317500" algn="l" rtl="0">
+              <a:lnSpc>
+                <a:spcPct val="114000"/>
+              </a:lnSpc>
+              <a:spcBef>
+                <a:spcPts val="800"/>
+              </a:spcBef>
+              <a:spcAft>
+                <a:spcPts val="0"/>
+              </a:spcAft>
+              <a:buClr>
+                <a:srgbClr val="434343"/>
+              </a:buClr>
+              <a:buSzPts val="1400"/>
+              <a:buFont typeface="Arial"/>
+              <a:buChar char="■"/>
+              <a:defRPr sz="1400" b="0" i="0" u="none" strike="noStrike" cap="none">
+                <a:solidFill>
+                  <a:srgbClr val="434343"/>
+                </a:solidFill>
+                <a:latin typeface="Arial"/>
+                <a:ea typeface="Arial"/>
+                <a:cs typeface="Arial"/>
+                <a:sym typeface="Arial"/>
+              </a:defRPr>
+            </a:lvl6pPr>
+            <a:lvl7pPr marL="3200400" marR="0" lvl="6" indent="-317500" algn="l" rtl="0">
+              <a:lnSpc>
+                <a:spcPct val="114000"/>
+              </a:lnSpc>
+              <a:spcBef>
+                <a:spcPts val="800"/>
+              </a:spcBef>
+              <a:spcAft>
+                <a:spcPts val="0"/>
+              </a:spcAft>
+              <a:buClr>
+                <a:srgbClr val="434343"/>
+              </a:buClr>
+              <a:buSzPts val="1400"/>
+              <a:buFont typeface="Arial"/>
+              <a:buChar char="●"/>
+              <a:defRPr sz="1400" b="0" i="0" u="none" strike="noStrike" cap="none">
+                <a:solidFill>
+                  <a:srgbClr val="434343"/>
+                </a:solidFill>
+                <a:latin typeface="Arial"/>
+                <a:ea typeface="Arial"/>
+                <a:cs typeface="Arial"/>
+                <a:sym typeface="Arial"/>
+              </a:defRPr>
+            </a:lvl7pPr>
+            <a:lvl8pPr marL="3657600" marR="0" lvl="7" indent="-317500" algn="l" rtl="0">
+              <a:lnSpc>
+                <a:spcPct val="114000"/>
+              </a:lnSpc>
+              <a:spcBef>
+                <a:spcPts val="800"/>
+              </a:spcBef>
+              <a:spcAft>
+                <a:spcPts val="0"/>
+              </a:spcAft>
+              <a:buClr>
+                <a:srgbClr val="434343"/>
+              </a:buClr>
+              <a:buSzPts val="1400"/>
+              <a:buFont typeface="Arial"/>
+              <a:buChar char="○"/>
+              <a:defRPr sz="1400" b="0" i="0" u="none" strike="noStrike" cap="none">
+                <a:solidFill>
+                  <a:srgbClr val="434343"/>
+                </a:solidFill>
+                <a:latin typeface="Arial"/>
+                <a:ea typeface="Arial"/>
+                <a:cs typeface="Arial"/>
+                <a:sym typeface="Arial"/>
+              </a:defRPr>
+            </a:lvl8pPr>
+            <a:lvl9pPr marL="4114800" marR="0" lvl="8" indent="-317500" algn="l" rtl="0">
+              <a:lnSpc>
+                <a:spcPct val="114000"/>
+              </a:lnSpc>
+              <a:spcBef>
+                <a:spcPts val="800"/>
+              </a:spcBef>
+              <a:spcAft>
+                <a:spcPts val="800"/>
+              </a:spcAft>
+              <a:buClr>
+                <a:srgbClr val="434343"/>
+              </a:buClr>
+              <a:buSzPts val="1400"/>
+              <a:buFont typeface="Arial"/>
+              <a:buChar char="■"/>
+              <a:defRPr sz="1400" b="0" i="0" u="none" strike="noStrike" cap="none">
+                <a:solidFill>
+                  <a:srgbClr val="434343"/>
+                </a:solidFill>
+                <a:latin typeface="Arial"/>
+                <a:ea typeface="Arial"/>
+                <a:cs typeface="Arial"/>
+                <a:sym typeface="Arial"/>
+              </a:defRPr>
+            </a:lvl9pPr>
+          </a:lstStyle>
           <a:p>
-            <a:pPr marL="0" lvl="0" indent="0" algn="l" rtl="0">
-              <a:spcBef>
-                <a:spcPts val="0"/>
-              </a:spcBef>
-              <a:spcAft>
-                <a:spcPts val="800"/>
-              </a:spcAft>
-              <a:buNone/>
+            <a:pPr indent="-317500">
+              <a:buSzPts val="1400"/>
             </a:pPr>
             <a:r>
-              <a:rPr lang="en-US" sz="1600" i="1" dirty="0"/>
-              <a:t>“… is to advance space technology innovation and competitiveness by developing a common Linux distribution that can be used in space applications, ready for the challenges of deep space, often long lifespan robotic or human-based missions. The nature of space missions brings many challenges, from development to deployment there are multiple considerations that need to be considered. Furthermore this group is the initial step towards creating an ecosystem of supported platforms and a community that benefits from them, and also from the open source nature of the project.”</a:t>
+              <a:rPr lang="en-US" u="sng" dirty="0">
+                <a:solidFill>
+                  <a:schemeClr val="hlink"/>
+                </a:solidFill>
+                <a:hlinkClick r:id="rId3"/>
+              </a:rPr>
+              <a:t>Community Repository</a:t>
+            </a:r>
+            <a:r>
+              <a:rPr lang="en-US" dirty="0"/>
+              <a:t>: Meeting Minutes, and Schedule</a:t>
             </a:r>
           </a:p>
           <a:p>
-            <a:pPr marL="0" lvl="0" indent="0" algn="l" rtl="0">
-              <a:spcBef>
-                <a:spcPts val="0"/>
-              </a:spcBef>
-              <a:spcAft>
-                <a:spcPts val="800"/>
-              </a:spcAft>
-              <a:buNone/>
-            </a:pPr>
-            <a:endParaRPr lang="en-US" dirty="0"/>
-          </a:p>
-          <a:p>
-            <a:pPr marL="0" indent="0">
-              <a:spcAft>
-                <a:spcPts val="800"/>
-              </a:spcAft>
-              <a:buNone/>
+            <a:pPr indent="-317500">
+              <a:buSzPts val="1400"/>
             </a:pPr>
             <a:r>
+              <a:rPr lang="en-US" u="sng" dirty="0">
+                <a:solidFill>
+                  <a:schemeClr val="hlink"/>
+                </a:solidFill>
+                <a:hlinkClick r:id="rId3"/>
+              </a:rPr>
+              <a:t>meta-</a:t>
+            </a:r>
+            <a:r>
+              <a:rPr lang="en-US" u="sng" dirty="0" err="1">
+                <a:solidFill>
+                  <a:schemeClr val="hlink"/>
+                </a:solidFill>
+                <a:hlinkClick r:id="rId3"/>
+              </a:rPr>
+              <a:t>sgl</a:t>
+            </a:r>
+            <a:r>
               <a:rPr lang="en-US" dirty="0"/>
-              <a:t>See our annual briefing for more details on 2024 and plans for 2025 </a:t>
+              <a:t>: Linux Distro repository</a:t>
             </a:r>
           </a:p>
           <a:p>
-            <a:pPr marL="0" lvl="0" indent="0" algn="l" rtl="0">
-              <a:spcBef>
-                <a:spcPts val="0"/>
-              </a:spcBef>
-              <a:spcAft>
-                <a:spcPts val="800"/>
-              </a:spcAft>
-              <a:buNone/>
+            <a:pPr indent="-317500">
+              <a:buSzPts val="1400"/>
             </a:pPr>
-            <a:endParaRPr i="1" dirty="0"/>
+            <a:r>
+              <a:rPr lang="en-US" u="sng" dirty="0">
+                <a:solidFill>
+                  <a:schemeClr val="hlink"/>
+                </a:solidFill>
+                <a:hlinkClick r:id="rId4"/>
+              </a:rPr>
+              <a:t>Website</a:t>
+            </a:r>
+            <a:r>
+              <a:rPr lang="en-US" dirty="0"/>
+              <a:t>: Landing Page with all the info on the SIG including the mailing list</a:t>
+            </a:r>
+          </a:p>
+          <a:p>
+            <a:pPr indent="-317500">
+              <a:buSzPts val="1400"/>
+            </a:pPr>
+            <a:r>
+              <a:rPr lang="en-US" u="sng" dirty="0">
+                <a:solidFill>
+                  <a:schemeClr val="hlink"/>
+                </a:solidFill>
+                <a:hlinkClick r:id="rId5"/>
+              </a:rPr>
+              <a:t>SGL Workshop Videos</a:t>
+            </a:r>
+            <a:r>
+              <a:rPr lang="en-US" dirty="0"/>
+              <a:t>: YouTube Playlist with all the videos from the first Workshop at Goddard Space Flight Center</a:t>
+            </a:r>
+          </a:p>
+          <a:p>
+            <a:pPr indent="-317500">
+              <a:buSzPts val="1400"/>
+            </a:pPr>
+            <a:r>
+              <a:rPr lang="en-US" dirty="0">
+                <a:hlinkClick r:id="rId6"/>
+              </a:rPr>
+              <a:t>Aerospace WG website </a:t>
+            </a:r>
+            <a:r>
+              <a:rPr lang="en-US" dirty="0"/>
+              <a:t>(mailing list / meetings)</a:t>
+            </a:r>
           </a:p>
         </p:txBody>
       </p:sp>
-      <p:sp>
-        <p:nvSpPr>
-          <p:cNvPr id="3" name="TextBox 2">
+      <p:pic>
+        <p:nvPicPr>
+          <p:cNvPr id="7" name="Picture 6">
             <a:extLst>
               <a:ext uri="{FF2B5EF4-FFF2-40B4-BE49-F238E27FC236}">
-                <a16:creationId xmlns:a16="http://schemas.microsoft.com/office/drawing/2014/main" id="{3B0265BA-CC13-AAD2-7DD1-03D188215C12}"/>
+                <a16:creationId xmlns:a16="http://schemas.microsoft.com/office/drawing/2014/main" id="{B0D45002-4D3D-1F59-4063-848533EC6519}"/>
               </a:ext>
             </a:extLst>
           </p:cNvPr>
-          <p:cNvSpPr txBox="1"/>
+          <p:cNvPicPr>
+            <a:picLocks noChangeAspect="1"/>
+          </p:cNvPicPr>
           <p:nvPr/>
-        </p:nvSpPr>
-        <p:spPr>
-          <a:xfrm>
-            <a:off x="7377647" y="3391256"/>
-            <a:ext cx="1603983" cy="745653"/>
+        </p:nvPicPr>
+        <p:blipFill>
+          <a:blip r:embed="rId7"/>
+          <a:stretch>
+            <a:fillRect/>
+          </a:stretch>
+        </p:blipFill>
+        <p:spPr>
+          <a:xfrm>
+            <a:off x="6788184" y="445025"/>
+            <a:ext cx="1576280" cy="1576280"/>
           </a:xfrm>
           <a:prstGeom prst="rect">
             <a:avLst/>
           </a:prstGeom>
-          <a:noFill/>
-        </p:spPr>
-        <p:txBody>
-          <a:bodyPr wrap="square">
-            <a:spAutoFit/>
-          </a:bodyPr>
-          <a:lstStyle/>
-          <a:p>
-            <a:pPr algn="l" fontAlgn="base">
-              <a:lnSpc>
-                <a:spcPts val="2700"/>
-              </a:lnSpc>
-              <a:spcAft>
-                <a:spcPts val="600"/>
-              </a:spcAft>
-            </a:pPr>
-            <a:r>
-              <a:rPr lang="en-US" b="1" dirty="0">
-                <a:solidFill>
-                  <a:srgbClr val="444444"/>
-                </a:solidFill>
-                <a:highlight>
-                  <a:srgbClr val="FFFF00"/>
-                </a:highlight>
-                <a:latin typeface="Red Hat Text"/>
-              </a:rPr>
-              <a:t>&lt;&lt;Insert </a:t>
-            </a:r>
-            <a:r>
-              <a:rPr lang="en-US" b="1" dirty="0" err="1">
-                <a:solidFill>
-                  <a:srgbClr val="444444"/>
-                </a:solidFill>
-                <a:highlight>
-                  <a:srgbClr val="FFFF00"/>
-                </a:highlight>
-                <a:latin typeface="Red Hat Text"/>
-              </a:rPr>
-              <a:t>Qrcode</a:t>
-            </a:r>
-            <a:r>
-              <a:rPr lang="en-US" b="1" dirty="0">
-                <a:solidFill>
-                  <a:srgbClr val="444444"/>
-                </a:solidFill>
-                <a:highlight>
-                  <a:srgbClr val="FFFF00"/>
-                </a:highlight>
-                <a:latin typeface="Red Hat Text"/>
-              </a:rPr>
-              <a:t> here&gt;&gt;</a:t>
-            </a:r>
-            <a:endParaRPr lang="en-US" b="0" i="0" dirty="0">
-              <a:solidFill>
-                <a:srgbClr val="676767"/>
-              </a:solidFill>
-              <a:effectLst/>
-              <a:highlight>
-                <a:srgbClr val="FFFF00"/>
-              </a:highlight>
-              <a:latin typeface="Red Hat Text"/>
-            </a:endParaRPr>
-          </a:p>
-        </p:txBody>
-      </p:sp>
+        </p:spPr>
+      </p:pic>
+      <p:pic>
+        <p:nvPicPr>
+          <p:cNvPr id="9" name="Picture 8">
+            <a:extLst>
+              <a:ext uri="{FF2B5EF4-FFF2-40B4-BE49-F238E27FC236}">
+                <a16:creationId xmlns:a16="http://schemas.microsoft.com/office/drawing/2014/main" id="{66278772-5B3C-DB3F-C195-BC33DAEBE297}"/>
+              </a:ext>
+            </a:extLst>
+          </p:cNvPr>
+          <p:cNvPicPr>
+            <a:picLocks noChangeAspect="1"/>
+          </p:cNvPicPr>
+          <p:nvPr/>
+        </p:nvPicPr>
+        <p:blipFill>
+          <a:blip r:embed="rId8"/>
+          <a:stretch>
+            <a:fillRect/>
+          </a:stretch>
+        </p:blipFill>
+        <p:spPr>
+          <a:xfrm>
+            <a:off x="6735707" y="2357546"/>
+            <a:ext cx="2096593" cy="2571749"/>
+          </a:xfrm>
+          <a:prstGeom prst="rect">
+            <a:avLst/>
+          </a:prstGeom>
+        </p:spPr>
+      </p:pic>
     </p:spTree>
     <p:extLst>
       <p:ext uri="{BB962C8B-B14F-4D97-AF65-F5344CB8AC3E}">
-        <p14:creationId xmlns:p14="http://schemas.microsoft.com/office/powerpoint/2010/main" val="2723828867"/>
+        <p14:creationId xmlns:p14="http://schemas.microsoft.com/office/powerpoint/2010/main" val="1215439811"/>
       </p:ext>
     </p:extLst>
   </p:cSld>
@@ -10050,13 +9173,7 @@
   <p:cSld>
     <p:spTree>
       <p:nvGrpSpPr>
-        <p:cNvPr id="1" name="Shape 53">
-          <a:extLst>
-            <a:ext uri="{FF2B5EF4-FFF2-40B4-BE49-F238E27FC236}">
-              <a16:creationId xmlns:a16="http://schemas.microsoft.com/office/drawing/2014/main" id="{860C75AA-5A79-AC57-6847-214892B601F2}"/>
-            </a:ext>
-          </a:extLst>
-        </p:cNvPr>
+        <p:cNvPr id="1" name="Shape 48"/>
         <p:cNvGrpSpPr/>
         <p:nvPr/>
       </p:nvGrpSpPr>
@@ -10070,36 +9187,30 @@
       </p:grpSpPr>
       <p:sp>
         <p:nvSpPr>
-          <p:cNvPr id="54" name="Google Shape;54;p10">
-            <a:extLst>
-              <a:ext uri="{FF2B5EF4-FFF2-40B4-BE49-F238E27FC236}">
-                <a16:creationId xmlns:a16="http://schemas.microsoft.com/office/drawing/2014/main" id="{D8CF676D-9FBD-084E-0404-5261B67B3A70}"/>
-              </a:ext>
-            </a:extLst>
-          </p:cNvPr>
+          <p:cNvPr id="49" name="Google Shape;49;p9"/>
           <p:cNvSpPr txBox="1">
             <a:spLocks noGrp="1"/>
           </p:cNvSpPr>
           <p:nvPr>
-            <p:ph type="title"/>
+            <p:ph type="ctrTitle"/>
           </p:nvPr>
         </p:nvSpPr>
         <p:spPr>
           <a:xfrm>
-            <a:off x="311700" y="445025"/>
-            <a:ext cx="8520600" cy="572700"/>
+            <a:off x="319500" y="1783775"/>
+            <a:ext cx="8505000" cy="1827600"/>
           </a:xfrm>
           <a:prstGeom prst="rect">
             <a:avLst/>
           </a:prstGeom>
         </p:spPr>
         <p:txBody>
-          <a:bodyPr spcFirstLastPara="1" wrap="square" lIns="91425" tIns="91425" rIns="91425" bIns="91425" anchor="t" anchorCtr="0">
+          <a:bodyPr spcFirstLastPara="1" wrap="square" lIns="91425" tIns="91425" rIns="91425" bIns="91425" anchor="ctr" anchorCtr="0">
             <a:noAutofit/>
           </a:bodyPr>
           <a:lstStyle/>
           <a:p>
-            <a:pPr marL="0" lvl="0" indent="0" algn="l" rtl="0">
+            <a:pPr marL="0" lvl="0" indent="0" algn="ctr" rtl="0">
               <a:spcBef>
                 <a:spcPts val="0"/>
               </a:spcBef>
@@ -10110,130 +9221,17 @@
             </a:pPr>
             <a:r>
               <a:rPr lang="en-US" dirty="0"/>
-              <a:t>Space Grade Linux</a:t>
+              <a:t>Thank you for attending!</a:t>
             </a:r>
             <a:endParaRPr dirty="0"/>
           </a:p>
         </p:txBody>
       </p:sp>
-      <p:sp>
-        <p:nvSpPr>
-          <p:cNvPr id="55" name="Google Shape;55;p10">
-            <a:extLst>
-              <a:ext uri="{FF2B5EF4-FFF2-40B4-BE49-F238E27FC236}">
-                <a16:creationId xmlns:a16="http://schemas.microsoft.com/office/drawing/2014/main" id="{854A30CD-78B0-AE68-28CC-A9E3713166DA}"/>
-              </a:ext>
-            </a:extLst>
-          </p:cNvPr>
-          <p:cNvSpPr txBox="1">
-            <a:spLocks noGrp="1"/>
-          </p:cNvSpPr>
-          <p:nvPr>
-            <p:ph type="body" idx="1"/>
-          </p:nvPr>
-        </p:nvSpPr>
-        <p:spPr>
-          <a:xfrm>
-            <a:off x="311700" y="1152475"/>
-            <a:ext cx="8520600" cy="3050100"/>
-          </a:xfrm>
-          <a:prstGeom prst="rect">
-            <a:avLst/>
-          </a:prstGeom>
-        </p:spPr>
-        <p:txBody>
-          <a:bodyPr spcFirstLastPara="1" wrap="square" lIns="91425" tIns="91425" rIns="91425" bIns="91425" anchor="t" anchorCtr="0">
-            <a:noAutofit/>
-          </a:bodyPr>
-          <a:lstStyle/>
-          <a:p>
-            <a:pPr marL="0" lvl="0" indent="0" algn="l" rtl="0">
-              <a:spcBef>
-                <a:spcPts val="0"/>
-              </a:spcBef>
-              <a:spcAft>
-                <a:spcPts val="800"/>
-              </a:spcAft>
-              <a:buNone/>
-            </a:pPr>
-            <a:r>
-              <a:rPr lang="en-US" b="1" dirty="0"/>
-              <a:t>Project Goals</a:t>
-            </a:r>
-          </a:p>
-          <a:p>
-            <a:pPr marL="285750" indent="-285750">
-              <a:spcAft>
-                <a:spcPts val="800"/>
-              </a:spcAft>
-            </a:pPr>
-            <a:r>
-              <a:rPr lang="en-US" dirty="0"/>
-              <a:t>Create a Linux distribution for space missions</a:t>
-            </a:r>
-          </a:p>
-          <a:p>
-            <a:pPr marL="285750" indent="-285750">
-              <a:spcAft>
-                <a:spcPts val="800"/>
-              </a:spcAft>
-            </a:pPr>
-            <a:r>
-              <a:rPr lang="en-US" dirty="0"/>
-              <a:t>Form an ecosystem of supporting platforms for the Linux distribution</a:t>
-            </a:r>
-          </a:p>
-          <a:p>
-            <a:pPr marL="285750" indent="-285750">
-              <a:spcAft>
-                <a:spcPts val="800"/>
-              </a:spcAft>
-            </a:pPr>
-            <a:r>
-              <a:rPr lang="en-US" dirty="0"/>
-              <a:t>Form a community of like-minded industry organizations </a:t>
-            </a:r>
-          </a:p>
-          <a:p>
-            <a:pPr marL="285750" indent="-285750">
-              <a:spcAft>
-                <a:spcPts val="800"/>
-              </a:spcAft>
-            </a:pPr>
-            <a:r>
-              <a:rPr lang="en-US" dirty="0"/>
-              <a:t>Advocate for the greater use of open source and standardization within the industry</a:t>
-            </a:r>
-          </a:p>
-          <a:p>
-            <a:pPr marL="0" lvl="0" indent="0" algn="l" rtl="0">
-              <a:spcBef>
-                <a:spcPts val="0"/>
-              </a:spcBef>
-              <a:spcAft>
-                <a:spcPts val="800"/>
-              </a:spcAft>
-              <a:buNone/>
-            </a:pPr>
-            <a:endParaRPr i="1" dirty="0"/>
-          </a:p>
-        </p:txBody>
-      </p:sp>
     </p:spTree>
-    <p:extLst>
-      <p:ext uri="{BB962C8B-B14F-4D97-AF65-F5344CB8AC3E}">
-        <p14:creationId xmlns:p14="http://schemas.microsoft.com/office/powerpoint/2010/main" val="2493509469"/>
-      </p:ext>
-    </p:extLst>
   </p:cSld>
   <p:clrMapOvr>
     <a:masterClrMapping/>
   </p:clrMapOvr>
-  <p:extLst>
-    <p:ext uri="{6950BFC3-D8DA-4A85-94F7-54DA5524770B}">
-      <p188:commentRel xmlns:p188="http://schemas.microsoft.com/office/powerpoint/2018/8/main" r:id="rId3"/>
-    </p:ext>
-  </p:extLst>
 </p:sld>
 </file>
 

</xml_diff>

<commit_message>
Added Michael's mug shot
Signed-off-by: Weber (US), Matthew L <matthew.l.weber3@boeing.com>
</commit_message>
<xml_diff>
--- a/presentations/ELISA-FSW-March2025.pptx
+++ b/presentations/ELISA-FSW-March2025.pptx
@@ -5430,67 +5430,6 @@
       </p:pic>
       <p:sp>
         <p:nvSpPr>
-          <p:cNvPr id="5" name="TextBox 4">
-            <a:extLst>
-              <a:ext uri="{FF2B5EF4-FFF2-40B4-BE49-F238E27FC236}">
-                <a16:creationId xmlns:a16="http://schemas.microsoft.com/office/drawing/2014/main" id="{2ACBEF2C-7382-B8BC-5A8A-18721F2DA226}"/>
-              </a:ext>
-            </a:extLst>
-          </p:cNvPr>
-          <p:cNvSpPr txBox="1"/>
-          <p:nvPr/>
-        </p:nvSpPr>
-        <p:spPr>
-          <a:xfrm>
-            <a:off x="5925168" y="3095475"/>
-            <a:ext cx="1670017" cy="399405"/>
-          </a:xfrm>
-          <a:prstGeom prst="rect">
-            <a:avLst/>
-          </a:prstGeom>
-          <a:noFill/>
-        </p:spPr>
-        <p:txBody>
-          <a:bodyPr wrap="square">
-            <a:spAutoFit/>
-          </a:bodyPr>
-          <a:lstStyle/>
-          <a:p>
-            <a:pPr algn="l" fontAlgn="base">
-              <a:lnSpc>
-                <a:spcPts val="2700"/>
-              </a:lnSpc>
-              <a:spcAft>
-                <a:spcPts val="600"/>
-              </a:spcAft>
-            </a:pPr>
-            <a:r>
-              <a:rPr lang="en-US" b="1" dirty="0">
-                <a:solidFill>
-                  <a:srgbClr val="444444"/>
-                </a:solidFill>
-                <a:highlight>
-                  <a:srgbClr val="FFFF00"/>
-                </a:highlight>
-                <a:latin typeface="Red Hat Text"/>
-              </a:rPr>
-              <a:t>&lt;&lt;Michael’s pic&gt;&gt;</a:t>
-            </a:r>
-            <a:endParaRPr lang="en-US" b="0" i="0" dirty="0">
-              <a:solidFill>
-                <a:srgbClr val="676767"/>
-              </a:solidFill>
-              <a:effectLst/>
-              <a:highlight>
-                <a:srgbClr val="FFFF00"/>
-              </a:highlight>
-              <a:latin typeface="Red Hat Text"/>
-            </a:endParaRPr>
-          </a:p>
-        </p:txBody>
-      </p:sp>
-      <p:sp>
-        <p:nvSpPr>
           <p:cNvPr id="7" name="Google Shape;61;p11">
             <a:extLst>
               <a:ext uri="{FF2B5EF4-FFF2-40B4-BE49-F238E27FC236}">
@@ -5506,7 +5445,7 @@
         <p:spPr>
           <a:xfrm>
             <a:off x="4643924" y="1350510"/>
-            <a:ext cx="4159834" cy="2606766"/>
+            <a:ext cx="4159834" cy="1552178"/>
           </a:xfrm>
           <a:prstGeom prst="rect">
             <a:avLst/>
@@ -5803,6 +5742,36 @@
           </a:p>
         </p:txBody>
       </p:sp>
+      <p:pic>
+        <p:nvPicPr>
+          <p:cNvPr id="3" name="Picture 2">
+            <a:extLst>
+              <a:ext uri="{FF2B5EF4-FFF2-40B4-BE49-F238E27FC236}">
+                <a16:creationId xmlns:a16="http://schemas.microsoft.com/office/drawing/2014/main" id="{346B3F98-E5EC-4A5A-6C46-93B5862B8A1A}"/>
+              </a:ext>
+            </a:extLst>
+          </p:cNvPr>
+          <p:cNvPicPr>
+            <a:picLocks noChangeAspect="1"/>
+          </p:cNvPicPr>
+          <p:nvPr/>
+        </p:nvPicPr>
+        <p:blipFill>
+          <a:blip r:embed="rId4"/>
+          <a:stretch>
+            <a:fillRect/>
+          </a:stretch>
+        </p:blipFill>
+        <p:spPr>
+          <a:xfrm>
+            <a:off x="5922335" y="2484800"/>
+            <a:ext cx="1533612" cy="2190874"/>
+          </a:xfrm>
+          <a:prstGeom prst="flowChartConnector">
+            <a:avLst/>
+          </a:prstGeom>
+        </p:spPr>
+      </p:pic>
     </p:spTree>
   </p:cSld>
   <p:clrMapOvr>

</xml_diff>

<commit_message>
Slipped in Michael's old slides as a placeholder
Signed-off-by: Weber (US), Matthew L <matthew.l.weber3@boeing.com>
</commit_message>
<xml_diff>
--- a/presentations/ELISA-FSW-March2025.pptx
+++ b/presentations/ELISA-FSW-March2025.pptx
@@ -5,7 +5,7 @@
     <p:sldMasterId id="2147483654" r:id="rId1"/>
   </p:sldMasterIdLst>
   <p:notesMasterIdLst>
-    <p:notesMasterId r:id="rId11"/>
+    <p:notesMasterId r:id="rId19"/>
   </p:notesMasterIdLst>
   <p:sldIdLst>
     <p:sldId id="256" r:id="rId2"/>
@@ -15,8 +15,16 @@
     <p:sldId id="265" r:id="rId6"/>
     <p:sldId id="268" r:id="rId7"/>
     <p:sldId id="267" r:id="rId8"/>
-    <p:sldId id="270" r:id="rId9"/>
-    <p:sldId id="257" r:id="rId10"/>
+    <p:sldId id="271" r:id="rId9"/>
+    <p:sldId id="273" r:id="rId10"/>
+    <p:sldId id="274" r:id="rId11"/>
+    <p:sldId id="275" r:id="rId12"/>
+    <p:sldId id="276" r:id="rId13"/>
+    <p:sldId id="272" r:id="rId14"/>
+    <p:sldId id="277" r:id="rId15"/>
+    <p:sldId id="278" r:id="rId16"/>
+    <p:sldId id="270" r:id="rId17"/>
+    <p:sldId id="257" r:id="rId18"/>
   </p:sldIdLst>
   <p:sldSz cx="9144000" cy="5143500" type="screen16x9"/>
   <p:notesSz cx="6858000" cy="9144000"/>
@@ -819,6 +827,999 @@
 </p:notes>
 </file>
 
+<file path=ppt/notesSlides/notesSlide10.xml><?xml version="1.0" encoding="utf-8"?>
+<p:notes xmlns:a="http://schemas.openxmlformats.org/drawingml/2006/main" xmlns:r="http://schemas.openxmlformats.org/officeDocument/2006/relationships" xmlns:p="http://schemas.openxmlformats.org/presentationml/2006/main" showMasterSp="0" showMasterPhAnim="0">
+  <p:cSld>
+    <p:spTree>
+      <p:nvGrpSpPr>
+        <p:cNvPr id="1" name="Shape 45">
+          <a:extLst>
+            <a:ext uri="{FF2B5EF4-FFF2-40B4-BE49-F238E27FC236}">
+              <a16:creationId xmlns:a16="http://schemas.microsoft.com/office/drawing/2014/main" id="{4283DD1C-13BB-04FC-CB3A-6115EA3DFEB8}"/>
+            </a:ext>
+          </a:extLst>
+        </p:cNvPr>
+        <p:cNvGrpSpPr/>
+        <p:nvPr/>
+      </p:nvGrpSpPr>
+      <p:grpSpPr>
+        <a:xfrm>
+          <a:off x="0" y="0"/>
+          <a:ext cx="0" cy="0"/>
+          <a:chOff x="0" y="0"/>
+          <a:chExt cx="0" cy="0"/>
+        </a:xfrm>
+      </p:grpSpPr>
+      <p:sp>
+        <p:nvSpPr>
+          <p:cNvPr id="46" name="Google Shape;46;g5f61e1cf29_0_36:notes">
+            <a:extLst>
+              <a:ext uri="{FF2B5EF4-FFF2-40B4-BE49-F238E27FC236}">
+                <a16:creationId xmlns:a16="http://schemas.microsoft.com/office/drawing/2014/main" id="{CBC57057-20F2-FD51-193C-5A58A9D4DB1F}"/>
+              </a:ext>
+            </a:extLst>
+          </p:cNvPr>
+          <p:cNvSpPr>
+            <a:spLocks noGrp="1" noRot="1" noChangeAspect="1"/>
+          </p:cNvSpPr>
+          <p:nvPr>
+            <p:ph type="sldImg" idx="2"/>
+          </p:nvPr>
+        </p:nvSpPr>
+        <p:spPr>
+          <a:xfrm>
+            <a:off x="381000" y="685800"/>
+            <a:ext cx="6096000" cy="3429000"/>
+          </a:xfrm>
+          <a:custGeom>
+            <a:avLst/>
+            <a:gdLst/>
+            <a:ahLst/>
+            <a:cxnLst/>
+            <a:rect l="l" t="t" r="r" b="b"/>
+            <a:pathLst>
+              <a:path w="120000" h="120000" extrusionOk="0">
+                <a:moveTo>
+                  <a:pt x="0" y="0"/>
+                </a:moveTo>
+                <a:lnTo>
+                  <a:pt x="120000" y="0"/>
+                </a:lnTo>
+                <a:lnTo>
+                  <a:pt x="120000" y="120000"/>
+                </a:lnTo>
+                <a:lnTo>
+                  <a:pt x="0" y="120000"/>
+                </a:lnTo>
+                <a:close/>
+              </a:path>
+            </a:pathLst>
+          </a:custGeom>
+        </p:spPr>
+      </p:sp>
+      <p:sp>
+        <p:nvSpPr>
+          <p:cNvPr id="47" name="Google Shape;47;g5f61e1cf29_0_36:notes">
+            <a:extLst>
+              <a:ext uri="{FF2B5EF4-FFF2-40B4-BE49-F238E27FC236}">
+                <a16:creationId xmlns:a16="http://schemas.microsoft.com/office/drawing/2014/main" id="{0562154E-94BF-8C6F-A245-A14F581993A9}"/>
+              </a:ext>
+            </a:extLst>
+          </p:cNvPr>
+          <p:cNvSpPr txBox="1">
+            <a:spLocks noGrp="1"/>
+          </p:cNvSpPr>
+          <p:nvPr>
+            <p:ph type="body" idx="1"/>
+          </p:nvPr>
+        </p:nvSpPr>
+        <p:spPr>
+          <a:xfrm>
+            <a:off x="685800" y="4343400"/>
+            <a:ext cx="5486400" cy="4114800"/>
+          </a:xfrm>
+          <a:prstGeom prst="rect">
+            <a:avLst/>
+          </a:prstGeom>
+        </p:spPr>
+        <p:txBody>
+          <a:bodyPr spcFirstLastPara="1" wrap="square" lIns="91425" tIns="91425" rIns="91425" bIns="91425" anchor="t" anchorCtr="0">
+            <a:noAutofit/>
+          </a:bodyPr>
+          <a:lstStyle/>
+          <a:p>
+            <a:pPr marL="0" lvl="0" indent="0" algn="l" rtl="0">
+              <a:spcBef>
+                <a:spcPts val="0"/>
+              </a:spcBef>
+              <a:spcAft>
+                <a:spcPts val="0"/>
+              </a:spcAft>
+              <a:buNone/>
+            </a:pPr>
+            <a:endParaRPr/>
+          </a:p>
+        </p:txBody>
+      </p:sp>
+    </p:spTree>
+    <p:extLst>
+      <p:ext uri="{BB962C8B-B14F-4D97-AF65-F5344CB8AC3E}">
+        <p14:creationId xmlns:p14="http://schemas.microsoft.com/office/powerpoint/2010/main" val="4206042978"/>
+      </p:ext>
+    </p:extLst>
+  </p:cSld>
+  <p:clrMapOvr>
+    <a:masterClrMapping/>
+  </p:clrMapOvr>
+</p:notes>
+</file>
+
+<file path=ppt/notesSlides/notesSlide11.xml><?xml version="1.0" encoding="utf-8"?>
+<p:notes xmlns:a="http://schemas.openxmlformats.org/drawingml/2006/main" xmlns:r="http://schemas.openxmlformats.org/officeDocument/2006/relationships" xmlns:p="http://schemas.openxmlformats.org/presentationml/2006/main" showMasterSp="0" showMasterPhAnim="0">
+  <p:cSld>
+    <p:spTree>
+      <p:nvGrpSpPr>
+        <p:cNvPr id="1" name="Shape 45">
+          <a:extLst>
+            <a:ext uri="{FF2B5EF4-FFF2-40B4-BE49-F238E27FC236}">
+              <a16:creationId xmlns:a16="http://schemas.microsoft.com/office/drawing/2014/main" id="{8D5E7A3D-FDFB-4C91-DA05-D6B990633761}"/>
+            </a:ext>
+          </a:extLst>
+        </p:cNvPr>
+        <p:cNvGrpSpPr/>
+        <p:nvPr/>
+      </p:nvGrpSpPr>
+      <p:grpSpPr>
+        <a:xfrm>
+          <a:off x="0" y="0"/>
+          <a:ext cx="0" cy="0"/>
+          <a:chOff x="0" y="0"/>
+          <a:chExt cx="0" cy="0"/>
+        </a:xfrm>
+      </p:grpSpPr>
+      <p:sp>
+        <p:nvSpPr>
+          <p:cNvPr id="46" name="Google Shape;46;g5f61e1cf29_0_36:notes">
+            <a:extLst>
+              <a:ext uri="{FF2B5EF4-FFF2-40B4-BE49-F238E27FC236}">
+                <a16:creationId xmlns:a16="http://schemas.microsoft.com/office/drawing/2014/main" id="{F44F7A1A-8D0B-0A74-EC9C-8EDF01674185}"/>
+              </a:ext>
+            </a:extLst>
+          </p:cNvPr>
+          <p:cNvSpPr>
+            <a:spLocks noGrp="1" noRot="1" noChangeAspect="1"/>
+          </p:cNvSpPr>
+          <p:nvPr>
+            <p:ph type="sldImg" idx="2"/>
+          </p:nvPr>
+        </p:nvSpPr>
+        <p:spPr>
+          <a:xfrm>
+            <a:off x="381000" y="685800"/>
+            <a:ext cx="6096000" cy="3429000"/>
+          </a:xfrm>
+          <a:custGeom>
+            <a:avLst/>
+            <a:gdLst/>
+            <a:ahLst/>
+            <a:cxnLst/>
+            <a:rect l="l" t="t" r="r" b="b"/>
+            <a:pathLst>
+              <a:path w="120000" h="120000" extrusionOk="0">
+                <a:moveTo>
+                  <a:pt x="0" y="0"/>
+                </a:moveTo>
+                <a:lnTo>
+                  <a:pt x="120000" y="0"/>
+                </a:lnTo>
+                <a:lnTo>
+                  <a:pt x="120000" y="120000"/>
+                </a:lnTo>
+                <a:lnTo>
+                  <a:pt x="0" y="120000"/>
+                </a:lnTo>
+                <a:close/>
+              </a:path>
+            </a:pathLst>
+          </a:custGeom>
+        </p:spPr>
+      </p:sp>
+      <p:sp>
+        <p:nvSpPr>
+          <p:cNvPr id="47" name="Google Shape;47;g5f61e1cf29_0_36:notes">
+            <a:extLst>
+              <a:ext uri="{FF2B5EF4-FFF2-40B4-BE49-F238E27FC236}">
+                <a16:creationId xmlns:a16="http://schemas.microsoft.com/office/drawing/2014/main" id="{ABA55B9C-40FE-0FE6-D58D-F409BD25E925}"/>
+              </a:ext>
+            </a:extLst>
+          </p:cNvPr>
+          <p:cNvSpPr txBox="1">
+            <a:spLocks noGrp="1"/>
+          </p:cNvSpPr>
+          <p:nvPr>
+            <p:ph type="body" idx="1"/>
+          </p:nvPr>
+        </p:nvSpPr>
+        <p:spPr>
+          <a:xfrm>
+            <a:off x="685800" y="4343400"/>
+            <a:ext cx="5486400" cy="4114800"/>
+          </a:xfrm>
+          <a:prstGeom prst="rect">
+            <a:avLst/>
+          </a:prstGeom>
+        </p:spPr>
+        <p:txBody>
+          <a:bodyPr spcFirstLastPara="1" wrap="square" lIns="91425" tIns="91425" rIns="91425" bIns="91425" anchor="t" anchorCtr="0">
+            <a:noAutofit/>
+          </a:bodyPr>
+          <a:lstStyle/>
+          <a:p>
+            <a:pPr marL="0" lvl="0" indent="0" algn="l" rtl="0">
+              <a:spcBef>
+                <a:spcPts val="0"/>
+              </a:spcBef>
+              <a:spcAft>
+                <a:spcPts val="0"/>
+              </a:spcAft>
+              <a:buNone/>
+            </a:pPr>
+            <a:endParaRPr/>
+          </a:p>
+        </p:txBody>
+      </p:sp>
+    </p:spTree>
+    <p:extLst>
+      <p:ext uri="{BB962C8B-B14F-4D97-AF65-F5344CB8AC3E}">
+        <p14:creationId xmlns:p14="http://schemas.microsoft.com/office/powerpoint/2010/main" val="3359317337"/>
+      </p:ext>
+    </p:extLst>
+  </p:cSld>
+  <p:clrMapOvr>
+    <a:masterClrMapping/>
+  </p:clrMapOvr>
+</p:notes>
+</file>
+
+<file path=ppt/notesSlides/notesSlide12.xml><?xml version="1.0" encoding="utf-8"?>
+<p:notes xmlns:a="http://schemas.openxmlformats.org/drawingml/2006/main" xmlns:r="http://schemas.openxmlformats.org/officeDocument/2006/relationships" xmlns:p="http://schemas.openxmlformats.org/presentationml/2006/main" showMasterSp="0" showMasterPhAnim="0">
+  <p:cSld>
+    <p:spTree>
+      <p:nvGrpSpPr>
+        <p:cNvPr id="1" name="Shape 45">
+          <a:extLst>
+            <a:ext uri="{FF2B5EF4-FFF2-40B4-BE49-F238E27FC236}">
+              <a16:creationId xmlns:a16="http://schemas.microsoft.com/office/drawing/2014/main" id="{8FFA8F11-970C-550A-A163-BD249F0F1FE1}"/>
+            </a:ext>
+          </a:extLst>
+        </p:cNvPr>
+        <p:cNvGrpSpPr/>
+        <p:nvPr/>
+      </p:nvGrpSpPr>
+      <p:grpSpPr>
+        <a:xfrm>
+          <a:off x="0" y="0"/>
+          <a:ext cx="0" cy="0"/>
+          <a:chOff x="0" y="0"/>
+          <a:chExt cx="0" cy="0"/>
+        </a:xfrm>
+      </p:grpSpPr>
+      <p:sp>
+        <p:nvSpPr>
+          <p:cNvPr id="46" name="Google Shape;46;g5f61e1cf29_0_36:notes">
+            <a:extLst>
+              <a:ext uri="{FF2B5EF4-FFF2-40B4-BE49-F238E27FC236}">
+                <a16:creationId xmlns:a16="http://schemas.microsoft.com/office/drawing/2014/main" id="{525F3E82-0FDD-AD1A-FC93-691E96DC280E}"/>
+              </a:ext>
+            </a:extLst>
+          </p:cNvPr>
+          <p:cNvSpPr>
+            <a:spLocks noGrp="1" noRot="1" noChangeAspect="1"/>
+          </p:cNvSpPr>
+          <p:nvPr>
+            <p:ph type="sldImg" idx="2"/>
+          </p:nvPr>
+        </p:nvSpPr>
+        <p:spPr>
+          <a:xfrm>
+            <a:off x="381000" y="685800"/>
+            <a:ext cx="6096000" cy="3429000"/>
+          </a:xfrm>
+          <a:custGeom>
+            <a:avLst/>
+            <a:gdLst/>
+            <a:ahLst/>
+            <a:cxnLst/>
+            <a:rect l="l" t="t" r="r" b="b"/>
+            <a:pathLst>
+              <a:path w="120000" h="120000" extrusionOk="0">
+                <a:moveTo>
+                  <a:pt x="0" y="0"/>
+                </a:moveTo>
+                <a:lnTo>
+                  <a:pt x="120000" y="0"/>
+                </a:lnTo>
+                <a:lnTo>
+                  <a:pt x="120000" y="120000"/>
+                </a:lnTo>
+                <a:lnTo>
+                  <a:pt x="0" y="120000"/>
+                </a:lnTo>
+                <a:close/>
+              </a:path>
+            </a:pathLst>
+          </a:custGeom>
+        </p:spPr>
+      </p:sp>
+      <p:sp>
+        <p:nvSpPr>
+          <p:cNvPr id="47" name="Google Shape;47;g5f61e1cf29_0_36:notes">
+            <a:extLst>
+              <a:ext uri="{FF2B5EF4-FFF2-40B4-BE49-F238E27FC236}">
+                <a16:creationId xmlns:a16="http://schemas.microsoft.com/office/drawing/2014/main" id="{D86879EB-65FB-20AF-3AFF-E6E1EB4BA4B4}"/>
+              </a:ext>
+            </a:extLst>
+          </p:cNvPr>
+          <p:cNvSpPr txBox="1">
+            <a:spLocks noGrp="1"/>
+          </p:cNvSpPr>
+          <p:nvPr>
+            <p:ph type="body" idx="1"/>
+          </p:nvPr>
+        </p:nvSpPr>
+        <p:spPr>
+          <a:xfrm>
+            <a:off x="685800" y="4343400"/>
+            <a:ext cx="5486400" cy="4114800"/>
+          </a:xfrm>
+          <a:prstGeom prst="rect">
+            <a:avLst/>
+          </a:prstGeom>
+        </p:spPr>
+        <p:txBody>
+          <a:bodyPr spcFirstLastPara="1" wrap="square" lIns="91425" tIns="91425" rIns="91425" bIns="91425" anchor="t" anchorCtr="0">
+            <a:noAutofit/>
+          </a:bodyPr>
+          <a:lstStyle/>
+          <a:p>
+            <a:pPr marL="0" lvl="0" indent="0" algn="l" rtl="0">
+              <a:spcBef>
+                <a:spcPts val="0"/>
+              </a:spcBef>
+              <a:spcAft>
+                <a:spcPts val="0"/>
+              </a:spcAft>
+              <a:buNone/>
+            </a:pPr>
+            <a:endParaRPr/>
+          </a:p>
+        </p:txBody>
+      </p:sp>
+    </p:spTree>
+    <p:extLst>
+      <p:ext uri="{BB962C8B-B14F-4D97-AF65-F5344CB8AC3E}">
+        <p14:creationId xmlns:p14="http://schemas.microsoft.com/office/powerpoint/2010/main" val="4149028887"/>
+      </p:ext>
+    </p:extLst>
+  </p:cSld>
+  <p:clrMapOvr>
+    <a:masterClrMapping/>
+  </p:clrMapOvr>
+</p:notes>
+</file>
+
+<file path=ppt/notesSlides/notesSlide13.xml><?xml version="1.0" encoding="utf-8"?>
+<p:notes xmlns:a="http://schemas.openxmlformats.org/drawingml/2006/main" xmlns:r="http://schemas.openxmlformats.org/officeDocument/2006/relationships" xmlns:p="http://schemas.openxmlformats.org/presentationml/2006/main" showMasterSp="0" showMasterPhAnim="0">
+  <p:cSld>
+    <p:spTree>
+      <p:nvGrpSpPr>
+        <p:cNvPr id="1" name="Shape 45">
+          <a:extLst>
+            <a:ext uri="{FF2B5EF4-FFF2-40B4-BE49-F238E27FC236}">
+              <a16:creationId xmlns:a16="http://schemas.microsoft.com/office/drawing/2014/main" id="{54601264-4454-1273-5B33-73C82BECAD27}"/>
+            </a:ext>
+          </a:extLst>
+        </p:cNvPr>
+        <p:cNvGrpSpPr/>
+        <p:nvPr/>
+      </p:nvGrpSpPr>
+      <p:grpSpPr>
+        <a:xfrm>
+          <a:off x="0" y="0"/>
+          <a:ext cx="0" cy="0"/>
+          <a:chOff x="0" y="0"/>
+          <a:chExt cx="0" cy="0"/>
+        </a:xfrm>
+      </p:grpSpPr>
+      <p:sp>
+        <p:nvSpPr>
+          <p:cNvPr id="46" name="Google Shape;46;g5f61e1cf29_0_36:notes">
+            <a:extLst>
+              <a:ext uri="{FF2B5EF4-FFF2-40B4-BE49-F238E27FC236}">
+                <a16:creationId xmlns:a16="http://schemas.microsoft.com/office/drawing/2014/main" id="{A510E1A8-A07D-51D2-A9D0-AACADBB81602}"/>
+              </a:ext>
+            </a:extLst>
+          </p:cNvPr>
+          <p:cNvSpPr>
+            <a:spLocks noGrp="1" noRot="1" noChangeAspect="1"/>
+          </p:cNvSpPr>
+          <p:nvPr>
+            <p:ph type="sldImg" idx="2"/>
+          </p:nvPr>
+        </p:nvSpPr>
+        <p:spPr>
+          <a:xfrm>
+            <a:off x="381000" y="685800"/>
+            <a:ext cx="6096000" cy="3429000"/>
+          </a:xfrm>
+          <a:custGeom>
+            <a:avLst/>
+            <a:gdLst/>
+            <a:ahLst/>
+            <a:cxnLst/>
+            <a:rect l="l" t="t" r="r" b="b"/>
+            <a:pathLst>
+              <a:path w="120000" h="120000" extrusionOk="0">
+                <a:moveTo>
+                  <a:pt x="0" y="0"/>
+                </a:moveTo>
+                <a:lnTo>
+                  <a:pt x="120000" y="0"/>
+                </a:lnTo>
+                <a:lnTo>
+                  <a:pt x="120000" y="120000"/>
+                </a:lnTo>
+                <a:lnTo>
+                  <a:pt x="0" y="120000"/>
+                </a:lnTo>
+                <a:close/>
+              </a:path>
+            </a:pathLst>
+          </a:custGeom>
+        </p:spPr>
+      </p:sp>
+      <p:sp>
+        <p:nvSpPr>
+          <p:cNvPr id="47" name="Google Shape;47;g5f61e1cf29_0_36:notes">
+            <a:extLst>
+              <a:ext uri="{FF2B5EF4-FFF2-40B4-BE49-F238E27FC236}">
+                <a16:creationId xmlns:a16="http://schemas.microsoft.com/office/drawing/2014/main" id="{729BCE87-AD98-28D1-1B68-85747764B6FF}"/>
+              </a:ext>
+            </a:extLst>
+          </p:cNvPr>
+          <p:cNvSpPr txBox="1">
+            <a:spLocks noGrp="1"/>
+          </p:cNvSpPr>
+          <p:nvPr>
+            <p:ph type="body" idx="1"/>
+          </p:nvPr>
+        </p:nvSpPr>
+        <p:spPr>
+          <a:xfrm>
+            <a:off x="685800" y="4343400"/>
+            <a:ext cx="5486400" cy="4114800"/>
+          </a:xfrm>
+          <a:prstGeom prst="rect">
+            <a:avLst/>
+          </a:prstGeom>
+        </p:spPr>
+        <p:txBody>
+          <a:bodyPr spcFirstLastPara="1" wrap="square" lIns="91425" tIns="91425" rIns="91425" bIns="91425" anchor="t" anchorCtr="0">
+            <a:noAutofit/>
+          </a:bodyPr>
+          <a:lstStyle/>
+          <a:p>
+            <a:pPr marL="0" lvl="0" indent="0" algn="l" rtl="0">
+              <a:spcBef>
+                <a:spcPts val="0"/>
+              </a:spcBef>
+              <a:spcAft>
+                <a:spcPts val="0"/>
+              </a:spcAft>
+              <a:buNone/>
+            </a:pPr>
+            <a:endParaRPr/>
+          </a:p>
+        </p:txBody>
+      </p:sp>
+    </p:spTree>
+    <p:extLst>
+      <p:ext uri="{BB962C8B-B14F-4D97-AF65-F5344CB8AC3E}">
+        <p14:creationId xmlns:p14="http://schemas.microsoft.com/office/powerpoint/2010/main" val="3094812263"/>
+      </p:ext>
+    </p:extLst>
+  </p:cSld>
+  <p:clrMapOvr>
+    <a:masterClrMapping/>
+  </p:clrMapOvr>
+</p:notes>
+</file>
+
+<file path=ppt/notesSlides/notesSlide14.xml><?xml version="1.0" encoding="utf-8"?>
+<p:notes xmlns:a="http://schemas.openxmlformats.org/drawingml/2006/main" xmlns:r="http://schemas.openxmlformats.org/officeDocument/2006/relationships" xmlns:p="http://schemas.openxmlformats.org/presentationml/2006/main" showMasterSp="0" showMasterPhAnim="0">
+  <p:cSld>
+    <p:spTree>
+      <p:nvGrpSpPr>
+        <p:cNvPr id="1" name="Shape 45">
+          <a:extLst>
+            <a:ext uri="{FF2B5EF4-FFF2-40B4-BE49-F238E27FC236}">
+              <a16:creationId xmlns:a16="http://schemas.microsoft.com/office/drawing/2014/main" id="{A708BAB0-CD93-B3C0-2489-66C4A02616A2}"/>
+            </a:ext>
+          </a:extLst>
+        </p:cNvPr>
+        <p:cNvGrpSpPr/>
+        <p:nvPr/>
+      </p:nvGrpSpPr>
+      <p:grpSpPr>
+        <a:xfrm>
+          <a:off x="0" y="0"/>
+          <a:ext cx="0" cy="0"/>
+          <a:chOff x="0" y="0"/>
+          <a:chExt cx="0" cy="0"/>
+        </a:xfrm>
+      </p:grpSpPr>
+      <p:sp>
+        <p:nvSpPr>
+          <p:cNvPr id="46" name="Google Shape;46;g5f61e1cf29_0_36:notes">
+            <a:extLst>
+              <a:ext uri="{FF2B5EF4-FFF2-40B4-BE49-F238E27FC236}">
+                <a16:creationId xmlns:a16="http://schemas.microsoft.com/office/drawing/2014/main" id="{8BE05222-14F9-76D5-E06F-0FBED097C2DD}"/>
+              </a:ext>
+            </a:extLst>
+          </p:cNvPr>
+          <p:cNvSpPr>
+            <a:spLocks noGrp="1" noRot="1" noChangeAspect="1"/>
+          </p:cNvSpPr>
+          <p:nvPr>
+            <p:ph type="sldImg" idx="2"/>
+          </p:nvPr>
+        </p:nvSpPr>
+        <p:spPr>
+          <a:xfrm>
+            <a:off x="381000" y="685800"/>
+            <a:ext cx="6096000" cy="3429000"/>
+          </a:xfrm>
+          <a:custGeom>
+            <a:avLst/>
+            <a:gdLst/>
+            <a:ahLst/>
+            <a:cxnLst/>
+            <a:rect l="l" t="t" r="r" b="b"/>
+            <a:pathLst>
+              <a:path w="120000" h="120000" extrusionOk="0">
+                <a:moveTo>
+                  <a:pt x="0" y="0"/>
+                </a:moveTo>
+                <a:lnTo>
+                  <a:pt x="120000" y="0"/>
+                </a:lnTo>
+                <a:lnTo>
+                  <a:pt x="120000" y="120000"/>
+                </a:lnTo>
+                <a:lnTo>
+                  <a:pt x="0" y="120000"/>
+                </a:lnTo>
+                <a:close/>
+              </a:path>
+            </a:pathLst>
+          </a:custGeom>
+        </p:spPr>
+      </p:sp>
+      <p:sp>
+        <p:nvSpPr>
+          <p:cNvPr id="47" name="Google Shape;47;g5f61e1cf29_0_36:notes">
+            <a:extLst>
+              <a:ext uri="{FF2B5EF4-FFF2-40B4-BE49-F238E27FC236}">
+                <a16:creationId xmlns:a16="http://schemas.microsoft.com/office/drawing/2014/main" id="{38A7C442-88A3-C94C-1902-F800795F0FF7}"/>
+              </a:ext>
+            </a:extLst>
+          </p:cNvPr>
+          <p:cNvSpPr txBox="1">
+            <a:spLocks noGrp="1"/>
+          </p:cNvSpPr>
+          <p:nvPr>
+            <p:ph type="body" idx="1"/>
+          </p:nvPr>
+        </p:nvSpPr>
+        <p:spPr>
+          <a:xfrm>
+            <a:off x="685800" y="4343400"/>
+            <a:ext cx="5486400" cy="4114800"/>
+          </a:xfrm>
+          <a:prstGeom prst="rect">
+            <a:avLst/>
+          </a:prstGeom>
+        </p:spPr>
+        <p:txBody>
+          <a:bodyPr spcFirstLastPara="1" wrap="square" lIns="91425" tIns="91425" rIns="91425" bIns="91425" anchor="t" anchorCtr="0">
+            <a:noAutofit/>
+          </a:bodyPr>
+          <a:lstStyle/>
+          <a:p>
+            <a:pPr marL="0" lvl="0" indent="0" algn="l" rtl="0">
+              <a:spcBef>
+                <a:spcPts val="0"/>
+              </a:spcBef>
+              <a:spcAft>
+                <a:spcPts val="0"/>
+              </a:spcAft>
+              <a:buNone/>
+            </a:pPr>
+            <a:endParaRPr/>
+          </a:p>
+        </p:txBody>
+      </p:sp>
+    </p:spTree>
+    <p:extLst>
+      <p:ext uri="{BB962C8B-B14F-4D97-AF65-F5344CB8AC3E}">
+        <p14:creationId xmlns:p14="http://schemas.microsoft.com/office/powerpoint/2010/main" val="487301035"/>
+      </p:ext>
+    </p:extLst>
+  </p:cSld>
+  <p:clrMapOvr>
+    <a:masterClrMapping/>
+  </p:clrMapOvr>
+</p:notes>
+</file>
+
+<file path=ppt/notesSlides/notesSlide15.xml><?xml version="1.0" encoding="utf-8"?>
+<p:notes xmlns:a="http://schemas.openxmlformats.org/drawingml/2006/main" xmlns:r="http://schemas.openxmlformats.org/officeDocument/2006/relationships" xmlns:p="http://schemas.openxmlformats.org/presentationml/2006/main" showMasterSp="0" showMasterPhAnim="0">
+  <p:cSld>
+    <p:spTree>
+      <p:nvGrpSpPr>
+        <p:cNvPr id="1" name="Shape 45">
+          <a:extLst>
+            <a:ext uri="{FF2B5EF4-FFF2-40B4-BE49-F238E27FC236}">
+              <a16:creationId xmlns:a16="http://schemas.microsoft.com/office/drawing/2014/main" id="{77F3E183-CE46-F6A3-EBF6-AD7C329D22FC}"/>
+            </a:ext>
+          </a:extLst>
+        </p:cNvPr>
+        <p:cNvGrpSpPr/>
+        <p:nvPr/>
+      </p:nvGrpSpPr>
+      <p:grpSpPr>
+        <a:xfrm>
+          <a:off x="0" y="0"/>
+          <a:ext cx="0" cy="0"/>
+          <a:chOff x="0" y="0"/>
+          <a:chExt cx="0" cy="0"/>
+        </a:xfrm>
+      </p:grpSpPr>
+      <p:sp>
+        <p:nvSpPr>
+          <p:cNvPr id="46" name="Google Shape;46;g5f61e1cf29_0_36:notes">
+            <a:extLst>
+              <a:ext uri="{FF2B5EF4-FFF2-40B4-BE49-F238E27FC236}">
+                <a16:creationId xmlns:a16="http://schemas.microsoft.com/office/drawing/2014/main" id="{1F9E3280-C3EF-CEE4-7FF3-C663BBEECB24}"/>
+              </a:ext>
+            </a:extLst>
+          </p:cNvPr>
+          <p:cNvSpPr>
+            <a:spLocks noGrp="1" noRot="1" noChangeAspect="1"/>
+          </p:cNvSpPr>
+          <p:nvPr>
+            <p:ph type="sldImg" idx="2"/>
+          </p:nvPr>
+        </p:nvSpPr>
+        <p:spPr>
+          <a:xfrm>
+            <a:off x="381000" y="685800"/>
+            <a:ext cx="6096000" cy="3429000"/>
+          </a:xfrm>
+          <a:custGeom>
+            <a:avLst/>
+            <a:gdLst/>
+            <a:ahLst/>
+            <a:cxnLst/>
+            <a:rect l="l" t="t" r="r" b="b"/>
+            <a:pathLst>
+              <a:path w="120000" h="120000" extrusionOk="0">
+                <a:moveTo>
+                  <a:pt x="0" y="0"/>
+                </a:moveTo>
+                <a:lnTo>
+                  <a:pt x="120000" y="0"/>
+                </a:lnTo>
+                <a:lnTo>
+                  <a:pt x="120000" y="120000"/>
+                </a:lnTo>
+                <a:lnTo>
+                  <a:pt x="0" y="120000"/>
+                </a:lnTo>
+                <a:close/>
+              </a:path>
+            </a:pathLst>
+          </a:custGeom>
+        </p:spPr>
+      </p:sp>
+      <p:sp>
+        <p:nvSpPr>
+          <p:cNvPr id="47" name="Google Shape;47;g5f61e1cf29_0_36:notes">
+            <a:extLst>
+              <a:ext uri="{FF2B5EF4-FFF2-40B4-BE49-F238E27FC236}">
+                <a16:creationId xmlns:a16="http://schemas.microsoft.com/office/drawing/2014/main" id="{51AA3013-85E8-0484-8E58-D585038C8E4B}"/>
+              </a:ext>
+            </a:extLst>
+          </p:cNvPr>
+          <p:cNvSpPr txBox="1">
+            <a:spLocks noGrp="1"/>
+          </p:cNvSpPr>
+          <p:nvPr>
+            <p:ph type="body" idx="1"/>
+          </p:nvPr>
+        </p:nvSpPr>
+        <p:spPr>
+          <a:xfrm>
+            <a:off x="685800" y="4343400"/>
+            <a:ext cx="5486400" cy="4114800"/>
+          </a:xfrm>
+          <a:prstGeom prst="rect">
+            <a:avLst/>
+          </a:prstGeom>
+        </p:spPr>
+        <p:txBody>
+          <a:bodyPr spcFirstLastPara="1" wrap="square" lIns="91425" tIns="91425" rIns="91425" bIns="91425" anchor="t" anchorCtr="0">
+            <a:noAutofit/>
+          </a:bodyPr>
+          <a:lstStyle/>
+          <a:p>
+            <a:pPr marL="0" lvl="0" indent="0" algn="l" rtl="0">
+              <a:spcBef>
+                <a:spcPts val="0"/>
+              </a:spcBef>
+              <a:spcAft>
+                <a:spcPts val="0"/>
+              </a:spcAft>
+              <a:buNone/>
+            </a:pPr>
+            <a:endParaRPr/>
+          </a:p>
+        </p:txBody>
+      </p:sp>
+    </p:spTree>
+    <p:extLst>
+      <p:ext uri="{BB962C8B-B14F-4D97-AF65-F5344CB8AC3E}">
+        <p14:creationId xmlns:p14="http://schemas.microsoft.com/office/powerpoint/2010/main" val="3148523618"/>
+      </p:ext>
+    </p:extLst>
+  </p:cSld>
+  <p:clrMapOvr>
+    <a:masterClrMapping/>
+  </p:clrMapOvr>
+</p:notes>
+</file>
+
+<file path=ppt/notesSlides/notesSlide16.xml><?xml version="1.0" encoding="utf-8"?>
+<p:notes xmlns:a="http://schemas.openxmlformats.org/drawingml/2006/main" xmlns:r="http://schemas.openxmlformats.org/officeDocument/2006/relationships" xmlns:p="http://schemas.openxmlformats.org/presentationml/2006/main" showMasterSp="0" showMasterPhAnim="0">
+  <p:cSld>
+    <p:spTree>
+      <p:nvGrpSpPr>
+        <p:cNvPr id="1" name="Shape 50">
+          <a:extLst>
+            <a:ext uri="{FF2B5EF4-FFF2-40B4-BE49-F238E27FC236}">
+              <a16:creationId xmlns:a16="http://schemas.microsoft.com/office/drawing/2014/main" id="{2615A70C-6CCC-D886-F040-167263D81302}"/>
+            </a:ext>
+          </a:extLst>
+        </p:cNvPr>
+        <p:cNvGrpSpPr/>
+        <p:nvPr/>
+      </p:nvGrpSpPr>
+      <p:grpSpPr>
+        <a:xfrm>
+          <a:off x="0" y="0"/>
+          <a:ext cx="0" cy="0"/>
+          <a:chOff x="0" y="0"/>
+          <a:chExt cx="0" cy="0"/>
+        </a:xfrm>
+      </p:grpSpPr>
+      <p:sp>
+        <p:nvSpPr>
+          <p:cNvPr id="51" name="Google Shape;51;g5f61e1cf29_0_31:notes">
+            <a:extLst>
+              <a:ext uri="{FF2B5EF4-FFF2-40B4-BE49-F238E27FC236}">
+                <a16:creationId xmlns:a16="http://schemas.microsoft.com/office/drawing/2014/main" id="{93EBD38F-037B-E068-6E90-C300630C5D6E}"/>
+              </a:ext>
+            </a:extLst>
+          </p:cNvPr>
+          <p:cNvSpPr>
+            <a:spLocks noGrp="1" noRot="1" noChangeAspect="1"/>
+          </p:cNvSpPr>
+          <p:nvPr>
+            <p:ph type="sldImg" idx="2"/>
+          </p:nvPr>
+        </p:nvSpPr>
+        <p:spPr>
+          <a:xfrm>
+            <a:off x="381000" y="685800"/>
+            <a:ext cx="6096000" cy="3429000"/>
+          </a:xfrm>
+          <a:custGeom>
+            <a:avLst/>
+            <a:gdLst/>
+            <a:ahLst/>
+            <a:cxnLst/>
+            <a:rect l="l" t="t" r="r" b="b"/>
+            <a:pathLst>
+              <a:path w="120000" h="120000" extrusionOk="0">
+                <a:moveTo>
+                  <a:pt x="0" y="0"/>
+                </a:moveTo>
+                <a:lnTo>
+                  <a:pt x="120000" y="0"/>
+                </a:lnTo>
+                <a:lnTo>
+                  <a:pt x="120000" y="120000"/>
+                </a:lnTo>
+                <a:lnTo>
+                  <a:pt x="0" y="120000"/>
+                </a:lnTo>
+                <a:close/>
+              </a:path>
+            </a:pathLst>
+          </a:custGeom>
+        </p:spPr>
+      </p:sp>
+      <p:sp>
+        <p:nvSpPr>
+          <p:cNvPr id="52" name="Google Shape;52;g5f61e1cf29_0_31:notes">
+            <a:extLst>
+              <a:ext uri="{FF2B5EF4-FFF2-40B4-BE49-F238E27FC236}">
+                <a16:creationId xmlns:a16="http://schemas.microsoft.com/office/drawing/2014/main" id="{7B3921A8-0E69-C8A8-E161-97333F9F135E}"/>
+              </a:ext>
+            </a:extLst>
+          </p:cNvPr>
+          <p:cNvSpPr txBox="1">
+            <a:spLocks noGrp="1"/>
+          </p:cNvSpPr>
+          <p:nvPr>
+            <p:ph type="body" idx="1"/>
+          </p:nvPr>
+        </p:nvSpPr>
+        <p:spPr>
+          <a:xfrm>
+            <a:off x="685800" y="4343400"/>
+            <a:ext cx="5486400" cy="4114800"/>
+          </a:xfrm>
+          <a:prstGeom prst="rect">
+            <a:avLst/>
+          </a:prstGeom>
+        </p:spPr>
+        <p:txBody>
+          <a:bodyPr spcFirstLastPara="1" wrap="square" lIns="91425" tIns="91425" rIns="91425" bIns="91425" anchor="t" anchorCtr="0">
+            <a:noAutofit/>
+          </a:bodyPr>
+          <a:lstStyle/>
+          <a:p>
+            <a:pPr marL="0" lvl="0" indent="0" algn="l" rtl="0">
+              <a:spcBef>
+                <a:spcPts val="0"/>
+              </a:spcBef>
+              <a:spcAft>
+                <a:spcPts val="0"/>
+              </a:spcAft>
+              <a:buNone/>
+            </a:pPr>
+            <a:endParaRPr/>
+          </a:p>
+        </p:txBody>
+      </p:sp>
+    </p:spTree>
+    <p:extLst>
+      <p:ext uri="{BB962C8B-B14F-4D97-AF65-F5344CB8AC3E}">
+        <p14:creationId xmlns:p14="http://schemas.microsoft.com/office/powerpoint/2010/main" val="2249695328"/>
+      </p:ext>
+    </p:extLst>
+  </p:cSld>
+  <p:clrMapOvr>
+    <a:masterClrMapping/>
+  </p:clrMapOvr>
+</p:notes>
+</file>
+
+<file path=ppt/notesSlides/notesSlide17.xml><?xml version="1.0" encoding="utf-8"?>
+<p:notes xmlns:a="http://schemas.openxmlformats.org/drawingml/2006/main" xmlns:r="http://schemas.openxmlformats.org/officeDocument/2006/relationships" xmlns:p="http://schemas.openxmlformats.org/presentationml/2006/main" showMasterSp="0" showMasterPhAnim="0">
+  <p:cSld>
+    <p:spTree>
+      <p:nvGrpSpPr>
+        <p:cNvPr id="1" name="Shape 45"/>
+        <p:cNvGrpSpPr/>
+        <p:nvPr/>
+      </p:nvGrpSpPr>
+      <p:grpSpPr>
+        <a:xfrm>
+          <a:off x="0" y="0"/>
+          <a:ext cx="0" cy="0"/>
+          <a:chOff x="0" y="0"/>
+          <a:chExt cx="0" cy="0"/>
+        </a:xfrm>
+      </p:grpSpPr>
+      <p:sp>
+        <p:nvSpPr>
+          <p:cNvPr id="46" name="Google Shape;46;g5f61e1cf29_0_36:notes"/>
+          <p:cNvSpPr>
+            <a:spLocks noGrp="1" noRot="1" noChangeAspect="1"/>
+          </p:cNvSpPr>
+          <p:nvPr>
+            <p:ph type="sldImg" idx="2"/>
+          </p:nvPr>
+        </p:nvSpPr>
+        <p:spPr>
+          <a:xfrm>
+            <a:off x="381000" y="685800"/>
+            <a:ext cx="6096000" cy="3429000"/>
+          </a:xfrm>
+          <a:custGeom>
+            <a:avLst/>
+            <a:gdLst/>
+            <a:ahLst/>
+            <a:cxnLst/>
+            <a:rect l="l" t="t" r="r" b="b"/>
+            <a:pathLst>
+              <a:path w="120000" h="120000" extrusionOk="0">
+                <a:moveTo>
+                  <a:pt x="0" y="0"/>
+                </a:moveTo>
+                <a:lnTo>
+                  <a:pt x="120000" y="0"/>
+                </a:lnTo>
+                <a:lnTo>
+                  <a:pt x="120000" y="120000"/>
+                </a:lnTo>
+                <a:lnTo>
+                  <a:pt x="0" y="120000"/>
+                </a:lnTo>
+                <a:close/>
+              </a:path>
+            </a:pathLst>
+          </a:custGeom>
+        </p:spPr>
+      </p:sp>
+      <p:sp>
+        <p:nvSpPr>
+          <p:cNvPr id="47" name="Google Shape;47;g5f61e1cf29_0_36:notes"/>
+          <p:cNvSpPr txBox="1">
+            <a:spLocks noGrp="1"/>
+          </p:cNvSpPr>
+          <p:nvPr>
+            <p:ph type="body" idx="1"/>
+          </p:nvPr>
+        </p:nvSpPr>
+        <p:spPr>
+          <a:xfrm>
+            <a:off x="685800" y="4343400"/>
+            <a:ext cx="5486400" cy="4114800"/>
+          </a:xfrm>
+          <a:prstGeom prst="rect">
+            <a:avLst/>
+          </a:prstGeom>
+        </p:spPr>
+        <p:txBody>
+          <a:bodyPr spcFirstLastPara="1" wrap="square" lIns="91425" tIns="91425" rIns="91425" bIns="91425" anchor="t" anchorCtr="0">
+            <a:noAutofit/>
+          </a:bodyPr>
+          <a:lstStyle/>
+          <a:p>
+            <a:pPr marL="0" lvl="0" indent="0" algn="l" rtl="0">
+              <a:spcBef>
+                <a:spcPts val="0"/>
+              </a:spcBef>
+              <a:spcAft>
+                <a:spcPts val="0"/>
+              </a:spcAft>
+              <a:buNone/>
+            </a:pPr>
+            <a:endParaRPr/>
+          </a:p>
+        </p:txBody>
+      </p:sp>
+    </p:spTree>
+  </p:cSld>
+  <p:clrMapOvr>
+    <a:masterClrMapping/>
+  </p:clrMapOvr>
+</p:notes>
+</file>
+
 <file path=ppt/notesSlides/notesSlide2.xml><?xml version="1.0" encoding="utf-8"?>
 <p:notes xmlns:a="http://schemas.openxmlformats.org/drawingml/2006/main" xmlns:r="http://schemas.openxmlformats.org/officeDocument/2006/relationships" xmlns:p="http://schemas.openxmlformats.org/presentationml/2006/main" showMasterSp="0" showMasterPhAnim="0">
   <p:cSld>
@@ -1517,10 +2518,10 @@
   <p:cSld>
     <p:spTree>
       <p:nvGrpSpPr>
-        <p:cNvPr id="1" name="Shape 50">
+        <p:cNvPr id="1" name="Shape 45">
           <a:extLst>
             <a:ext uri="{FF2B5EF4-FFF2-40B4-BE49-F238E27FC236}">
-              <a16:creationId xmlns:a16="http://schemas.microsoft.com/office/drawing/2014/main" id="{2615A70C-6CCC-D886-F040-167263D81302}"/>
+              <a16:creationId xmlns:a16="http://schemas.microsoft.com/office/drawing/2014/main" id="{FDA13A59-8162-7FAD-EFE9-9F55789476CC}"/>
             </a:ext>
           </a:extLst>
         </p:cNvPr>
@@ -1537,10 +2538,10 @@
       </p:grpSpPr>
       <p:sp>
         <p:nvSpPr>
-          <p:cNvPr id="51" name="Google Shape;51;g5f61e1cf29_0_31:notes">
+          <p:cNvPr id="46" name="Google Shape;46;g5f61e1cf29_0_36:notes">
             <a:extLst>
               <a:ext uri="{FF2B5EF4-FFF2-40B4-BE49-F238E27FC236}">
-                <a16:creationId xmlns:a16="http://schemas.microsoft.com/office/drawing/2014/main" id="{93EBD38F-037B-E068-6E90-C300630C5D6E}"/>
+                <a16:creationId xmlns:a16="http://schemas.microsoft.com/office/drawing/2014/main" id="{2DA5F631-02E2-307C-7637-FFCE24900CDA}"/>
               </a:ext>
             </a:extLst>
           </p:cNvPr>
@@ -1584,10 +2585,10 @@
       </p:sp>
       <p:sp>
         <p:nvSpPr>
-          <p:cNvPr id="52" name="Google Shape;52;g5f61e1cf29_0_31:notes">
+          <p:cNvPr id="47" name="Google Shape;47;g5f61e1cf29_0_36:notes">
             <a:extLst>
               <a:ext uri="{FF2B5EF4-FFF2-40B4-BE49-F238E27FC236}">
-                <a16:creationId xmlns:a16="http://schemas.microsoft.com/office/drawing/2014/main" id="{7B3921A8-0E69-C8A8-E161-97333F9F135E}"/>
+                <a16:creationId xmlns:a16="http://schemas.microsoft.com/office/drawing/2014/main" id="{310A227D-3013-B291-9D12-7F305D3B3034}"/>
               </a:ext>
             </a:extLst>
           </p:cNvPr>
@@ -1629,7 +2630,7 @@
     </p:spTree>
     <p:extLst>
       <p:ext uri="{BB962C8B-B14F-4D97-AF65-F5344CB8AC3E}">
-        <p14:creationId xmlns:p14="http://schemas.microsoft.com/office/powerpoint/2010/main" val="2249695328"/>
+        <p14:creationId xmlns:p14="http://schemas.microsoft.com/office/powerpoint/2010/main" val="3466657198"/>
       </p:ext>
     </p:extLst>
   </p:cSld>
@@ -1644,7 +2645,13 @@
   <p:cSld>
     <p:spTree>
       <p:nvGrpSpPr>
-        <p:cNvPr id="1" name="Shape 45"/>
+        <p:cNvPr id="1" name="Shape 45">
+          <a:extLst>
+            <a:ext uri="{FF2B5EF4-FFF2-40B4-BE49-F238E27FC236}">
+              <a16:creationId xmlns:a16="http://schemas.microsoft.com/office/drawing/2014/main" id="{2311560D-9F2E-D8F3-4693-A15665410646}"/>
+            </a:ext>
+          </a:extLst>
+        </p:cNvPr>
         <p:cNvGrpSpPr/>
         <p:nvPr/>
       </p:nvGrpSpPr>
@@ -1658,7 +2665,13 @@
       </p:grpSpPr>
       <p:sp>
         <p:nvSpPr>
-          <p:cNvPr id="46" name="Google Shape;46;g5f61e1cf29_0_36:notes"/>
+          <p:cNvPr id="46" name="Google Shape;46;g5f61e1cf29_0_36:notes">
+            <a:extLst>
+              <a:ext uri="{FF2B5EF4-FFF2-40B4-BE49-F238E27FC236}">
+                <a16:creationId xmlns:a16="http://schemas.microsoft.com/office/drawing/2014/main" id="{A88384C0-43C4-D19E-95A3-F6B5D60DD2E5}"/>
+              </a:ext>
+            </a:extLst>
+          </p:cNvPr>
           <p:cNvSpPr>
             <a:spLocks noGrp="1" noRot="1" noChangeAspect="1"/>
           </p:cNvSpPr>
@@ -1699,7 +2712,13 @@
       </p:sp>
       <p:sp>
         <p:nvSpPr>
-          <p:cNvPr id="47" name="Google Shape;47;g5f61e1cf29_0_36:notes"/>
+          <p:cNvPr id="47" name="Google Shape;47;g5f61e1cf29_0_36:notes">
+            <a:extLst>
+              <a:ext uri="{FF2B5EF4-FFF2-40B4-BE49-F238E27FC236}">
+                <a16:creationId xmlns:a16="http://schemas.microsoft.com/office/drawing/2014/main" id="{4B7DD744-C58D-42F2-A117-B710D26276FA}"/>
+              </a:ext>
+            </a:extLst>
+          </p:cNvPr>
           <p:cNvSpPr txBox="1">
             <a:spLocks noGrp="1"/>
           </p:cNvSpPr>
@@ -1736,6 +2755,11 @@
         </p:txBody>
       </p:sp>
     </p:spTree>
+    <p:extLst>
+      <p:ext uri="{BB962C8B-B14F-4D97-AF65-F5344CB8AC3E}">
+        <p14:creationId xmlns:p14="http://schemas.microsoft.com/office/powerpoint/2010/main" val="3730963997"/>
+      </p:ext>
+    </p:extLst>
   </p:cSld>
   <p:clrMapOvr>
     <a:masterClrMapping/>
@@ -5275,6 +6299,989 @@
 </p:sld>
 </file>
 
+<file path=ppt/slides/slide10.xml><?xml version="1.0" encoding="utf-8"?>
+<p:sld xmlns:a="http://schemas.openxmlformats.org/drawingml/2006/main" xmlns:r="http://schemas.openxmlformats.org/officeDocument/2006/relationships" xmlns:p="http://schemas.openxmlformats.org/presentationml/2006/main">
+  <p:cSld>
+    <p:spTree>
+      <p:nvGrpSpPr>
+        <p:cNvPr id="1" name="Shape 48">
+          <a:extLst>
+            <a:ext uri="{FF2B5EF4-FFF2-40B4-BE49-F238E27FC236}">
+              <a16:creationId xmlns:a16="http://schemas.microsoft.com/office/drawing/2014/main" id="{4224D855-2353-1021-CDA2-F11B9C6BB8D8}"/>
+            </a:ext>
+          </a:extLst>
+        </p:cNvPr>
+        <p:cNvGrpSpPr/>
+        <p:nvPr/>
+      </p:nvGrpSpPr>
+      <p:grpSpPr>
+        <a:xfrm>
+          <a:off x="0" y="0"/>
+          <a:ext cx="0" cy="0"/>
+          <a:chOff x="0" y="0"/>
+          <a:chExt cx="0" cy="0"/>
+        </a:xfrm>
+      </p:grpSpPr>
+      <p:pic>
+        <p:nvPicPr>
+          <p:cNvPr id="3" name="Picture 2">
+            <a:extLst>
+              <a:ext uri="{FF2B5EF4-FFF2-40B4-BE49-F238E27FC236}">
+                <a16:creationId xmlns:a16="http://schemas.microsoft.com/office/drawing/2014/main" id="{C9F9FDB7-308C-76BD-C416-3819E105B890}"/>
+              </a:ext>
+            </a:extLst>
+          </p:cNvPr>
+          <p:cNvPicPr>
+            <a:picLocks noChangeAspect="1"/>
+          </p:cNvPicPr>
+          <p:nvPr/>
+        </p:nvPicPr>
+        <p:blipFill>
+          <a:blip r:embed="rId3"/>
+          <a:stretch>
+            <a:fillRect/>
+          </a:stretch>
+        </p:blipFill>
+        <p:spPr>
+          <a:xfrm>
+            <a:off x="351836" y="342589"/>
+            <a:ext cx="8440328" cy="4458322"/>
+          </a:xfrm>
+          <a:prstGeom prst="rect">
+            <a:avLst/>
+          </a:prstGeom>
+        </p:spPr>
+      </p:pic>
+    </p:spTree>
+    <p:extLst>
+      <p:ext uri="{BB962C8B-B14F-4D97-AF65-F5344CB8AC3E}">
+        <p14:creationId xmlns:p14="http://schemas.microsoft.com/office/powerpoint/2010/main" val="4172967276"/>
+      </p:ext>
+    </p:extLst>
+  </p:cSld>
+  <p:clrMapOvr>
+    <a:masterClrMapping/>
+  </p:clrMapOvr>
+</p:sld>
+</file>
+
+<file path=ppt/slides/slide11.xml><?xml version="1.0" encoding="utf-8"?>
+<p:sld xmlns:a="http://schemas.openxmlformats.org/drawingml/2006/main" xmlns:r="http://schemas.openxmlformats.org/officeDocument/2006/relationships" xmlns:p="http://schemas.openxmlformats.org/presentationml/2006/main">
+  <p:cSld>
+    <p:spTree>
+      <p:nvGrpSpPr>
+        <p:cNvPr id="1" name="Shape 48">
+          <a:extLst>
+            <a:ext uri="{FF2B5EF4-FFF2-40B4-BE49-F238E27FC236}">
+              <a16:creationId xmlns:a16="http://schemas.microsoft.com/office/drawing/2014/main" id="{31AB5FC9-2F49-9590-9D62-0D9022AF205C}"/>
+            </a:ext>
+          </a:extLst>
+        </p:cNvPr>
+        <p:cNvGrpSpPr/>
+        <p:nvPr/>
+      </p:nvGrpSpPr>
+      <p:grpSpPr>
+        <a:xfrm>
+          <a:off x="0" y="0"/>
+          <a:ext cx="0" cy="0"/>
+          <a:chOff x="0" y="0"/>
+          <a:chExt cx="0" cy="0"/>
+        </a:xfrm>
+      </p:grpSpPr>
+      <p:pic>
+        <p:nvPicPr>
+          <p:cNvPr id="3" name="Picture 2">
+            <a:extLst>
+              <a:ext uri="{FF2B5EF4-FFF2-40B4-BE49-F238E27FC236}">
+                <a16:creationId xmlns:a16="http://schemas.microsoft.com/office/drawing/2014/main" id="{52A7E4D1-F9C9-9C20-9F74-7B45C0315095}"/>
+              </a:ext>
+            </a:extLst>
+          </p:cNvPr>
+          <p:cNvPicPr>
+            <a:picLocks noChangeAspect="1"/>
+          </p:cNvPicPr>
+          <p:nvPr/>
+        </p:nvPicPr>
+        <p:blipFill>
+          <a:blip r:embed="rId3"/>
+          <a:stretch>
+            <a:fillRect/>
+          </a:stretch>
+        </p:blipFill>
+        <p:spPr>
+          <a:xfrm>
+            <a:off x="418520" y="242562"/>
+            <a:ext cx="8306959" cy="4658375"/>
+          </a:xfrm>
+          <a:prstGeom prst="rect">
+            <a:avLst/>
+          </a:prstGeom>
+        </p:spPr>
+      </p:pic>
+    </p:spTree>
+    <p:extLst>
+      <p:ext uri="{BB962C8B-B14F-4D97-AF65-F5344CB8AC3E}">
+        <p14:creationId xmlns:p14="http://schemas.microsoft.com/office/powerpoint/2010/main" val="243613557"/>
+      </p:ext>
+    </p:extLst>
+  </p:cSld>
+  <p:clrMapOvr>
+    <a:masterClrMapping/>
+  </p:clrMapOvr>
+</p:sld>
+</file>
+
+<file path=ppt/slides/slide12.xml><?xml version="1.0" encoding="utf-8"?>
+<p:sld xmlns:a="http://schemas.openxmlformats.org/drawingml/2006/main" xmlns:r="http://schemas.openxmlformats.org/officeDocument/2006/relationships" xmlns:p="http://schemas.openxmlformats.org/presentationml/2006/main">
+  <p:cSld>
+    <p:spTree>
+      <p:nvGrpSpPr>
+        <p:cNvPr id="1" name="Shape 48">
+          <a:extLst>
+            <a:ext uri="{FF2B5EF4-FFF2-40B4-BE49-F238E27FC236}">
+              <a16:creationId xmlns:a16="http://schemas.microsoft.com/office/drawing/2014/main" id="{E57DE889-C1BA-2F64-A3ED-0D9B98DC7A81}"/>
+            </a:ext>
+          </a:extLst>
+        </p:cNvPr>
+        <p:cNvGrpSpPr/>
+        <p:nvPr/>
+      </p:nvGrpSpPr>
+      <p:grpSpPr>
+        <a:xfrm>
+          <a:off x="0" y="0"/>
+          <a:ext cx="0" cy="0"/>
+          <a:chOff x="0" y="0"/>
+          <a:chExt cx="0" cy="0"/>
+        </a:xfrm>
+      </p:grpSpPr>
+      <p:pic>
+        <p:nvPicPr>
+          <p:cNvPr id="5" name="Picture 4">
+            <a:extLst>
+              <a:ext uri="{FF2B5EF4-FFF2-40B4-BE49-F238E27FC236}">
+                <a16:creationId xmlns:a16="http://schemas.microsoft.com/office/drawing/2014/main" id="{966F971B-DA48-F71C-FF92-FC959EF14B8E}"/>
+              </a:ext>
+            </a:extLst>
+          </p:cNvPr>
+          <p:cNvPicPr>
+            <a:picLocks noChangeAspect="1"/>
+          </p:cNvPicPr>
+          <p:nvPr/>
+        </p:nvPicPr>
+        <p:blipFill>
+          <a:blip r:embed="rId3"/>
+          <a:stretch>
+            <a:fillRect/>
+          </a:stretch>
+        </p:blipFill>
+        <p:spPr>
+          <a:xfrm>
+            <a:off x="323257" y="142536"/>
+            <a:ext cx="8497486" cy="4858428"/>
+          </a:xfrm>
+          <a:prstGeom prst="rect">
+            <a:avLst/>
+          </a:prstGeom>
+        </p:spPr>
+      </p:pic>
+    </p:spTree>
+    <p:extLst>
+      <p:ext uri="{BB962C8B-B14F-4D97-AF65-F5344CB8AC3E}">
+        <p14:creationId xmlns:p14="http://schemas.microsoft.com/office/powerpoint/2010/main" val="1226510218"/>
+      </p:ext>
+    </p:extLst>
+  </p:cSld>
+  <p:clrMapOvr>
+    <a:masterClrMapping/>
+  </p:clrMapOvr>
+</p:sld>
+</file>
+
+<file path=ppt/slides/slide13.xml><?xml version="1.0" encoding="utf-8"?>
+<p:sld xmlns:a="http://schemas.openxmlformats.org/drawingml/2006/main" xmlns:r="http://schemas.openxmlformats.org/officeDocument/2006/relationships" xmlns:p="http://schemas.openxmlformats.org/presentationml/2006/main">
+  <p:cSld>
+    <p:spTree>
+      <p:nvGrpSpPr>
+        <p:cNvPr id="1" name="Shape 48">
+          <a:extLst>
+            <a:ext uri="{FF2B5EF4-FFF2-40B4-BE49-F238E27FC236}">
+              <a16:creationId xmlns:a16="http://schemas.microsoft.com/office/drawing/2014/main" id="{DE6B6276-6B48-DC7E-B35A-DE718BAE2525}"/>
+            </a:ext>
+          </a:extLst>
+        </p:cNvPr>
+        <p:cNvGrpSpPr/>
+        <p:nvPr/>
+      </p:nvGrpSpPr>
+      <p:grpSpPr>
+        <a:xfrm>
+          <a:off x="0" y="0"/>
+          <a:ext cx="0" cy="0"/>
+          <a:chOff x="0" y="0"/>
+          <a:chExt cx="0" cy="0"/>
+        </a:xfrm>
+      </p:grpSpPr>
+      <p:pic>
+        <p:nvPicPr>
+          <p:cNvPr id="3" name="Picture 2">
+            <a:extLst>
+              <a:ext uri="{FF2B5EF4-FFF2-40B4-BE49-F238E27FC236}">
+                <a16:creationId xmlns:a16="http://schemas.microsoft.com/office/drawing/2014/main" id="{931890ED-DA9F-5E19-C6A1-7316590C96DB}"/>
+              </a:ext>
+            </a:extLst>
+          </p:cNvPr>
+          <p:cNvPicPr>
+            <a:picLocks noChangeAspect="1"/>
+          </p:cNvPicPr>
+          <p:nvPr/>
+        </p:nvPicPr>
+        <p:blipFill>
+          <a:blip r:embed="rId3"/>
+          <a:stretch>
+            <a:fillRect/>
+          </a:stretch>
+        </p:blipFill>
+        <p:spPr>
+          <a:xfrm>
+            <a:off x="313730" y="152062"/>
+            <a:ext cx="8516539" cy="4839375"/>
+          </a:xfrm>
+          <a:prstGeom prst="rect">
+            <a:avLst/>
+          </a:prstGeom>
+        </p:spPr>
+      </p:pic>
+    </p:spTree>
+    <p:extLst>
+      <p:ext uri="{BB962C8B-B14F-4D97-AF65-F5344CB8AC3E}">
+        <p14:creationId xmlns:p14="http://schemas.microsoft.com/office/powerpoint/2010/main" val="3965482306"/>
+      </p:ext>
+    </p:extLst>
+  </p:cSld>
+  <p:clrMapOvr>
+    <a:masterClrMapping/>
+  </p:clrMapOvr>
+</p:sld>
+</file>
+
+<file path=ppt/slides/slide14.xml><?xml version="1.0" encoding="utf-8"?>
+<p:sld xmlns:a="http://schemas.openxmlformats.org/drawingml/2006/main" xmlns:r="http://schemas.openxmlformats.org/officeDocument/2006/relationships" xmlns:p="http://schemas.openxmlformats.org/presentationml/2006/main">
+  <p:cSld>
+    <p:spTree>
+      <p:nvGrpSpPr>
+        <p:cNvPr id="1" name="Shape 48">
+          <a:extLst>
+            <a:ext uri="{FF2B5EF4-FFF2-40B4-BE49-F238E27FC236}">
+              <a16:creationId xmlns:a16="http://schemas.microsoft.com/office/drawing/2014/main" id="{674165E6-FD05-B24F-AC93-D9283460E088}"/>
+            </a:ext>
+          </a:extLst>
+        </p:cNvPr>
+        <p:cNvGrpSpPr/>
+        <p:nvPr/>
+      </p:nvGrpSpPr>
+      <p:grpSpPr>
+        <a:xfrm>
+          <a:off x="0" y="0"/>
+          <a:ext cx="0" cy="0"/>
+          <a:chOff x="0" y="0"/>
+          <a:chExt cx="0" cy="0"/>
+        </a:xfrm>
+      </p:grpSpPr>
+      <p:pic>
+        <p:nvPicPr>
+          <p:cNvPr id="4" name="Picture 3">
+            <a:extLst>
+              <a:ext uri="{FF2B5EF4-FFF2-40B4-BE49-F238E27FC236}">
+                <a16:creationId xmlns:a16="http://schemas.microsoft.com/office/drawing/2014/main" id="{08A1DEE2-95F6-07A1-21D4-BF72FE11EDBA}"/>
+              </a:ext>
+            </a:extLst>
+          </p:cNvPr>
+          <p:cNvPicPr>
+            <a:picLocks noChangeAspect="1"/>
+          </p:cNvPicPr>
+          <p:nvPr/>
+        </p:nvPicPr>
+        <p:blipFill>
+          <a:blip r:embed="rId3"/>
+          <a:stretch>
+            <a:fillRect/>
+          </a:stretch>
+        </p:blipFill>
+        <p:spPr>
+          <a:xfrm>
+            <a:off x="237520" y="280668"/>
+            <a:ext cx="8668960" cy="4582164"/>
+          </a:xfrm>
+          <a:prstGeom prst="rect">
+            <a:avLst/>
+          </a:prstGeom>
+        </p:spPr>
+      </p:pic>
+    </p:spTree>
+    <p:extLst>
+      <p:ext uri="{BB962C8B-B14F-4D97-AF65-F5344CB8AC3E}">
+        <p14:creationId xmlns:p14="http://schemas.microsoft.com/office/powerpoint/2010/main" val="3274714133"/>
+      </p:ext>
+    </p:extLst>
+  </p:cSld>
+  <p:clrMapOvr>
+    <a:masterClrMapping/>
+  </p:clrMapOvr>
+</p:sld>
+</file>
+
+<file path=ppt/slides/slide15.xml><?xml version="1.0" encoding="utf-8"?>
+<p:sld xmlns:a="http://schemas.openxmlformats.org/drawingml/2006/main" xmlns:r="http://schemas.openxmlformats.org/officeDocument/2006/relationships" xmlns:p="http://schemas.openxmlformats.org/presentationml/2006/main">
+  <p:cSld>
+    <p:spTree>
+      <p:nvGrpSpPr>
+        <p:cNvPr id="1" name="Shape 48">
+          <a:extLst>
+            <a:ext uri="{FF2B5EF4-FFF2-40B4-BE49-F238E27FC236}">
+              <a16:creationId xmlns:a16="http://schemas.microsoft.com/office/drawing/2014/main" id="{2B4CB175-D2CB-E407-5F56-44B42F5C1FA1}"/>
+            </a:ext>
+          </a:extLst>
+        </p:cNvPr>
+        <p:cNvGrpSpPr/>
+        <p:nvPr/>
+      </p:nvGrpSpPr>
+      <p:grpSpPr>
+        <a:xfrm>
+          <a:off x="0" y="0"/>
+          <a:ext cx="0" cy="0"/>
+          <a:chOff x="0" y="0"/>
+          <a:chExt cx="0" cy="0"/>
+        </a:xfrm>
+      </p:grpSpPr>
+      <p:pic>
+        <p:nvPicPr>
+          <p:cNvPr id="3" name="Picture 2">
+            <a:extLst>
+              <a:ext uri="{FF2B5EF4-FFF2-40B4-BE49-F238E27FC236}">
+                <a16:creationId xmlns:a16="http://schemas.microsoft.com/office/drawing/2014/main" id="{05901ECC-1829-A16B-A529-46AF288CC4B5}"/>
+              </a:ext>
+            </a:extLst>
+          </p:cNvPr>
+          <p:cNvPicPr>
+            <a:picLocks noChangeAspect="1"/>
+          </p:cNvPicPr>
+          <p:nvPr/>
+        </p:nvPicPr>
+        <p:blipFill>
+          <a:blip r:embed="rId3"/>
+          <a:stretch>
+            <a:fillRect/>
+          </a:stretch>
+        </p:blipFill>
+        <p:spPr>
+          <a:xfrm>
+            <a:off x="256573" y="266378"/>
+            <a:ext cx="8630854" cy="4610743"/>
+          </a:xfrm>
+          <a:prstGeom prst="rect">
+            <a:avLst/>
+          </a:prstGeom>
+        </p:spPr>
+      </p:pic>
+    </p:spTree>
+    <p:extLst>
+      <p:ext uri="{BB962C8B-B14F-4D97-AF65-F5344CB8AC3E}">
+        <p14:creationId xmlns:p14="http://schemas.microsoft.com/office/powerpoint/2010/main" val="318538465"/>
+      </p:ext>
+    </p:extLst>
+  </p:cSld>
+  <p:clrMapOvr>
+    <a:masterClrMapping/>
+  </p:clrMapOvr>
+</p:sld>
+</file>
+
+<file path=ppt/slides/slide16.xml><?xml version="1.0" encoding="utf-8"?>
+<p:sld xmlns:a="http://schemas.openxmlformats.org/drawingml/2006/main" xmlns:r="http://schemas.openxmlformats.org/officeDocument/2006/relationships" xmlns:p="http://schemas.openxmlformats.org/presentationml/2006/main">
+  <p:cSld>
+    <p:spTree>
+      <p:nvGrpSpPr>
+        <p:cNvPr id="1" name="Shape 53">
+          <a:extLst>
+            <a:ext uri="{FF2B5EF4-FFF2-40B4-BE49-F238E27FC236}">
+              <a16:creationId xmlns:a16="http://schemas.microsoft.com/office/drawing/2014/main" id="{3FB7E49A-803A-8546-5762-9B036DFC1B36}"/>
+            </a:ext>
+          </a:extLst>
+        </p:cNvPr>
+        <p:cNvGrpSpPr/>
+        <p:nvPr/>
+      </p:nvGrpSpPr>
+      <p:grpSpPr>
+        <a:xfrm>
+          <a:off x="0" y="0"/>
+          <a:ext cx="0" cy="0"/>
+          <a:chOff x="0" y="0"/>
+          <a:chExt cx="0" cy="0"/>
+        </a:xfrm>
+      </p:grpSpPr>
+      <p:sp>
+        <p:nvSpPr>
+          <p:cNvPr id="54" name="Google Shape;54;p10">
+            <a:extLst>
+              <a:ext uri="{FF2B5EF4-FFF2-40B4-BE49-F238E27FC236}">
+                <a16:creationId xmlns:a16="http://schemas.microsoft.com/office/drawing/2014/main" id="{D1577212-D3E4-5FFD-B67E-1FAA9998D8E8}"/>
+              </a:ext>
+            </a:extLst>
+          </p:cNvPr>
+          <p:cNvSpPr txBox="1">
+            <a:spLocks noGrp="1"/>
+          </p:cNvSpPr>
+          <p:nvPr>
+            <p:ph type="title"/>
+          </p:nvPr>
+        </p:nvSpPr>
+        <p:spPr>
+          <a:xfrm>
+            <a:off x="311700" y="445025"/>
+            <a:ext cx="8520600" cy="572700"/>
+          </a:xfrm>
+          <a:prstGeom prst="rect">
+            <a:avLst/>
+          </a:prstGeom>
+        </p:spPr>
+        <p:txBody>
+          <a:bodyPr spcFirstLastPara="1" wrap="square" lIns="91425" tIns="91425" rIns="91425" bIns="91425" anchor="t" anchorCtr="0">
+            <a:noAutofit/>
+          </a:bodyPr>
+          <a:lstStyle/>
+          <a:p>
+            <a:pPr marL="0" lvl="0" indent="0" algn="l" rtl="0">
+              <a:spcBef>
+                <a:spcPts val="0"/>
+              </a:spcBef>
+              <a:spcAft>
+                <a:spcPts val="0"/>
+              </a:spcAft>
+              <a:buNone/>
+            </a:pPr>
+            <a:r>
+              <a:rPr lang="en-US" dirty="0"/>
+              <a:t>Resources</a:t>
+            </a:r>
+            <a:endParaRPr dirty="0"/>
+          </a:p>
+        </p:txBody>
+      </p:sp>
+      <p:sp>
+        <p:nvSpPr>
+          <p:cNvPr id="2" name="Google Shape;165;p24">
+            <a:extLst>
+              <a:ext uri="{FF2B5EF4-FFF2-40B4-BE49-F238E27FC236}">
+                <a16:creationId xmlns:a16="http://schemas.microsoft.com/office/drawing/2014/main" id="{692B0195-5BAA-928A-6C58-036B9B3736DA}"/>
+              </a:ext>
+            </a:extLst>
+          </p:cNvPr>
+          <p:cNvSpPr txBox="1">
+            <a:spLocks/>
+          </p:cNvSpPr>
+          <p:nvPr/>
+        </p:nvSpPr>
+        <p:spPr>
+          <a:xfrm>
+            <a:off x="311699" y="1041300"/>
+            <a:ext cx="5678903" cy="3060900"/>
+          </a:xfrm>
+          <a:prstGeom prst="rect">
+            <a:avLst/>
+          </a:prstGeom>
+          <a:noFill/>
+          <a:ln>
+            <a:noFill/>
+          </a:ln>
+        </p:spPr>
+        <p:txBody>
+          <a:bodyPr spcFirstLastPara="1" wrap="square" lIns="91425" tIns="91425" rIns="91425" bIns="91425" anchor="t" anchorCtr="0">
+            <a:noAutofit/>
+          </a:bodyPr>
+          <a:lstStyle>
+            <a:defPPr marR="0" lvl="0" algn="l" rtl="0">
+              <a:lnSpc>
+                <a:spcPct val="100000"/>
+              </a:lnSpc>
+              <a:spcBef>
+                <a:spcPts val="0"/>
+              </a:spcBef>
+              <a:spcAft>
+                <a:spcPts val="0"/>
+              </a:spcAft>
+            </a:defPPr>
+            <a:lvl1pPr marL="457200" marR="0" lvl="0" indent="-342900" algn="l" rtl="0">
+              <a:lnSpc>
+                <a:spcPct val="114000"/>
+              </a:lnSpc>
+              <a:spcBef>
+                <a:spcPts val="0"/>
+              </a:spcBef>
+              <a:spcAft>
+                <a:spcPts val="0"/>
+              </a:spcAft>
+              <a:buClr>
+                <a:srgbClr val="434343"/>
+              </a:buClr>
+              <a:buSzPts val="1800"/>
+              <a:buFont typeface="Arial"/>
+              <a:buChar char="●"/>
+              <a:defRPr sz="1800" b="0" i="0" u="none" strike="noStrike" cap="none">
+                <a:solidFill>
+                  <a:srgbClr val="434343"/>
+                </a:solidFill>
+                <a:latin typeface="Arial"/>
+                <a:ea typeface="Arial"/>
+                <a:cs typeface="Arial"/>
+                <a:sym typeface="Arial"/>
+              </a:defRPr>
+            </a:lvl1pPr>
+            <a:lvl2pPr marL="914400" marR="0" lvl="1" indent="-317500" algn="l" rtl="0">
+              <a:lnSpc>
+                <a:spcPct val="114000"/>
+              </a:lnSpc>
+              <a:spcBef>
+                <a:spcPts val="800"/>
+              </a:spcBef>
+              <a:spcAft>
+                <a:spcPts val="0"/>
+              </a:spcAft>
+              <a:buClr>
+                <a:srgbClr val="434343"/>
+              </a:buClr>
+              <a:buSzPts val="1400"/>
+              <a:buFont typeface="Arial"/>
+              <a:buChar char="○"/>
+              <a:defRPr sz="1400" b="0" i="0" u="none" strike="noStrike" cap="none">
+                <a:solidFill>
+                  <a:srgbClr val="434343"/>
+                </a:solidFill>
+                <a:latin typeface="Arial"/>
+                <a:ea typeface="Arial"/>
+                <a:cs typeface="Arial"/>
+                <a:sym typeface="Arial"/>
+              </a:defRPr>
+            </a:lvl2pPr>
+            <a:lvl3pPr marL="1371600" marR="0" lvl="2" indent="-317500" algn="l" rtl="0">
+              <a:lnSpc>
+                <a:spcPct val="114000"/>
+              </a:lnSpc>
+              <a:spcBef>
+                <a:spcPts val="800"/>
+              </a:spcBef>
+              <a:spcAft>
+                <a:spcPts val="0"/>
+              </a:spcAft>
+              <a:buClr>
+                <a:srgbClr val="434343"/>
+              </a:buClr>
+              <a:buSzPts val="1400"/>
+              <a:buFont typeface="Arial"/>
+              <a:buChar char="■"/>
+              <a:defRPr sz="1400" b="0" i="0" u="none" strike="noStrike" cap="none">
+                <a:solidFill>
+                  <a:srgbClr val="434343"/>
+                </a:solidFill>
+                <a:latin typeface="Arial"/>
+                <a:ea typeface="Arial"/>
+                <a:cs typeface="Arial"/>
+                <a:sym typeface="Arial"/>
+              </a:defRPr>
+            </a:lvl3pPr>
+            <a:lvl4pPr marL="1828800" marR="0" lvl="3" indent="-317500" algn="l" rtl="0">
+              <a:lnSpc>
+                <a:spcPct val="114000"/>
+              </a:lnSpc>
+              <a:spcBef>
+                <a:spcPts val="800"/>
+              </a:spcBef>
+              <a:spcAft>
+                <a:spcPts val="0"/>
+              </a:spcAft>
+              <a:buClr>
+                <a:srgbClr val="434343"/>
+              </a:buClr>
+              <a:buSzPts val="1400"/>
+              <a:buFont typeface="Arial"/>
+              <a:buChar char="●"/>
+              <a:defRPr sz="1400" b="0" i="0" u="none" strike="noStrike" cap="none">
+                <a:solidFill>
+                  <a:srgbClr val="434343"/>
+                </a:solidFill>
+                <a:latin typeface="Arial"/>
+                <a:ea typeface="Arial"/>
+                <a:cs typeface="Arial"/>
+                <a:sym typeface="Arial"/>
+              </a:defRPr>
+            </a:lvl4pPr>
+            <a:lvl5pPr marL="2286000" marR="0" lvl="4" indent="-317500" algn="l" rtl="0">
+              <a:lnSpc>
+                <a:spcPct val="114000"/>
+              </a:lnSpc>
+              <a:spcBef>
+                <a:spcPts val="800"/>
+              </a:spcBef>
+              <a:spcAft>
+                <a:spcPts val="0"/>
+              </a:spcAft>
+              <a:buClr>
+                <a:srgbClr val="434343"/>
+              </a:buClr>
+              <a:buSzPts val="1400"/>
+              <a:buFont typeface="Arial"/>
+              <a:buChar char="○"/>
+              <a:defRPr sz="1400" b="0" i="0" u="none" strike="noStrike" cap="none">
+                <a:solidFill>
+                  <a:srgbClr val="434343"/>
+                </a:solidFill>
+                <a:latin typeface="Arial"/>
+                <a:ea typeface="Arial"/>
+                <a:cs typeface="Arial"/>
+                <a:sym typeface="Arial"/>
+              </a:defRPr>
+            </a:lvl5pPr>
+            <a:lvl6pPr marL="2743200" marR="0" lvl="5" indent="-317500" algn="l" rtl="0">
+              <a:lnSpc>
+                <a:spcPct val="114000"/>
+              </a:lnSpc>
+              <a:spcBef>
+                <a:spcPts val="800"/>
+              </a:spcBef>
+              <a:spcAft>
+                <a:spcPts val="0"/>
+              </a:spcAft>
+              <a:buClr>
+                <a:srgbClr val="434343"/>
+              </a:buClr>
+              <a:buSzPts val="1400"/>
+              <a:buFont typeface="Arial"/>
+              <a:buChar char="■"/>
+              <a:defRPr sz="1400" b="0" i="0" u="none" strike="noStrike" cap="none">
+                <a:solidFill>
+                  <a:srgbClr val="434343"/>
+                </a:solidFill>
+                <a:latin typeface="Arial"/>
+                <a:ea typeface="Arial"/>
+                <a:cs typeface="Arial"/>
+                <a:sym typeface="Arial"/>
+              </a:defRPr>
+            </a:lvl6pPr>
+            <a:lvl7pPr marL="3200400" marR="0" lvl="6" indent="-317500" algn="l" rtl="0">
+              <a:lnSpc>
+                <a:spcPct val="114000"/>
+              </a:lnSpc>
+              <a:spcBef>
+                <a:spcPts val="800"/>
+              </a:spcBef>
+              <a:spcAft>
+                <a:spcPts val="0"/>
+              </a:spcAft>
+              <a:buClr>
+                <a:srgbClr val="434343"/>
+              </a:buClr>
+              <a:buSzPts val="1400"/>
+              <a:buFont typeface="Arial"/>
+              <a:buChar char="●"/>
+              <a:defRPr sz="1400" b="0" i="0" u="none" strike="noStrike" cap="none">
+                <a:solidFill>
+                  <a:srgbClr val="434343"/>
+                </a:solidFill>
+                <a:latin typeface="Arial"/>
+                <a:ea typeface="Arial"/>
+                <a:cs typeface="Arial"/>
+                <a:sym typeface="Arial"/>
+              </a:defRPr>
+            </a:lvl7pPr>
+            <a:lvl8pPr marL="3657600" marR="0" lvl="7" indent="-317500" algn="l" rtl="0">
+              <a:lnSpc>
+                <a:spcPct val="114000"/>
+              </a:lnSpc>
+              <a:spcBef>
+                <a:spcPts val="800"/>
+              </a:spcBef>
+              <a:spcAft>
+                <a:spcPts val="0"/>
+              </a:spcAft>
+              <a:buClr>
+                <a:srgbClr val="434343"/>
+              </a:buClr>
+              <a:buSzPts val="1400"/>
+              <a:buFont typeface="Arial"/>
+              <a:buChar char="○"/>
+              <a:defRPr sz="1400" b="0" i="0" u="none" strike="noStrike" cap="none">
+                <a:solidFill>
+                  <a:srgbClr val="434343"/>
+                </a:solidFill>
+                <a:latin typeface="Arial"/>
+                <a:ea typeface="Arial"/>
+                <a:cs typeface="Arial"/>
+                <a:sym typeface="Arial"/>
+              </a:defRPr>
+            </a:lvl8pPr>
+            <a:lvl9pPr marL="4114800" marR="0" lvl="8" indent="-317500" algn="l" rtl="0">
+              <a:lnSpc>
+                <a:spcPct val="114000"/>
+              </a:lnSpc>
+              <a:spcBef>
+                <a:spcPts val="800"/>
+              </a:spcBef>
+              <a:spcAft>
+                <a:spcPts val="800"/>
+              </a:spcAft>
+              <a:buClr>
+                <a:srgbClr val="434343"/>
+              </a:buClr>
+              <a:buSzPts val="1400"/>
+              <a:buFont typeface="Arial"/>
+              <a:buChar char="■"/>
+              <a:defRPr sz="1400" b="0" i="0" u="none" strike="noStrike" cap="none">
+                <a:solidFill>
+                  <a:srgbClr val="434343"/>
+                </a:solidFill>
+                <a:latin typeface="Arial"/>
+                <a:ea typeface="Arial"/>
+                <a:cs typeface="Arial"/>
+                <a:sym typeface="Arial"/>
+              </a:defRPr>
+            </a:lvl9pPr>
+          </a:lstStyle>
+          <a:p>
+            <a:pPr indent="-317500">
+              <a:buSzPts val="1400"/>
+            </a:pPr>
+            <a:r>
+              <a:rPr lang="en-US" u="sng" dirty="0">
+                <a:solidFill>
+                  <a:schemeClr val="hlink"/>
+                </a:solidFill>
+                <a:hlinkClick r:id="rId3"/>
+              </a:rPr>
+              <a:t>Community Repository</a:t>
+            </a:r>
+            <a:r>
+              <a:rPr lang="en-US" dirty="0"/>
+              <a:t>: Meeting Minutes, and Schedule</a:t>
+            </a:r>
+          </a:p>
+          <a:p>
+            <a:pPr indent="-317500">
+              <a:buSzPts val="1400"/>
+            </a:pPr>
+            <a:r>
+              <a:rPr lang="en-US" u="sng" dirty="0">
+                <a:solidFill>
+                  <a:schemeClr val="hlink"/>
+                </a:solidFill>
+                <a:hlinkClick r:id="rId3"/>
+              </a:rPr>
+              <a:t>meta-</a:t>
+            </a:r>
+            <a:r>
+              <a:rPr lang="en-US" u="sng" dirty="0" err="1">
+                <a:solidFill>
+                  <a:schemeClr val="hlink"/>
+                </a:solidFill>
+                <a:hlinkClick r:id="rId3"/>
+              </a:rPr>
+              <a:t>sgl</a:t>
+            </a:r>
+            <a:r>
+              <a:rPr lang="en-US" dirty="0"/>
+              <a:t>: Linux Distro repository</a:t>
+            </a:r>
+          </a:p>
+          <a:p>
+            <a:pPr indent="-317500">
+              <a:buSzPts val="1400"/>
+            </a:pPr>
+            <a:r>
+              <a:rPr lang="en-US" u="sng" dirty="0">
+                <a:solidFill>
+                  <a:schemeClr val="hlink"/>
+                </a:solidFill>
+                <a:hlinkClick r:id="rId4"/>
+              </a:rPr>
+              <a:t>Website</a:t>
+            </a:r>
+            <a:r>
+              <a:rPr lang="en-US" dirty="0"/>
+              <a:t>: Landing Page with all the info on the SIG including the mailing list</a:t>
+            </a:r>
+          </a:p>
+          <a:p>
+            <a:pPr indent="-317500">
+              <a:buSzPts val="1400"/>
+            </a:pPr>
+            <a:r>
+              <a:rPr lang="en-US" u="sng" dirty="0">
+                <a:solidFill>
+                  <a:schemeClr val="hlink"/>
+                </a:solidFill>
+                <a:hlinkClick r:id="rId5"/>
+              </a:rPr>
+              <a:t>SGL Workshop Videos</a:t>
+            </a:r>
+            <a:r>
+              <a:rPr lang="en-US" dirty="0"/>
+              <a:t>: YouTube Playlist with all the videos from the first Workshop at Goddard Space Flight Center</a:t>
+            </a:r>
+          </a:p>
+          <a:p>
+            <a:pPr indent="-317500">
+              <a:buSzPts val="1400"/>
+            </a:pPr>
+            <a:r>
+              <a:rPr lang="en-US" dirty="0">
+                <a:hlinkClick r:id="rId6"/>
+              </a:rPr>
+              <a:t>Aerospace WG website </a:t>
+            </a:r>
+            <a:r>
+              <a:rPr lang="en-US" dirty="0"/>
+              <a:t>(mailing list / meetings)</a:t>
+            </a:r>
+          </a:p>
+        </p:txBody>
+      </p:sp>
+      <p:pic>
+        <p:nvPicPr>
+          <p:cNvPr id="7" name="Picture 6">
+            <a:extLst>
+              <a:ext uri="{FF2B5EF4-FFF2-40B4-BE49-F238E27FC236}">
+                <a16:creationId xmlns:a16="http://schemas.microsoft.com/office/drawing/2014/main" id="{B0D45002-4D3D-1F59-4063-848533EC6519}"/>
+              </a:ext>
+            </a:extLst>
+          </p:cNvPr>
+          <p:cNvPicPr>
+            <a:picLocks noChangeAspect="1"/>
+          </p:cNvPicPr>
+          <p:nvPr/>
+        </p:nvPicPr>
+        <p:blipFill>
+          <a:blip r:embed="rId7"/>
+          <a:stretch>
+            <a:fillRect/>
+          </a:stretch>
+        </p:blipFill>
+        <p:spPr>
+          <a:xfrm>
+            <a:off x="6788184" y="445025"/>
+            <a:ext cx="1576280" cy="1576280"/>
+          </a:xfrm>
+          <a:prstGeom prst="rect">
+            <a:avLst/>
+          </a:prstGeom>
+        </p:spPr>
+      </p:pic>
+      <p:pic>
+        <p:nvPicPr>
+          <p:cNvPr id="9" name="Picture 8">
+            <a:extLst>
+              <a:ext uri="{FF2B5EF4-FFF2-40B4-BE49-F238E27FC236}">
+                <a16:creationId xmlns:a16="http://schemas.microsoft.com/office/drawing/2014/main" id="{66278772-5B3C-DB3F-C195-BC33DAEBE297}"/>
+              </a:ext>
+            </a:extLst>
+          </p:cNvPr>
+          <p:cNvPicPr>
+            <a:picLocks noChangeAspect="1"/>
+          </p:cNvPicPr>
+          <p:nvPr/>
+        </p:nvPicPr>
+        <p:blipFill>
+          <a:blip r:embed="rId8"/>
+          <a:stretch>
+            <a:fillRect/>
+          </a:stretch>
+        </p:blipFill>
+        <p:spPr>
+          <a:xfrm>
+            <a:off x="6735707" y="2357546"/>
+            <a:ext cx="2096593" cy="2571749"/>
+          </a:xfrm>
+          <a:prstGeom prst="rect">
+            <a:avLst/>
+          </a:prstGeom>
+        </p:spPr>
+      </p:pic>
+    </p:spTree>
+    <p:extLst>
+      <p:ext uri="{BB962C8B-B14F-4D97-AF65-F5344CB8AC3E}">
+        <p14:creationId xmlns:p14="http://schemas.microsoft.com/office/powerpoint/2010/main" val="1215439811"/>
+      </p:ext>
+    </p:extLst>
+  </p:cSld>
+  <p:clrMapOvr>
+    <a:masterClrMapping/>
+  </p:clrMapOvr>
+</p:sld>
+</file>
+
+<file path=ppt/slides/slide17.xml><?xml version="1.0" encoding="utf-8"?>
+<p:sld xmlns:a="http://schemas.openxmlformats.org/drawingml/2006/main" xmlns:r="http://schemas.openxmlformats.org/officeDocument/2006/relationships" xmlns:p="http://schemas.openxmlformats.org/presentationml/2006/main">
+  <p:cSld>
+    <p:spTree>
+      <p:nvGrpSpPr>
+        <p:cNvPr id="1" name="Shape 48"/>
+        <p:cNvGrpSpPr/>
+        <p:nvPr/>
+      </p:nvGrpSpPr>
+      <p:grpSpPr>
+        <a:xfrm>
+          <a:off x="0" y="0"/>
+          <a:ext cx="0" cy="0"/>
+          <a:chOff x="0" y="0"/>
+          <a:chExt cx="0" cy="0"/>
+        </a:xfrm>
+      </p:grpSpPr>
+      <p:sp>
+        <p:nvSpPr>
+          <p:cNvPr id="49" name="Google Shape;49;p9"/>
+          <p:cNvSpPr txBox="1">
+            <a:spLocks noGrp="1"/>
+          </p:cNvSpPr>
+          <p:nvPr>
+            <p:ph type="ctrTitle"/>
+          </p:nvPr>
+        </p:nvSpPr>
+        <p:spPr>
+          <a:xfrm>
+            <a:off x="319500" y="1783775"/>
+            <a:ext cx="8505000" cy="1827600"/>
+          </a:xfrm>
+          <a:prstGeom prst="rect">
+            <a:avLst/>
+          </a:prstGeom>
+        </p:spPr>
+        <p:txBody>
+          <a:bodyPr spcFirstLastPara="1" wrap="square" lIns="91425" tIns="91425" rIns="91425" bIns="91425" anchor="ctr" anchorCtr="0">
+            <a:noAutofit/>
+          </a:bodyPr>
+          <a:lstStyle/>
+          <a:p>
+            <a:pPr marL="0" lvl="0" indent="0" algn="ctr" rtl="0">
+              <a:spcBef>
+                <a:spcPts val="0"/>
+              </a:spcBef>
+              <a:spcAft>
+                <a:spcPts val="0"/>
+              </a:spcAft>
+              <a:buNone/>
+            </a:pPr>
+            <a:r>
+              <a:rPr lang="en-US" dirty="0"/>
+              <a:t>Thank you for attending!</a:t>
+            </a:r>
+            <a:endParaRPr dirty="0"/>
+          </a:p>
+        </p:txBody>
+      </p:sp>
+    </p:spTree>
+  </p:cSld>
+  <p:clrMapOvr>
+    <a:masterClrMapping/>
+  </p:clrMapOvr>
+</p:sld>
+</file>
+
 <file path=ppt/slides/slide2.xml><?xml version="1.0" encoding="utf-8"?>
 <p:sld xmlns:a="http://schemas.openxmlformats.org/drawingml/2006/main" xmlns:r="http://schemas.openxmlformats.org/officeDocument/2006/relationships" xmlns:p="http://schemas.openxmlformats.org/presentationml/2006/main">
   <p:cSld>
@@ -8622,10 +10629,10 @@
   <p:cSld>
     <p:spTree>
       <p:nvGrpSpPr>
-        <p:cNvPr id="1" name="Shape 53">
+        <p:cNvPr id="1" name="Shape 48">
           <a:extLst>
             <a:ext uri="{FF2B5EF4-FFF2-40B4-BE49-F238E27FC236}">
-              <a16:creationId xmlns:a16="http://schemas.microsoft.com/office/drawing/2014/main" id="{3FB7E49A-803A-8546-5762-9B036DFC1B36}"/>
+              <a16:creationId xmlns:a16="http://schemas.microsoft.com/office/drawing/2014/main" id="{7E761841-269A-108B-FBFF-259512B8B6B9}"/>
             </a:ext>
           </a:extLst>
         </p:cNvPr>
@@ -8640,436 +10647,12 @@
           <a:chExt cx="0" cy="0"/>
         </a:xfrm>
       </p:grpSpPr>
-      <p:sp>
-        <p:nvSpPr>
-          <p:cNvPr id="54" name="Google Shape;54;p10">
+      <p:pic>
+        <p:nvPicPr>
+          <p:cNvPr id="5" name="Picture 4">
             <a:extLst>
               <a:ext uri="{FF2B5EF4-FFF2-40B4-BE49-F238E27FC236}">
-                <a16:creationId xmlns:a16="http://schemas.microsoft.com/office/drawing/2014/main" id="{D1577212-D3E4-5FFD-B67E-1FAA9998D8E8}"/>
-              </a:ext>
-            </a:extLst>
-          </p:cNvPr>
-          <p:cNvSpPr txBox="1">
-            <a:spLocks noGrp="1"/>
-          </p:cNvSpPr>
-          <p:nvPr>
-            <p:ph type="title"/>
-          </p:nvPr>
-        </p:nvSpPr>
-        <p:spPr>
-          <a:xfrm>
-            <a:off x="311700" y="445025"/>
-            <a:ext cx="8520600" cy="572700"/>
-          </a:xfrm>
-          <a:prstGeom prst="rect">
-            <a:avLst/>
-          </a:prstGeom>
-        </p:spPr>
-        <p:txBody>
-          <a:bodyPr spcFirstLastPara="1" wrap="square" lIns="91425" tIns="91425" rIns="91425" bIns="91425" anchor="t" anchorCtr="0">
-            <a:noAutofit/>
-          </a:bodyPr>
-          <a:lstStyle/>
-          <a:p>
-            <a:pPr marL="0" lvl="0" indent="0" algn="l" rtl="0">
-              <a:spcBef>
-                <a:spcPts val="0"/>
-              </a:spcBef>
-              <a:spcAft>
-                <a:spcPts val="0"/>
-              </a:spcAft>
-              <a:buNone/>
-            </a:pPr>
-            <a:r>
-              <a:rPr lang="en-US" dirty="0"/>
-              <a:t>Resources</a:t>
-            </a:r>
-            <a:endParaRPr dirty="0"/>
-          </a:p>
-        </p:txBody>
-      </p:sp>
-      <p:sp>
-        <p:nvSpPr>
-          <p:cNvPr id="2" name="Google Shape;165;p24">
-            <a:extLst>
-              <a:ext uri="{FF2B5EF4-FFF2-40B4-BE49-F238E27FC236}">
-                <a16:creationId xmlns:a16="http://schemas.microsoft.com/office/drawing/2014/main" id="{692B0195-5BAA-928A-6C58-036B9B3736DA}"/>
-              </a:ext>
-            </a:extLst>
-          </p:cNvPr>
-          <p:cNvSpPr txBox="1">
-            <a:spLocks/>
-          </p:cNvSpPr>
-          <p:nvPr/>
-        </p:nvSpPr>
-        <p:spPr>
-          <a:xfrm>
-            <a:off x="311699" y="1041300"/>
-            <a:ext cx="5678903" cy="3060900"/>
-          </a:xfrm>
-          <a:prstGeom prst="rect">
-            <a:avLst/>
-          </a:prstGeom>
-          <a:noFill/>
-          <a:ln>
-            <a:noFill/>
-          </a:ln>
-        </p:spPr>
-        <p:txBody>
-          <a:bodyPr spcFirstLastPara="1" wrap="square" lIns="91425" tIns="91425" rIns="91425" bIns="91425" anchor="t" anchorCtr="0">
-            <a:noAutofit/>
-          </a:bodyPr>
-          <a:lstStyle>
-            <a:defPPr marR="0" lvl="0" algn="l" rtl="0">
-              <a:lnSpc>
-                <a:spcPct val="100000"/>
-              </a:lnSpc>
-              <a:spcBef>
-                <a:spcPts val="0"/>
-              </a:spcBef>
-              <a:spcAft>
-                <a:spcPts val="0"/>
-              </a:spcAft>
-            </a:defPPr>
-            <a:lvl1pPr marL="457200" marR="0" lvl="0" indent="-342900" algn="l" rtl="0">
-              <a:lnSpc>
-                <a:spcPct val="114000"/>
-              </a:lnSpc>
-              <a:spcBef>
-                <a:spcPts val="0"/>
-              </a:spcBef>
-              <a:spcAft>
-                <a:spcPts val="0"/>
-              </a:spcAft>
-              <a:buClr>
-                <a:srgbClr val="434343"/>
-              </a:buClr>
-              <a:buSzPts val="1800"/>
-              <a:buFont typeface="Arial"/>
-              <a:buChar char="●"/>
-              <a:defRPr sz="1800" b="0" i="0" u="none" strike="noStrike" cap="none">
-                <a:solidFill>
-                  <a:srgbClr val="434343"/>
-                </a:solidFill>
-                <a:latin typeface="Arial"/>
-                <a:ea typeface="Arial"/>
-                <a:cs typeface="Arial"/>
-                <a:sym typeface="Arial"/>
-              </a:defRPr>
-            </a:lvl1pPr>
-            <a:lvl2pPr marL="914400" marR="0" lvl="1" indent="-317500" algn="l" rtl="0">
-              <a:lnSpc>
-                <a:spcPct val="114000"/>
-              </a:lnSpc>
-              <a:spcBef>
-                <a:spcPts val="800"/>
-              </a:spcBef>
-              <a:spcAft>
-                <a:spcPts val="0"/>
-              </a:spcAft>
-              <a:buClr>
-                <a:srgbClr val="434343"/>
-              </a:buClr>
-              <a:buSzPts val="1400"/>
-              <a:buFont typeface="Arial"/>
-              <a:buChar char="○"/>
-              <a:defRPr sz="1400" b="0" i="0" u="none" strike="noStrike" cap="none">
-                <a:solidFill>
-                  <a:srgbClr val="434343"/>
-                </a:solidFill>
-                <a:latin typeface="Arial"/>
-                <a:ea typeface="Arial"/>
-                <a:cs typeface="Arial"/>
-                <a:sym typeface="Arial"/>
-              </a:defRPr>
-            </a:lvl2pPr>
-            <a:lvl3pPr marL="1371600" marR="0" lvl="2" indent="-317500" algn="l" rtl="0">
-              <a:lnSpc>
-                <a:spcPct val="114000"/>
-              </a:lnSpc>
-              <a:spcBef>
-                <a:spcPts val="800"/>
-              </a:spcBef>
-              <a:spcAft>
-                <a:spcPts val="0"/>
-              </a:spcAft>
-              <a:buClr>
-                <a:srgbClr val="434343"/>
-              </a:buClr>
-              <a:buSzPts val="1400"/>
-              <a:buFont typeface="Arial"/>
-              <a:buChar char="■"/>
-              <a:defRPr sz="1400" b="0" i="0" u="none" strike="noStrike" cap="none">
-                <a:solidFill>
-                  <a:srgbClr val="434343"/>
-                </a:solidFill>
-                <a:latin typeface="Arial"/>
-                <a:ea typeface="Arial"/>
-                <a:cs typeface="Arial"/>
-                <a:sym typeface="Arial"/>
-              </a:defRPr>
-            </a:lvl3pPr>
-            <a:lvl4pPr marL="1828800" marR="0" lvl="3" indent="-317500" algn="l" rtl="0">
-              <a:lnSpc>
-                <a:spcPct val="114000"/>
-              </a:lnSpc>
-              <a:spcBef>
-                <a:spcPts val="800"/>
-              </a:spcBef>
-              <a:spcAft>
-                <a:spcPts val="0"/>
-              </a:spcAft>
-              <a:buClr>
-                <a:srgbClr val="434343"/>
-              </a:buClr>
-              <a:buSzPts val="1400"/>
-              <a:buFont typeface="Arial"/>
-              <a:buChar char="●"/>
-              <a:defRPr sz="1400" b="0" i="0" u="none" strike="noStrike" cap="none">
-                <a:solidFill>
-                  <a:srgbClr val="434343"/>
-                </a:solidFill>
-                <a:latin typeface="Arial"/>
-                <a:ea typeface="Arial"/>
-                <a:cs typeface="Arial"/>
-                <a:sym typeface="Arial"/>
-              </a:defRPr>
-            </a:lvl4pPr>
-            <a:lvl5pPr marL="2286000" marR="0" lvl="4" indent="-317500" algn="l" rtl="0">
-              <a:lnSpc>
-                <a:spcPct val="114000"/>
-              </a:lnSpc>
-              <a:spcBef>
-                <a:spcPts val="800"/>
-              </a:spcBef>
-              <a:spcAft>
-                <a:spcPts val="0"/>
-              </a:spcAft>
-              <a:buClr>
-                <a:srgbClr val="434343"/>
-              </a:buClr>
-              <a:buSzPts val="1400"/>
-              <a:buFont typeface="Arial"/>
-              <a:buChar char="○"/>
-              <a:defRPr sz="1400" b="0" i="0" u="none" strike="noStrike" cap="none">
-                <a:solidFill>
-                  <a:srgbClr val="434343"/>
-                </a:solidFill>
-                <a:latin typeface="Arial"/>
-                <a:ea typeface="Arial"/>
-                <a:cs typeface="Arial"/>
-                <a:sym typeface="Arial"/>
-              </a:defRPr>
-            </a:lvl5pPr>
-            <a:lvl6pPr marL="2743200" marR="0" lvl="5" indent="-317500" algn="l" rtl="0">
-              <a:lnSpc>
-                <a:spcPct val="114000"/>
-              </a:lnSpc>
-              <a:spcBef>
-                <a:spcPts val="800"/>
-              </a:spcBef>
-              <a:spcAft>
-                <a:spcPts val="0"/>
-              </a:spcAft>
-              <a:buClr>
-                <a:srgbClr val="434343"/>
-              </a:buClr>
-              <a:buSzPts val="1400"/>
-              <a:buFont typeface="Arial"/>
-              <a:buChar char="■"/>
-              <a:defRPr sz="1400" b="0" i="0" u="none" strike="noStrike" cap="none">
-                <a:solidFill>
-                  <a:srgbClr val="434343"/>
-                </a:solidFill>
-                <a:latin typeface="Arial"/>
-                <a:ea typeface="Arial"/>
-                <a:cs typeface="Arial"/>
-                <a:sym typeface="Arial"/>
-              </a:defRPr>
-            </a:lvl6pPr>
-            <a:lvl7pPr marL="3200400" marR="0" lvl="6" indent="-317500" algn="l" rtl="0">
-              <a:lnSpc>
-                <a:spcPct val="114000"/>
-              </a:lnSpc>
-              <a:spcBef>
-                <a:spcPts val="800"/>
-              </a:spcBef>
-              <a:spcAft>
-                <a:spcPts val="0"/>
-              </a:spcAft>
-              <a:buClr>
-                <a:srgbClr val="434343"/>
-              </a:buClr>
-              <a:buSzPts val="1400"/>
-              <a:buFont typeface="Arial"/>
-              <a:buChar char="●"/>
-              <a:defRPr sz="1400" b="0" i="0" u="none" strike="noStrike" cap="none">
-                <a:solidFill>
-                  <a:srgbClr val="434343"/>
-                </a:solidFill>
-                <a:latin typeface="Arial"/>
-                <a:ea typeface="Arial"/>
-                <a:cs typeface="Arial"/>
-                <a:sym typeface="Arial"/>
-              </a:defRPr>
-            </a:lvl7pPr>
-            <a:lvl8pPr marL="3657600" marR="0" lvl="7" indent="-317500" algn="l" rtl="0">
-              <a:lnSpc>
-                <a:spcPct val="114000"/>
-              </a:lnSpc>
-              <a:spcBef>
-                <a:spcPts val="800"/>
-              </a:spcBef>
-              <a:spcAft>
-                <a:spcPts val="0"/>
-              </a:spcAft>
-              <a:buClr>
-                <a:srgbClr val="434343"/>
-              </a:buClr>
-              <a:buSzPts val="1400"/>
-              <a:buFont typeface="Arial"/>
-              <a:buChar char="○"/>
-              <a:defRPr sz="1400" b="0" i="0" u="none" strike="noStrike" cap="none">
-                <a:solidFill>
-                  <a:srgbClr val="434343"/>
-                </a:solidFill>
-                <a:latin typeface="Arial"/>
-                <a:ea typeface="Arial"/>
-                <a:cs typeface="Arial"/>
-                <a:sym typeface="Arial"/>
-              </a:defRPr>
-            </a:lvl8pPr>
-            <a:lvl9pPr marL="4114800" marR="0" lvl="8" indent="-317500" algn="l" rtl="0">
-              <a:lnSpc>
-                <a:spcPct val="114000"/>
-              </a:lnSpc>
-              <a:spcBef>
-                <a:spcPts val="800"/>
-              </a:spcBef>
-              <a:spcAft>
-                <a:spcPts val="800"/>
-              </a:spcAft>
-              <a:buClr>
-                <a:srgbClr val="434343"/>
-              </a:buClr>
-              <a:buSzPts val="1400"/>
-              <a:buFont typeface="Arial"/>
-              <a:buChar char="■"/>
-              <a:defRPr sz="1400" b="0" i="0" u="none" strike="noStrike" cap="none">
-                <a:solidFill>
-                  <a:srgbClr val="434343"/>
-                </a:solidFill>
-                <a:latin typeface="Arial"/>
-                <a:ea typeface="Arial"/>
-                <a:cs typeface="Arial"/>
-                <a:sym typeface="Arial"/>
-              </a:defRPr>
-            </a:lvl9pPr>
-          </a:lstStyle>
-          <a:p>
-            <a:pPr indent="-317500">
-              <a:buSzPts val="1400"/>
-            </a:pPr>
-            <a:r>
-              <a:rPr lang="en-US" u="sng" dirty="0">
-                <a:solidFill>
-                  <a:schemeClr val="hlink"/>
-                </a:solidFill>
-                <a:hlinkClick r:id="rId3"/>
-              </a:rPr>
-              <a:t>Community Repository</a:t>
-            </a:r>
-            <a:r>
-              <a:rPr lang="en-US" dirty="0"/>
-              <a:t>: Meeting Minutes, and Schedule</a:t>
-            </a:r>
-          </a:p>
-          <a:p>
-            <a:pPr indent="-317500">
-              <a:buSzPts val="1400"/>
-            </a:pPr>
-            <a:r>
-              <a:rPr lang="en-US" u="sng" dirty="0">
-                <a:solidFill>
-                  <a:schemeClr val="hlink"/>
-                </a:solidFill>
-                <a:hlinkClick r:id="rId3"/>
-              </a:rPr>
-              <a:t>meta-</a:t>
-            </a:r>
-            <a:r>
-              <a:rPr lang="en-US" u="sng" dirty="0" err="1">
-                <a:solidFill>
-                  <a:schemeClr val="hlink"/>
-                </a:solidFill>
-                <a:hlinkClick r:id="rId3"/>
-              </a:rPr>
-              <a:t>sgl</a:t>
-            </a:r>
-            <a:r>
-              <a:rPr lang="en-US" dirty="0"/>
-              <a:t>: Linux Distro repository</a:t>
-            </a:r>
-          </a:p>
-          <a:p>
-            <a:pPr indent="-317500">
-              <a:buSzPts val="1400"/>
-            </a:pPr>
-            <a:r>
-              <a:rPr lang="en-US" u="sng" dirty="0">
-                <a:solidFill>
-                  <a:schemeClr val="hlink"/>
-                </a:solidFill>
-                <a:hlinkClick r:id="rId4"/>
-              </a:rPr>
-              <a:t>Website</a:t>
-            </a:r>
-            <a:r>
-              <a:rPr lang="en-US" dirty="0"/>
-              <a:t>: Landing Page with all the info on the SIG including the mailing list</a:t>
-            </a:r>
-          </a:p>
-          <a:p>
-            <a:pPr indent="-317500">
-              <a:buSzPts val="1400"/>
-            </a:pPr>
-            <a:r>
-              <a:rPr lang="en-US" u="sng" dirty="0">
-                <a:solidFill>
-                  <a:schemeClr val="hlink"/>
-                </a:solidFill>
-                <a:hlinkClick r:id="rId5"/>
-              </a:rPr>
-              <a:t>SGL Workshop Videos</a:t>
-            </a:r>
-            <a:r>
-              <a:rPr lang="en-US" dirty="0"/>
-              <a:t>: YouTube Playlist with all the videos from the first Workshop at Goddard Space Flight Center</a:t>
-            </a:r>
-          </a:p>
-          <a:p>
-            <a:pPr indent="-317500">
-              <a:buSzPts val="1400"/>
-            </a:pPr>
-            <a:r>
-              <a:rPr lang="en-US" dirty="0">
-                <a:hlinkClick r:id="rId6"/>
-              </a:rPr>
-              <a:t>Aerospace WG website </a:t>
-            </a:r>
-            <a:r>
-              <a:rPr lang="en-US" dirty="0"/>
-              <a:t>(mailing list / meetings)</a:t>
-            </a:r>
-          </a:p>
-        </p:txBody>
-      </p:sp>
-      <p:pic>
-        <p:nvPicPr>
-          <p:cNvPr id="7" name="Picture 6">
-            <a:extLst>
-              <a:ext uri="{FF2B5EF4-FFF2-40B4-BE49-F238E27FC236}">
-                <a16:creationId xmlns:a16="http://schemas.microsoft.com/office/drawing/2014/main" id="{B0D45002-4D3D-1F59-4063-848533EC6519}"/>
+                <a16:creationId xmlns:a16="http://schemas.microsoft.com/office/drawing/2014/main" id="{9DC687E0-76BE-5F74-0990-D9055CA224DC}"/>
               </a:ext>
             </a:extLst>
           </p:cNvPr>
@@ -9079,45 +10662,15 @@
           <p:nvPr/>
         </p:nvPicPr>
         <p:blipFill>
-          <a:blip r:embed="rId7"/>
+          <a:blip r:embed="rId3"/>
           <a:stretch>
             <a:fillRect/>
           </a:stretch>
         </p:blipFill>
         <p:spPr>
           <a:xfrm>
-            <a:off x="6788184" y="445025"/>
-            <a:ext cx="1576280" cy="1576280"/>
-          </a:xfrm>
-          <a:prstGeom prst="rect">
-            <a:avLst/>
-          </a:prstGeom>
-        </p:spPr>
-      </p:pic>
-      <p:pic>
-        <p:nvPicPr>
-          <p:cNvPr id="9" name="Picture 8">
-            <a:extLst>
-              <a:ext uri="{FF2B5EF4-FFF2-40B4-BE49-F238E27FC236}">
-                <a16:creationId xmlns:a16="http://schemas.microsoft.com/office/drawing/2014/main" id="{66278772-5B3C-DB3F-C195-BC33DAEBE297}"/>
-              </a:ext>
-            </a:extLst>
-          </p:cNvPr>
-          <p:cNvPicPr>
-            <a:picLocks noChangeAspect="1"/>
-          </p:cNvPicPr>
-          <p:nvPr/>
-        </p:nvPicPr>
-        <p:blipFill>
-          <a:blip r:embed="rId8"/>
-          <a:stretch>
-            <a:fillRect/>
-          </a:stretch>
-        </p:blipFill>
-        <p:spPr>
-          <a:xfrm>
-            <a:off x="6735707" y="2357546"/>
-            <a:ext cx="2096593" cy="2571749"/>
+            <a:off x="270862" y="204457"/>
+            <a:ext cx="8602275" cy="4734586"/>
           </a:xfrm>
           <a:prstGeom prst="rect">
             <a:avLst/>
@@ -9127,7 +10680,7 @@
     </p:spTree>
     <p:extLst>
       <p:ext uri="{BB962C8B-B14F-4D97-AF65-F5344CB8AC3E}">
-        <p14:creationId xmlns:p14="http://schemas.microsoft.com/office/powerpoint/2010/main" val="1215439811"/>
+        <p14:creationId xmlns:p14="http://schemas.microsoft.com/office/powerpoint/2010/main" val="2355665375"/>
       </p:ext>
     </p:extLst>
   </p:cSld>
@@ -9142,7 +10695,13 @@
   <p:cSld>
     <p:spTree>
       <p:nvGrpSpPr>
-        <p:cNvPr id="1" name="Shape 48"/>
+        <p:cNvPr id="1" name="Shape 48">
+          <a:extLst>
+            <a:ext uri="{FF2B5EF4-FFF2-40B4-BE49-F238E27FC236}">
+              <a16:creationId xmlns:a16="http://schemas.microsoft.com/office/drawing/2014/main" id="{5FDCBF2F-B6F3-950D-2CDE-ED451D0CD780}"/>
+            </a:ext>
+          </a:extLst>
+        </p:cNvPr>
         <p:cNvGrpSpPr/>
         <p:nvPr/>
       </p:nvGrpSpPr>
@@ -9154,49 +10713,42 @@
           <a:chExt cx="0" cy="0"/>
         </a:xfrm>
       </p:grpSpPr>
-      <p:sp>
-        <p:nvSpPr>
-          <p:cNvPr id="49" name="Google Shape;49;p9"/>
-          <p:cNvSpPr txBox="1">
-            <a:spLocks noGrp="1"/>
-          </p:cNvSpPr>
-          <p:nvPr>
-            <p:ph type="ctrTitle"/>
-          </p:nvPr>
-        </p:nvSpPr>
-        <p:spPr>
-          <a:xfrm>
-            <a:off x="319500" y="1783775"/>
-            <a:ext cx="8505000" cy="1827600"/>
+      <p:pic>
+        <p:nvPicPr>
+          <p:cNvPr id="3" name="Picture 2">
+            <a:extLst>
+              <a:ext uri="{FF2B5EF4-FFF2-40B4-BE49-F238E27FC236}">
+                <a16:creationId xmlns:a16="http://schemas.microsoft.com/office/drawing/2014/main" id="{CF939630-1FE7-6392-32F1-F82D9BDE889D}"/>
+              </a:ext>
+            </a:extLst>
+          </p:cNvPr>
+          <p:cNvPicPr>
+            <a:picLocks noChangeAspect="1"/>
+          </p:cNvPicPr>
+          <p:nvPr/>
+        </p:nvPicPr>
+        <p:blipFill>
+          <a:blip r:embed="rId3"/>
+          <a:stretch>
+            <a:fillRect/>
+          </a:stretch>
+        </p:blipFill>
+        <p:spPr>
+          <a:xfrm>
+            <a:off x="266099" y="133009"/>
+            <a:ext cx="8611802" cy="4877481"/>
           </a:xfrm>
           <a:prstGeom prst="rect">
             <a:avLst/>
           </a:prstGeom>
         </p:spPr>
-        <p:txBody>
-          <a:bodyPr spcFirstLastPara="1" wrap="square" lIns="91425" tIns="91425" rIns="91425" bIns="91425" anchor="ctr" anchorCtr="0">
-            <a:noAutofit/>
-          </a:bodyPr>
-          <a:lstStyle/>
-          <a:p>
-            <a:pPr marL="0" lvl="0" indent="0" algn="ctr" rtl="0">
-              <a:spcBef>
-                <a:spcPts val="0"/>
-              </a:spcBef>
-              <a:spcAft>
-                <a:spcPts val="0"/>
-              </a:spcAft>
-              <a:buNone/>
-            </a:pPr>
-            <a:r>
-              <a:rPr lang="en-US" dirty="0"/>
-              <a:t>Thank you for attending!</a:t>
-            </a:r>
-            <a:endParaRPr dirty="0"/>
-          </a:p>
-        </p:txBody>
-      </p:sp>
+      </p:pic>
     </p:spTree>
+    <p:extLst>
+      <p:ext uri="{BB962C8B-B14F-4D97-AF65-F5344CB8AC3E}">
+        <p14:creationId xmlns:p14="http://schemas.microsoft.com/office/powerpoint/2010/main" val="2851522255"/>
+      </p:ext>
+    </p:extLst>
   </p:cSld>
   <p:clrMapOvr>
     <a:masterClrMapping/>

</xml_diff>